<commit_message>
Poprawka dla wielkosci slajdow Mateusz Kozak
</commit_message>
<xml_diff>
--- a/projektsql/Czy język wniosku ma wpływ na jego obsługę.pptx
+++ b/projektsql/Czy język wniosku ma wpływ na jego obsługę.pptx
@@ -122,7 +122,7 @@
   </p:defaultTextStyle>
   <p:extLst>
     <p:ext uri="{EFAFB233-063F-42B5-8137-9DF3F51BA10A}">
-      <p15:sldGuideLst xmlns:p15="http://schemas.microsoft.com/office/powerpoint/2012/main"/>
+      <p15:sldGuideLst xmlns:p15="http://schemas.microsoft.com/office/powerpoint/2012/main" xmlns=""/>
     </p:ext>
   </p:extLst>
 </p:presentation>
@@ -850,7 +850,7 @@
           <a:p>
             <a:fld id="{C140C11A-0795-429A-9A91-0F738F0426E6}" type="datetimeFigureOut">
               <a:rPr lang="pl-PL" smtClean="0"/>
-              <a:t>14.04.2019</a:t>
+              <a:t>2019-04-14</a:t>
             </a:fld>
             <a:endParaRPr lang="pl-PL"/>
           </a:p>
@@ -1101,7 +1101,7 @@
           <a:p>
             <a:fld id="{C140C11A-0795-429A-9A91-0F738F0426E6}" type="datetimeFigureOut">
               <a:rPr lang="pl-PL" smtClean="0"/>
-              <a:t>14.04.2019</a:t>
+              <a:t>2019-04-14</a:t>
             </a:fld>
             <a:endParaRPr lang="pl-PL"/>
           </a:p>
@@ -1415,7 +1415,7 @@
           <a:p>
             <a:fld id="{C140C11A-0795-429A-9A91-0F738F0426E6}" type="datetimeFigureOut">
               <a:rPr lang="pl-PL" smtClean="0"/>
-              <a:t>14.04.2019</a:t>
+              <a:t>2019-04-14</a:t>
             </a:fld>
             <a:endParaRPr lang="pl-PL"/>
           </a:p>
@@ -1756,7 +1756,7 @@
           <a:p>
             <a:fld id="{C140C11A-0795-429A-9A91-0F738F0426E6}" type="datetimeFigureOut">
               <a:rPr lang="pl-PL" smtClean="0"/>
-              <a:t>14.04.2019</a:t>
+              <a:t>2019-04-14</a:t>
             </a:fld>
             <a:endParaRPr lang="pl-PL"/>
           </a:p>
@@ -2070,7 +2070,7 @@
           <a:p>
             <a:fld id="{C140C11A-0795-429A-9A91-0F738F0426E6}" type="datetimeFigureOut">
               <a:rPr lang="pl-PL" smtClean="0"/>
-              <a:t>14.04.2019</a:t>
+              <a:t>2019-04-14</a:t>
             </a:fld>
             <a:endParaRPr lang="pl-PL"/>
           </a:p>
@@ -2463,7 +2463,7 @@
           <a:p>
             <a:fld id="{C140C11A-0795-429A-9A91-0F738F0426E6}" type="datetimeFigureOut">
               <a:rPr lang="pl-PL" smtClean="0"/>
-              <a:t>14.04.2019</a:t>
+              <a:t>2019-04-14</a:t>
             </a:fld>
             <a:endParaRPr lang="pl-PL"/>
           </a:p>
@@ -2633,7 +2633,7 @@
           <a:p>
             <a:fld id="{C140C11A-0795-429A-9A91-0F738F0426E6}" type="datetimeFigureOut">
               <a:rPr lang="pl-PL" smtClean="0"/>
-              <a:t>14.04.2019</a:t>
+              <a:t>2019-04-14</a:t>
             </a:fld>
             <a:endParaRPr lang="pl-PL"/>
           </a:p>
@@ -2813,7 +2813,7 @@
           <a:p>
             <a:fld id="{C140C11A-0795-429A-9A91-0F738F0426E6}" type="datetimeFigureOut">
               <a:rPr lang="pl-PL" smtClean="0"/>
-              <a:t>14.04.2019</a:t>
+              <a:t>2019-04-14</a:t>
             </a:fld>
             <a:endParaRPr lang="pl-PL"/>
           </a:p>
@@ -2989,7 +2989,7 @@
           <a:p>
             <a:fld id="{C140C11A-0795-429A-9A91-0F738F0426E6}" type="datetimeFigureOut">
               <a:rPr lang="pl-PL" smtClean="0"/>
-              <a:t>14.04.2019</a:t>
+              <a:t>2019-04-14</a:t>
             </a:fld>
             <a:endParaRPr lang="pl-PL"/>
           </a:p>
@@ -3236,7 +3236,7 @@
           <a:p>
             <a:fld id="{C140C11A-0795-429A-9A91-0F738F0426E6}" type="datetimeFigureOut">
               <a:rPr lang="pl-PL" smtClean="0"/>
-              <a:t>14.04.2019</a:t>
+              <a:t>2019-04-14</a:t>
             </a:fld>
             <a:endParaRPr lang="pl-PL"/>
           </a:p>
@@ -3468,7 +3468,7 @@
           <a:p>
             <a:fld id="{C140C11A-0795-429A-9A91-0F738F0426E6}" type="datetimeFigureOut">
               <a:rPr lang="pl-PL" smtClean="0"/>
-              <a:t>14.04.2019</a:t>
+              <a:t>2019-04-14</a:t>
             </a:fld>
             <a:endParaRPr lang="pl-PL"/>
           </a:p>
@@ -3842,7 +3842,7 @@
           <a:p>
             <a:fld id="{C140C11A-0795-429A-9A91-0F738F0426E6}" type="datetimeFigureOut">
               <a:rPr lang="pl-PL" smtClean="0"/>
-              <a:t>14.04.2019</a:t>
+              <a:t>2019-04-14</a:t>
             </a:fld>
             <a:endParaRPr lang="pl-PL"/>
           </a:p>
@@ -3965,7 +3965,7 @@
           <a:p>
             <a:fld id="{C140C11A-0795-429A-9A91-0F738F0426E6}" type="datetimeFigureOut">
               <a:rPr lang="pl-PL" smtClean="0"/>
-              <a:t>14.04.2019</a:t>
+              <a:t>2019-04-14</a:t>
             </a:fld>
             <a:endParaRPr lang="pl-PL"/>
           </a:p>
@@ -4060,7 +4060,7 @@
           <a:p>
             <a:fld id="{C140C11A-0795-429A-9A91-0F738F0426E6}" type="datetimeFigureOut">
               <a:rPr lang="pl-PL" smtClean="0"/>
-              <a:t>14.04.2019</a:t>
+              <a:t>2019-04-14</a:t>
             </a:fld>
             <a:endParaRPr lang="pl-PL"/>
           </a:p>
@@ -4315,7 +4315,7 @@
           <a:p>
             <a:fld id="{C140C11A-0795-429A-9A91-0F738F0426E6}" type="datetimeFigureOut">
               <a:rPr lang="pl-PL" smtClean="0"/>
-              <a:t>14.04.2019</a:t>
+              <a:t>2019-04-14</a:t>
             </a:fld>
             <a:endParaRPr lang="pl-PL"/>
           </a:p>
@@ -4578,7 +4578,7 @@
           <a:p>
             <a:fld id="{C140C11A-0795-429A-9A91-0F738F0426E6}" type="datetimeFigureOut">
               <a:rPr lang="pl-PL" smtClean="0"/>
-              <a:t>14.04.2019</a:t>
+              <a:t>2019-04-14</a:t>
             </a:fld>
             <a:endParaRPr lang="pl-PL"/>
           </a:p>
@@ -5321,7 +5321,7 @@
           <a:p>
             <a:fld id="{C140C11A-0795-429A-9A91-0F738F0426E6}" type="datetimeFigureOut">
               <a:rPr lang="pl-PL" smtClean="0"/>
-              <a:t>14.04.2019</a:t>
+              <a:t>2019-04-14</a:t>
             </a:fld>
             <a:endParaRPr lang="pl-PL"/>
           </a:p>
@@ -5850,7 +5850,7 @@
           <p:cNvPr id="2" name="Tytuł 1">
             <a:extLst>
               <a:ext uri="{FF2B5EF4-FFF2-40B4-BE49-F238E27FC236}">
-                <a16:creationId xmlns:a16="http://schemas.microsoft.com/office/drawing/2014/main" id="{02BD85F1-E73D-408F-B2BF-84E131211C9A}"/>
+                <a16:creationId xmlns:a16="http://schemas.microsoft.com/office/drawing/2014/main" xmlns="" id="{02BD85F1-E73D-408F-B2BF-84E131211C9A}"/>
               </a:ext>
             </a:extLst>
           </p:cNvPr>
@@ -5882,7 +5882,7 @@
           <p:cNvPr id="3" name="Podtytuł 2">
             <a:extLst>
               <a:ext uri="{FF2B5EF4-FFF2-40B4-BE49-F238E27FC236}">
-                <a16:creationId xmlns:a16="http://schemas.microsoft.com/office/drawing/2014/main" id="{1277B88F-6923-469D-AE80-D22E52C41220}"/>
+                <a16:creationId xmlns:a16="http://schemas.microsoft.com/office/drawing/2014/main" xmlns="" id="{1277B88F-6923-469D-AE80-D22E52C41220}"/>
               </a:ext>
             </a:extLst>
           </p:cNvPr>
@@ -5967,10 +5967,10 @@
           <p:cNvPr id="7" name="Rectangle 6">
             <a:extLst>
               <a:ext uri="{FF2B5EF4-FFF2-40B4-BE49-F238E27FC236}">
-                <a16:creationId xmlns:a16="http://schemas.microsoft.com/office/drawing/2014/main" id="{03E8462A-FEBA-4848-81CC-3F8DA3E477BE}"/>
+                <a16:creationId xmlns:a16="http://schemas.microsoft.com/office/drawing/2014/main" xmlns="" id="{03E8462A-FEBA-4848-81CC-3F8DA3E477BE}"/>
               </a:ext>
               <a:ext uri="{C183D7F6-B498-43B3-948B-1728B52AA6E4}">
-                <adec:decorative xmlns:adec="http://schemas.microsoft.com/office/drawing/2017/decorative" val="1"/>
+                <adec:decorative xmlns:adec="http://schemas.microsoft.com/office/drawing/2017/decorative" xmlns="" val="1"/>
               </a:ext>
             </a:extLst>
           </p:cNvPr>
@@ -5980,7 +5980,7 @@
           <p:nvPr>
             <p:extLst>
               <p:ext uri="{386F3935-93C4-4BCD-93E2-E3B085C9AB24}">
-                <p16:designElem xmlns:p16="http://schemas.microsoft.com/office/powerpoint/2015/main" val="1"/>
+                <p16:designElem xmlns:p16="http://schemas.microsoft.com/office/powerpoint/2015/main" xmlns="" val="1"/>
               </p:ext>
             </p:extLst>
           </p:nvPr>
@@ -6030,10 +6030,10 @@
           <p:cNvPr id="9" name="Group 8">
             <a:extLst>
               <a:ext uri="{FF2B5EF4-FFF2-40B4-BE49-F238E27FC236}">
-                <a16:creationId xmlns:a16="http://schemas.microsoft.com/office/drawing/2014/main" id="{2109F83F-40FE-4DB3-84CC-09FB3340D06D}"/>
+                <a16:creationId xmlns:a16="http://schemas.microsoft.com/office/drawing/2014/main" xmlns="" id="{2109F83F-40FE-4DB3-84CC-09FB3340D06D}"/>
               </a:ext>
               <a:ext uri="{C183D7F6-B498-43B3-948B-1728B52AA6E4}">
-                <adec:decorative xmlns:adec="http://schemas.microsoft.com/office/drawing/2017/decorative" val="1"/>
+                <adec:decorative xmlns:adec="http://schemas.microsoft.com/office/drawing/2017/decorative" xmlns="" val="1"/>
               </a:ext>
             </a:extLst>
           </p:cNvPr>
@@ -6043,7 +6043,7 @@
           <p:nvPr>
             <p:extLst>
               <p:ext uri="{386F3935-93C4-4BCD-93E2-E3B085C9AB24}">
-                <p16:designElem xmlns:p16="http://schemas.microsoft.com/office/powerpoint/2015/main" val="1"/>
+                <p16:designElem xmlns:p16="http://schemas.microsoft.com/office/powerpoint/2015/main" xmlns="" val="1"/>
               </p:ext>
             </p:extLst>
           </p:nvPr>
@@ -6061,10 +6061,10 @@
             <p:cNvPr id="10" name="Straight Connector 9">
               <a:extLst>
                 <a:ext uri="{FF2B5EF4-FFF2-40B4-BE49-F238E27FC236}">
-                  <a16:creationId xmlns:a16="http://schemas.microsoft.com/office/drawing/2014/main" id="{1DE492D7-C3C3-48FF-80C8-37021EA0262F}"/>
+                  <a16:creationId xmlns:a16="http://schemas.microsoft.com/office/drawing/2014/main" xmlns="" id="{1DE492D7-C3C3-48FF-80C8-37021EA0262F}"/>
                 </a:ext>
                 <a:ext uri="{C183D7F6-B498-43B3-948B-1728B52AA6E4}">
-                  <adec:decorative xmlns:adec="http://schemas.microsoft.com/office/drawing/2017/decorative" val="1"/>
+                  <adec:decorative xmlns:adec="http://schemas.microsoft.com/office/drawing/2017/decorative" xmlns="" val="1"/>
                 </a:ext>
               </a:extLst>
             </p:cNvPr>
@@ -6072,7 +6072,7 @@
             <p:nvPr>
               <p:extLst>
                 <p:ext uri="{386F3935-93C4-4BCD-93E2-E3B085C9AB24}">
-                  <p16:designElem xmlns:p16="http://schemas.microsoft.com/office/powerpoint/2015/main" val="1"/>
+                  <p16:designElem xmlns:p16="http://schemas.microsoft.com/office/powerpoint/2015/main" xmlns="" val="1"/>
                 </p:ext>
               </p:extLst>
             </p:nvPr>
@@ -6113,10 +6113,10 @@
             <p:cNvPr id="11" name="Rectangle 23">
               <a:extLst>
                 <a:ext uri="{FF2B5EF4-FFF2-40B4-BE49-F238E27FC236}">
-                  <a16:creationId xmlns:a16="http://schemas.microsoft.com/office/drawing/2014/main" id="{0B30FF97-2E9A-490A-AED2-90BA2E0EC17F}"/>
+                  <a16:creationId xmlns:a16="http://schemas.microsoft.com/office/drawing/2014/main" xmlns="" id="{0B30FF97-2E9A-490A-AED2-90BA2E0EC17F}"/>
                 </a:ext>
                 <a:ext uri="{C183D7F6-B498-43B3-948B-1728B52AA6E4}">
-                  <adec:decorative xmlns:adec="http://schemas.microsoft.com/office/drawing/2017/decorative" val="1"/>
+                  <adec:decorative xmlns:adec="http://schemas.microsoft.com/office/drawing/2017/decorative" xmlns="" val="1"/>
                 </a:ext>
               </a:extLst>
             </p:cNvPr>
@@ -6124,7 +6124,7 @@
             <p:nvPr>
               <p:extLst>
                 <p:ext uri="{386F3935-93C4-4BCD-93E2-E3B085C9AB24}">
-                  <p16:designElem xmlns:p16="http://schemas.microsoft.com/office/powerpoint/2015/main" val="1"/>
+                  <p16:designElem xmlns:p16="http://schemas.microsoft.com/office/powerpoint/2015/main" xmlns="" val="1"/>
                 </p:ext>
               </p:extLst>
             </p:nvPr>
@@ -6191,10 +6191,10 @@
             <p:cNvPr id="12" name="Rectangle 25">
               <a:extLst>
                 <a:ext uri="{FF2B5EF4-FFF2-40B4-BE49-F238E27FC236}">
-                  <a16:creationId xmlns:a16="http://schemas.microsoft.com/office/drawing/2014/main" id="{B6D53C7D-A312-47B6-A66A-230A19CFACA6}"/>
+                  <a16:creationId xmlns:a16="http://schemas.microsoft.com/office/drawing/2014/main" xmlns="" id="{B6D53C7D-A312-47B6-A66A-230A19CFACA6}"/>
                 </a:ext>
                 <a:ext uri="{C183D7F6-B498-43B3-948B-1728B52AA6E4}">
-                  <adec:decorative xmlns:adec="http://schemas.microsoft.com/office/drawing/2017/decorative" val="1"/>
+                  <adec:decorative xmlns:adec="http://schemas.microsoft.com/office/drawing/2017/decorative" xmlns="" val="1"/>
                 </a:ext>
               </a:extLst>
             </p:cNvPr>
@@ -6202,7 +6202,7 @@
             <p:nvPr>
               <p:extLst>
                 <p:ext uri="{386F3935-93C4-4BCD-93E2-E3B085C9AB24}">
-                  <p16:designElem xmlns:p16="http://schemas.microsoft.com/office/powerpoint/2015/main" val="1"/>
+                  <p16:designElem xmlns:p16="http://schemas.microsoft.com/office/powerpoint/2015/main" xmlns="" val="1"/>
                 </p:ext>
               </p:extLst>
             </p:nvPr>
@@ -6269,10 +6269,10 @@
             <p:cNvPr id="13" name="Isosceles Triangle 12">
               <a:extLst>
                 <a:ext uri="{FF2B5EF4-FFF2-40B4-BE49-F238E27FC236}">
-                  <a16:creationId xmlns:a16="http://schemas.microsoft.com/office/drawing/2014/main" id="{9329D58C-0D2E-4A2B-AD6A-9CEE506784A8}"/>
+                  <a16:creationId xmlns:a16="http://schemas.microsoft.com/office/drawing/2014/main" xmlns="" id="{9329D58C-0D2E-4A2B-AD6A-9CEE506784A8}"/>
                 </a:ext>
                 <a:ext uri="{C183D7F6-B498-43B3-948B-1728B52AA6E4}">
-                  <adec:decorative xmlns:adec="http://schemas.microsoft.com/office/drawing/2017/decorative" val="1"/>
+                  <adec:decorative xmlns:adec="http://schemas.microsoft.com/office/drawing/2017/decorative" xmlns="" val="1"/>
                 </a:ext>
               </a:extLst>
             </p:cNvPr>
@@ -6280,7 +6280,7 @@
             <p:nvPr>
               <p:extLst>
                 <p:ext uri="{386F3935-93C4-4BCD-93E2-E3B085C9AB24}">
-                  <p16:designElem xmlns:p16="http://schemas.microsoft.com/office/powerpoint/2015/main" val="1"/>
+                  <p16:designElem xmlns:p16="http://schemas.microsoft.com/office/powerpoint/2015/main" xmlns="" val="1"/>
                 </p:ext>
               </p:extLst>
             </p:nvPr>
@@ -6325,10 +6325,10 @@
             <p:cNvPr id="14" name="Rectangle 27">
               <a:extLst>
                 <a:ext uri="{FF2B5EF4-FFF2-40B4-BE49-F238E27FC236}">
-                  <a16:creationId xmlns:a16="http://schemas.microsoft.com/office/drawing/2014/main" id="{9D446EDE-C690-4461-8BF2-7634808FC8B4}"/>
+                  <a16:creationId xmlns:a16="http://schemas.microsoft.com/office/drawing/2014/main" xmlns="" id="{9D446EDE-C690-4461-8BF2-7634808FC8B4}"/>
                 </a:ext>
                 <a:ext uri="{C183D7F6-B498-43B3-948B-1728B52AA6E4}">
-                  <adec:decorative xmlns:adec="http://schemas.microsoft.com/office/drawing/2017/decorative" val="1"/>
+                  <adec:decorative xmlns:adec="http://schemas.microsoft.com/office/drawing/2017/decorative" xmlns="" val="1"/>
                 </a:ext>
               </a:extLst>
             </p:cNvPr>
@@ -6336,7 +6336,7 @@
             <p:nvPr>
               <p:extLst>
                 <p:ext uri="{386F3935-93C4-4BCD-93E2-E3B085C9AB24}">
-                  <p16:designElem xmlns:p16="http://schemas.microsoft.com/office/powerpoint/2015/main" val="1"/>
+                  <p16:designElem xmlns:p16="http://schemas.microsoft.com/office/powerpoint/2015/main" xmlns="" val="1"/>
                 </p:ext>
               </p:extLst>
             </p:nvPr>
@@ -6404,10 +6404,10 @@
             <p:cNvPr id="15" name="Rectangle 28">
               <a:extLst>
                 <a:ext uri="{FF2B5EF4-FFF2-40B4-BE49-F238E27FC236}">
-                  <a16:creationId xmlns:a16="http://schemas.microsoft.com/office/drawing/2014/main" id="{323F3D34-6531-4AD7-A8C6-195A090281A1}"/>
+                  <a16:creationId xmlns:a16="http://schemas.microsoft.com/office/drawing/2014/main" xmlns="" id="{323F3D34-6531-4AD7-A8C6-195A090281A1}"/>
                 </a:ext>
                 <a:ext uri="{C183D7F6-B498-43B3-948B-1728B52AA6E4}">
-                  <adec:decorative xmlns:adec="http://schemas.microsoft.com/office/drawing/2017/decorative" val="1"/>
+                  <adec:decorative xmlns:adec="http://schemas.microsoft.com/office/drawing/2017/decorative" xmlns="" val="1"/>
                 </a:ext>
               </a:extLst>
             </p:cNvPr>
@@ -6415,7 +6415,7 @@
             <p:nvPr>
               <p:extLst>
                 <p:ext uri="{386F3935-93C4-4BCD-93E2-E3B085C9AB24}">
-                  <p16:designElem xmlns:p16="http://schemas.microsoft.com/office/powerpoint/2015/main" val="1"/>
+                  <p16:designElem xmlns:p16="http://schemas.microsoft.com/office/powerpoint/2015/main" xmlns="" val="1"/>
                 </p:ext>
               </p:extLst>
             </p:nvPr>
@@ -6484,10 +6484,10 @@
             <p:cNvPr id="16" name="Rectangle 29">
               <a:extLst>
                 <a:ext uri="{FF2B5EF4-FFF2-40B4-BE49-F238E27FC236}">
-                  <a16:creationId xmlns:a16="http://schemas.microsoft.com/office/drawing/2014/main" id="{B9B0AE3F-2350-435F-A9B0-C310BF876385}"/>
+                  <a16:creationId xmlns:a16="http://schemas.microsoft.com/office/drawing/2014/main" xmlns="" id="{B9B0AE3F-2350-435F-A9B0-C310BF876385}"/>
                 </a:ext>
                 <a:ext uri="{C183D7F6-B498-43B3-948B-1728B52AA6E4}">
-                  <adec:decorative xmlns:adec="http://schemas.microsoft.com/office/drawing/2017/decorative" val="1"/>
+                  <adec:decorative xmlns:adec="http://schemas.microsoft.com/office/drawing/2017/decorative" xmlns="" val="1"/>
                 </a:ext>
               </a:extLst>
             </p:cNvPr>
@@ -6495,7 +6495,7 @@
             <p:nvPr>
               <p:extLst>
                 <p:ext uri="{386F3935-93C4-4BCD-93E2-E3B085C9AB24}">
-                  <p16:designElem xmlns:p16="http://schemas.microsoft.com/office/powerpoint/2015/main" val="1"/>
+                  <p16:designElem xmlns:p16="http://schemas.microsoft.com/office/powerpoint/2015/main" xmlns="" val="1"/>
                 </p:ext>
               </p:extLst>
             </p:nvPr>
@@ -6562,10 +6562,10 @@
             <p:cNvPr id="17" name="Isosceles Triangle 16">
               <a:extLst>
                 <a:ext uri="{FF2B5EF4-FFF2-40B4-BE49-F238E27FC236}">
-                  <a16:creationId xmlns:a16="http://schemas.microsoft.com/office/drawing/2014/main" id="{4EFA655C-9E50-4C14-A89E-AD7B648E4E2B}"/>
+                  <a16:creationId xmlns:a16="http://schemas.microsoft.com/office/drawing/2014/main" xmlns="" id="{4EFA655C-9E50-4C14-A89E-AD7B648E4E2B}"/>
                 </a:ext>
                 <a:ext uri="{C183D7F6-B498-43B3-948B-1728B52AA6E4}">
-                  <adec:decorative xmlns:adec="http://schemas.microsoft.com/office/drawing/2017/decorative" val="1"/>
+                  <adec:decorative xmlns:adec="http://schemas.microsoft.com/office/drawing/2017/decorative" xmlns="" val="1"/>
                 </a:ext>
               </a:extLst>
             </p:cNvPr>
@@ -6573,7 +6573,7 @@
             <p:nvPr>
               <p:extLst>
                 <p:ext uri="{386F3935-93C4-4BCD-93E2-E3B085C9AB24}">
-                  <p16:designElem xmlns:p16="http://schemas.microsoft.com/office/powerpoint/2015/main" val="1"/>
+                  <p16:designElem xmlns:p16="http://schemas.microsoft.com/office/powerpoint/2015/main" xmlns="" val="1"/>
                 </p:ext>
               </p:extLst>
             </p:nvPr>
@@ -6618,10 +6618,10 @@
             <p:cNvPr id="18" name="Isosceles Triangle 17">
               <a:extLst>
                 <a:ext uri="{FF2B5EF4-FFF2-40B4-BE49-F238E27FC236}">
-                  <a16:creationId xmlns:a16="http://schemas.microsoft.com/office/drawing/2014/main" id="{3E843863-7D25-4C01-9A17-E817CB6D998A}"/>
+                  <a16:creationId xmlns:a16="http://schemas.microsoft.com/office/drawing/2014/main" xmlns="" id="{3E843863-7D25-4C01-9A17-E817CB6D998A}"/>
                 </a:ext>
                 <a:ext uri="{C183D7F6-B498-43B3-948B-1728B52AA6E4}">
-                  <adec:decorative xmlns:adec="http://schemas.microsoft.com/office/drawing/2017/decorative" val="1"/>
+                  <adec:decorative xmlns:adec="http://schemas.microsoft.com/office/drawing/2017/decorative" xmlns="" val="1"/>
                 </a:ext>
               </a:extLst>
             </p:cNvPr>
@@ -6629,7 +6629,7 @@
             <p:nvPr>
               <p:extLst>
                 <p:ext uri="{386F3935-93C4-4BCD-93E2-E3B085C9AB24}">
-                  <p16:designElem xmlns:p16="http://schemas.microsoft.com/office/powerpoint/2015/main" val="1"/>
+                  <p16:designElem xmlns:p16="http://schemas.microsoft.com/office/powerpoint/2015/main" xmlns="" val="1"/>
                 </p:ext>
               </p:extLst>
             </p:nvPr>
@@ -6675,10 +6675,10 @@
           <p:cNvPr id="20" name="Rectangle 19">
             <a:extLst>
               <a:ext uri="{FF2B5EF4-FFF2-40B4-BE49-F238E27FC236}">
-                <a16:creationId xmlns:a16="http://schemas.microsoft.com/office/drawing/2014/main" id="{7941F9B1-B01B-4A84-89D9-B169AEB4E456}"/>
+                <a16:creationId xmlns:a16="http://schemas.microsoft.com/office/drawing/2014/main" xmlns="" id="{7941F9B1-B01B-4A84-89D9-B169AEB4E456}"/>
               </a:ext>
               <a:ext uri="{C183D7F6-B498-43B3-948B-1728B52AA6E4}">
-                <adec:decorative xmlns:adec="http://schemas.microsoft.com/office/drawing/2017/decorative" val="1"/>
+                <adec:decorative xmlns:adec="http://schemas.microsoft.com/office/drawing/2017/decorative" xmlns="" val="1"/>
               </a:ext>
             </a:extLst>
           </p:cNvPr>
@@ -6688,7 +6688,7 @@
           <p:nvPr>
             <p:extLst>
               <p:ext uri="{386F3935-93C4-4BCD-93E2-E3B085C9AB24}">
-                <p16:designElem xmlns:p16="http://schemas.microsoft.com/office/powerpoint/2015/main" val="1"/>
+                <p16:designElem xmlns:p16="http://schemas.microsoft.com/office/powerpoint/2015/main" xmlns="" val="1"/>
               </p:ext>
             </p:extLst>
           </p:nvPr>
@@ -6745,7 +6745,7 @@
           <p:cNvPr id="2" name="slide4">
             <a:extLst>
               <a:ext uri="{FF2B5EF4-FFF2-40B4-BE49-F238E27FC236}">
-                <a16:creationId xmlns:a16="http://schemas.microsoft.com/office/drawing/2014/main" id="{C00F9D33-E99F-43DE-8833-1A83AB298B88}"/>
+                <a16:creationId xmlns:a16="http://schemas.microsoft.com/office/drawing/2014/main" xmlns="" id="{C00F9D33-E99F-43DE-8833-1A83AB298B88}"/>
               </a:ext>
             </a:extLst>
           </p:cNvPr>
@@ -6768,8 +6768,8 @@
         </p:blipFill>
         <p:spPr>
           <a:xfrm>
-            <a:off x="2206781" y="1131994"/>
-            <a:ext cx="7780314" cy="4590386"/>
+            <a:off x="1587113" y="718273"/>
+            <a:ext cx="9174550" cy="5412986"/>
           </a:xfrm>
           <a:prstGeom prst="rect">
             <a:avLst/>
@@ -6819,10 +6819,10 @@
           <p:cNvPr id="7" name="Rectangle 6">
             <a:extLst>
               <a:ext uri="{FF2B5EF4-FFF2-40B4-BE49-F238E27FC236}">
-                <a16:creationId xmlns:a16="http://schemas.microsoft.com/office/drawing/2014/main" id="{03E8462A-FEBA-4848-81CC-3F8DA3E477BE}"/>
+                <a16:creationId xmlns:a16="http://schemas.microsoft.com/office/drawing/2014/main" xmlns="" id="{03E8462A-FEBA-4848-81CC-3F8DA3E477BE}"/>
               </a:ext>
               <a:ext uri="{C183D7F6-B498-43B3-948B-1728B52AA6E4}">
-                <adec:decorative xmlns:adec="http://schemas.microsoft.com/office/drawing/2017/decorative" val="1"/>
+                <adec:decorative xmlns:adec="http://schemas.microsoft.com/office/drawing/2017/decorative" xmlns="" val="1"/>
               </a:ext>
             </a:extLst>
           </p:cNvPr>
@@ -6832,7 +6832,7 @@
           <p:nvPr>
             <p:extLst>
               <p:ext uri="{386F3935-93C4-4BCD-93E2-E3B085C9AB24}">
-                <p16:designElem xmlns:p16="http://schemas.microsoft.com/office/powerpoint/2015/main" val="1"/>
+                <p16:designElem xmlns:p16="http://schemas.microsoft.com/office/powerpoint/2015/main" xmlns="" val="1"/>
               </p:ext>
             </p:extLst>
           </p:nvPr>
@@ -6882,10 +6882,10 @@
           <p:cNvPr id="9" name="Group 8">
             <a:extLst>
               <a:ext uri="{FF2B5EF4-FFF2-40B4-BE49-F238E27FC236}">
-                <a16:creationId xmlns:a16="http://schemas.microsoft.com/office/drawing/2014/main" id="{2109F83F-40FE-4DB3-84CC-09FB3340D06D}"/>
+                <a16:creationId xmlns:a16="http://schemas.microsoft.com/office/drawing/2014/main" xmlns="" id="{2109F83F-40FE-4DB3-84CC-09FB3340D06D}"/>
               </a:ext>
               <a:ext uri="{C183D7F6-B498-43B3-948B-1728B52AA6E4}">
-                <adec:decorative xmlns:adec="http://schemas.microsoft.com/office/drawing/2017/decorative" val="1"/>
+                <adec:decorative xmlns:adec="http://schemas.microsoft.com/office/drawing/2017/decorative" xmlns="" val="1"/>
               </a:ext>
             </a:extLst>
           </p:cNvPr>
@@ -6895,7 +6895,7 @@
           <p:nvPr>
             <p:extLst>
               <p:ext uri="{386F3935-93C4-4BCD-93E2-E3B085C9AB24}">
-                <p16:designElem xmlns:p16="http://schemas.microsoft.com/office/powerpoint/2015/main" val="1"/>
+                <p16:designElem xmlns:p16="http://schemas.microsoft.com/office/powerpoint/2015/main" xmlns="" val="1"/>
               </p:ext>
             </p:extLst>
           </p:nvPr>
@@ -6913,10 +6913,10 @@
             <p:cNvPr id="10" name="Straight Connector 9">
               <a:extLst>
                 <a:ext uri="{FF2B5EF4-FFF2-40B4-BE49-F238E27FC236}">
-                  <a16:creationId xmlns:a16="http://schemas.microsoft.com/office/drawing/2014/main" id="{1DE492D7-C3C3-48FF-80C8-37021EA0262F}"/>
+                  <a16:creationId xmlns:a16="http://schemas.microsoft.com/office/drawing/2014/main" xmlns="" id="{1DE492D7-C3C3-48FF-80C8-37021EA0262F}"/>
                 </a:ext>
                 <a:ext uri="{C183D7F6-B498-43B3-948B-1728B52AA6E4}">
-                  <adec:decorative xmlns:adec="http://schemas.microsoft.com/office/drawing/2017/decorative" val="1"/>
+                  <adec:decorative xmlns:adec="http://schemas.microsoft.com/office/drawing/2017/decorative" xmlns="" val="1"/>
                 </a:ext>
               </a:extLst>
             </p:cNvPr>
@@ -6924,7 +6924,7 @@
             <p:nvPr>
               <p:extLst>
                 <p:ext uri="{386F3935-93C4-4BCD-93E2-E3B085C9AB24}">
-                  <p16:designElem xmlns:p16="http://schemas.microsoft.com/office/powerpoint/2015/main" val="1"/>
+                  <p16:designElem xmlns:p16="http://schemas.microsoft.com/office/powerpoint/2015/main" xmlns="" val="1"/>
                 </p:ext>
               </p:extLst>
             </p:nvPr>
@@ -6965,10 +6965,10 @@
             <p:cNvPr id="11" name="Rectangle 23">
               <a:extLst>
                 <a:ext uri="{FF2B5EF4-FFF2-40B4-BE49-F238E27FC236}">
-                  <a16:creationId xmlns:a16="http://schemas.microsoft.com/office/drawing/2014/main" id="{0B30FF97-2E9A-490A-AED2-90BA2E0EC17F}"/>
+                  <a16:creationId xmlns:a16="http://schemas.microsoft.com/office/drawing/2014/main" xmlns="" id="{0B30FF97-2E9A-490A-AED2-90BA2E0EC17F}"/>
                 </a:ext>
                 <a:ext uri="{C183D7F6-B498-43B3-948B-1728B52AA6E4}">
-                  <adec:decorative xmlns:adec="http://schemas.microsoft.com/office/drawing/2017/decorative" val="1"/>
+                  <adec:decorative xmlns:adec="http://schemas.microsoft.com/office/drawing/2017/decorative" xmlns="" val="1"/>
                 </a:ext>
               </a:extLst>
             </p:cNvPr>
@@ -6976,7 +6976,7 @@
             <p:nvPr>
               <p:extLst>
                 <p:ext uri="{386F3935-93C4-4BCD-93E2-E3B085C9AB24}">
-                  <p16:designElem xmlns:p16="http://schemas.microsoft.com/office/powerpoint/2015/main" val="1"/>
+                  <p16:designElem xmlns:p16="http://schemas.microsoft.com/office/powerpoint/2015/main" xmlns="" val="1"/>
                 </p:ext>
               </p:extLst>
             </p:nvPr>
@@ -7043,10 +7043,10 @@
             <p:cNvPr id="12" name="Rectangle 25">
               <a:extLst>
                 <a:ext uri="{FF2B5EF4-FFF2-40B4-BE49-F238E27FC236}">
-                  <a16:creationId xmlns:a16="http://schemas.microsoft.com/office/drawing/2014/main" id="{B6D53C7D-A312-47B6-A66A-230A19CFACA6}"/>
+                  <a16:creationId xmlns:a16="http://schemas.microsoft.com/office/drawing/2014/main" xmlns="" id="{B6D53C7D-A312-47B6-A66A-230A19CFACA6}"/>
                 </a:ext>
                 <a:ext uri="{C183D7F6-B498-43B3-948B-1728B52AA6E4}">
-                  <adec:decorative xmlns:adec="http://schemas.microsoft.com/office/drawing/2017/decorative" val="1"/>
+                  <adec:decorative xmlns:adec="http://schemas.microsoft.com/office/drawing/2017/decorative" xmlns="" val="1"/>
                 </a:ext>
               </a:extLst>
             </p:cNvPr>
@@ -7054,7 +7054,7 @@
             <p:nvPr>
               <p:extLst>
                 <p:ext uri="{386F3935-93C4-4BCD-93E2-E3B085C9AB24}">
-                  <p16:designElem xmlns:p16="http://schemas.microsoft.com/office/powerpoint/2015/main" val="1"/>
+                  <p16:designElem xmlns:p16="http://schemas.microsoft.com/office/powerpoint/2015/main" xmlns="" val="1"/>
                 </p:ext>
               </p:extLst>
             </p:nvPr>
@@ -7121,10 +7121,10 @@
             <p:cNvPr id="13" name="Isosceles Triangle 12">
               <a:extLst>
                 <a:ext uri="{FF2B5EF4-FFF2-40B4-BE49-F238E27FC236}">
-                  <a16:creationId xmlns:a16="http://schemas.microsoft.com/office/drawing/2014/main" id="{9329D58C-0D2E-4A2B-AD6A-9CEE506784A8}"/>
+                  <a16:creationId xmlns:a16="http://schemas.microsoft.com/office/drawing/2014/main" xmlns="" id="{9329D58C-0D2E-4A2B-AD6A-9CEE506784A8}"/>
                 </a:ext>
                 <a:ext uri="{C183D7F6-B498-43B3-948B-1728B52AA6E4}">
-                  <adec:decorative xmlns:adec="http://schemas.microsoft.com/office/drawing/2017/decorative" val="1"/>
+                  <adec:decorative xmlns:adec="http://schemas.microsoft.com/office/drawing/2017/decorative" xmlns="" val="1"/>
                 </a:ext>
               </a:extLst>
             </p:cNvPr>
@@ -7132,7 +7132,7 @@
             <p:nvPr>
               <p:extLst>
                 <p:ext uri="{386F3935-93C4-4BCD-93E2-E3B085C9AB24}">
-                  <p16:designElem xmlns:p16="http://schemas.microsoft.com/office/powerpoint/2015/main" val="1"/>
+                  <p16:designElem xmlns:p16="http://schemas.microsoft.com/office/powerpoint/2015/main" xmlns="" val="1"/>
                 </p:ext>
               </p:extLst>
             </p:nvPr>
@@ -7177,10 +7177,10 @@
             <p:cNvPr id="14" name="Rectangle 27">
               <a:extLst>
                 <a:ext uri="{FF2B5EF4-FFF2-40B4-BE49-F238E27FC236}">
-                  <a16:creationId xmlns:a16="http://schemas.microsoft.com/office/drawing/2014/main" id="{9D446EDE-C690-4461-8BF2-7634808FC8B4}"/>
+                  <a16:creationId xmlns:a16="http://schemas.microsoft.com/office/drawing/2014/main" xmlns="" id="{9D446EDE-C690-4461-8BF2-7634808FC8B4}"/>
                 </a:ext>
                 <a:ext uri="{C183D7F6-B498-43B3-948B-1728B52AA6E4}">
-                  <adec:decorative xmlns:adec="http://schemas.microsoft.com/office/drawing/2017/decorative" val="1"/>
+                  <adec:decorative xmlns:adec="http://schemas.microsoft.com/office/drawing/2017/decorative" xmlns="" val="1"/>
                 </a:ext>
               </a:extLst>
             </p:cNvPr>
@@ -7188,7 +7188,7 @@
             <p:nvPr>
               <p:extLst>
                 <p:ext uri="{386F3935-93C4-4BCD-93E2-E3B085C9AB24}">
-                  <p16:designElem xmlns:p16="http://schemas.microsoft.com/office/powerpoint/2015/main" val="1"/>
+                  <p16:designElem xmlns:p16="http://schemas.microsoft.com/office/powerpoint/2015/main" xmlns="" val="1"/>
                 </p:ext>
               </p:extLst>
             </p:nvPr>
@@ -7256,10 +7256,10 @@
             <p:cNvPr id="15" name="Rectangle 28">
               <a:extLst>
                 <a:ext uri="{FF2B5EF4-FFF2-40B4-BE49-F238E27FC236}">
-                  <a16:creationId xmlns:a16="http://schemas.microsoft.com/office/drawing/2014/main" id="{323F3D34-6531-4AD7-A8C6-195A090281A1}"/>
+                  <a16:creationId xmlns:a16="http://schemas.microsoft.com/office/drawing/2014/main" xmlns="" id="{323F3D34-6531-4AD7-A8C6-195A090281A1}"/>
                 </a:ext>
                 <a:ext uri="{C183D7F6-B498-43B3-948B-1728B52AA6E4}">
-                  <adec:decorative xmlns:adec="http://schemas.microsoft.com/office/drawing/2017/decorative" val="1"/>
+                  <adec:decorative xmlns:adec="http://schemas.microsoft.com/office/drawing/2017/decorative" xmlns="" val="1"/>
                 </a:ext>
               </a:extLst>
             </p:cNvPr>
@@ -7267,7 +7267,7 @@
             <p:nvPr>
               <p:extLst>
                 <p:ext uri="{386F3935-93C4-4BCD-93E2-E3B085C9AB24}">
-                  <p16:designElem xmlns:p16="http://schemas.microsoft.com/office/powerpoint/2015/main" val="1"/>
+                  <p16:designElem xmlns:p16="http://schemas.microsoft.com/office/powerpoint/2015/main" xmlns="" val="1"/>
                 </p:ext>
               </p:extLst>
             </p:nvPr>
@@ -7336,10 +7336,10 @@
             <p:cNvPr id="16" name="Rectangle 29">
               <a:extLst>
                 <a:ext uri="{FF2B5EF4-FFF2-40B4-BE49-F238E27FC236}">
-                  <a16:creationId xmlns:a16="http://schemas.microsoft.com/office/drawing/2014/main" id="{B9B0AE3F-2350-435F-A9B0-C310BF876385}"/>
+                  <a16:creationId xmlns:a16="http://schemas.microsoft.com/office/drawing/2014/main" xmlns="" id="{B9B0AE3F-2350-435F-A9B0-C310BF876385}"/>
                 </a:ext>
                 <a:ext uri="{C183D7F6-B498-43B3-948B-1728B52AA6E4}">
-                  <adec:decorative xmlns:adec="http://schemas.microsoft.com/office/drawing/2017/decorative" val="1"/>
+                  <adec:decorative xmlns:adec="http://schemas.microsoft.com/office/drawing/2017/decorative" xmlns="" val="1"/>
                 </a:ext>
               </a:extLst>
             </p:cNvPr>
@@ -7347,7 +7347,7 @@
             <p:nvPr>
               <p:extLst>
                 <p:ext uri="{386F3935-93C4-4BCD-93E2-E3B085C9AB24}">
-                  <p16:designElem xmlns:p16="http://schemas.microsoft.com/office/powerpoint/2015/main" val="1"/>
+                  <p16:designElem xmlns:p16="http://schemas.microsoft.com/office/powerpoint/2015/main" xmlns="" val="1"/>
                 </p:ext>
               </p:extLst>
             </p:nvPr>
@@ -7414,10 +7414,10 @@
             <p:cNvPr id="17" name="Isosceles Triangle 16">
               <a:extLst>
                 <a:ext uri="{FF2B5EF4-FFF2-40B4-BE49-F238E27FC236}">
-                  <a16:creationId xmlns:a16="http://schemas.microsoft.com/office/drawing/2014/main" id="{4EFA655C-9E50-4C14-A89E-AD7B648E4E2B}"/>
+                  <a16:creationId xmlns:a16="http://schemas.microsoft.com/office/drawing/2014/main" xmlns="" id="{4EFA655C-9E50-4C14-A89E-AD7B648E4E2B}"/>
                 </a:ext>
                 <a:ext uri="{C183D7F6-B498-43B3-948B-1728B52AA6E4}">
-                  <adec:decorative xmlns:adec="http://schemas.microsoft.com/office/drawing/2017/decorative" val="1"/>
+                  <adec:decorative xmlns:adec="http://schemas.microsoft.com/office/drawing/2017/decorative" xmlns="" val="1"/>
                 </a:ext>
               </a:extLst>
             </p:cNvPr>
@@ -7425,7 +7425,7 @@
             <p:nvPr>
               <p:extLst>
                 <p:ext uri="{386F3935-93C4-4BCD-93E2-E3B085C9AB24}">
-                  <p16:designElem xmlns:p16="http://schemas.microsoft.com/office/powerpoint/2015/main" val="1"/>
+                  <p16:designElem xmlns:p16="http://schemas.microsoft.com/office/powerpoint/2015/main" xmlns="" val="1"/>
                 </p:ext>
               </p:extLst>
             </p:nvPr>
@@ -7470,10 +7470,10 @@
             <p:cNvPr id="18" name="Isosceles Triangle 17">
               <a:extLst>
                 <a:ext uri="{FF2B5EF4-FFF2-40B4-BE49-F238E27FC236}">
-                  <a16:creationId xmlns:a16="http://schemas.microsoft.com/office/drawing/2014/main" id="{3E843863-7D25-4C01-9A17-E817CB6D998A}"/>
+                  <a16:creationId xmlns:a16="http://schemas.microsoft.com/office/drawing/2014/main" xmlns="" id="{3E843863-7D25-4C01-9A17-E817CB6D998A}"/>
                 </a:ext>
                 <a:ext uri="{C183D7F6-B498-43B3-948B-1728B52AA6E4}">
-                  <adec:decorative xmlns:adec="http://schemas.microsoft.com/office/drawing/2017/decorative" val="1"/>
+                  <adec:decorative xmlns:adec="http://schemas.microsoft.com/office/drawing/2017/decorative" xmlns="" val="1"/>
                 </a:ext>
               </a:extLst>
             </p:cNvPr>
@@ -7481,7 +7481,7 @@
             <p:nvPr>
               <p:extLst>
                 <p:ext uri="{386F3935-93C4-4BCD-93E2-E3B085C9AB24}">
-                  <p16:designElem xmlns:p16="http://schemas.microsoft.com/office/powerpoint/2015/main" val="1"/>
+                  <p16:designElem xmlns:p16="http://schemas.microsoft.com/office/powerpoint/2015/main" xmlns="" val="1"/>
                 </p:ext>
               </p:extLst>
             </p:nvPr>
@@ -7527,10 +7527,10 @@
           <p:cNvPr id="20" name="Rectangle 19">
             <a:extLst>
               <a:ext uri="{FF2B5EF4-FFF2-40B4-BE49-F238E27FC236}">
-                <a16:creationId xmlns:a16="http://schemas.microsoft.com/office/drawing/2014/main" id="{7941F9B1-B01B-4A84-89D9-B169AEB4E456}"/>
+                <a16:creationId xmlns:a16="http://schemas.microsoft.com/office/drawing/2014/main" xmlns="" id="{7941F9B1-B01B-4A84-89D9-B169AEB4E456}"/>
               </a:ext>
               <a:ext uri="{C183D7F6-B498-43B3-948B-1728B52AA6E4}">
-                <adec:decorative xmlns:adec="http://schemas.microsoft.com/office/drawing/2017/decorative" val="1"/>
+                <adec:decorative xmlns:adec="http://schemas.microsoft.com/office/drawing/2017/decorative" xmlns="" val="1"/>
               </a:ext>
             </a:extLst>
           </p:cNvPr>
@@ -7540,7 +7540,7 @@
           <p:nvPr>
             <p:extLst>
               <p:ext uri="{386F3935-93C4-4BCD-93E2-E3B085C9AB24}">
-                <p16:designElem xmlns:p16="http://schemas.microsoft.com/office/powerpoint/2015/main" val="1"/>
+                <p16:designElem xmlns:p16="http://schemas.microsoft.com/office/powerpoint/2015/main" xmlns="" val="1"/>
               </p:ext>
             </p:extLst>
           </p:nvPr>
@@ -7597,7 +7597,7 @@
           <p:cNvPr id="2" name="slide5">
             <a:extLst>
               <a:ext uri="{FF2B5EF4-FFF2-40B4-BE49-F238E27FC236}">
-                <a16:creationId xmlns:a16="http://schemas.microsoft.com/office/drawing/2014/main" id="{E9850104-D2AB-41C4-BC3C-FD479CE880EB}"/>
+                <a16:creationId xmlns:a16="http://schemas.microsoft.com/office/drawing/2014/main" xmlns="" id="{E9850104-D2AB-41C4-BC3C-FD479CE880EB}"/>
               </a:ext>
             </a:extLst>
           </p:cNvPr>
@@ -7620,8 +7620,8 @@
         </p:blipFill>
         <p:spPr>
           <a:xfrm>
-            <a:off x="2206781" y="1131994"/>
-            <a:ext cx="7780314" cy="4590386"/>
+            <a:off x="1516882" y="807948"/>
+            <a:ext cx="9155187" cy="5401561"/>
           </a:xfrm>
           <a:prstGeom prst="rect">
             <a:avLst/>
@@ -7671,10 +7671,10 @@
           <p:cNvPr id="7" name="Rectangle 6">
             <a:extLst>
               <a:ext uri="{FF2B5EF4-FFF2-40B4-BE49-F238E27FC236}">
-                <a16:creationId xmlns:a16="http://schemas.microsoft.com/office/drawing/2014/main" id="{03E8462A-FEBA-4848-81CC-3F8DA3E477BE}"/>
+                <a16:creationId xmlns:a16="http://schemas.microsoft.com/office/drawing/2014/main" xmlns="" id="{03E8462A-FEBA-4848-81CC-3F8DA3E477BE}"/>
               </a:ext>
               <a:ext uri="{C183D7F6-B498-43B3-948B-1728B52AA6E4}">
-                <adec:decorative xmlns:adec="http://schemas.microsoft.com/office/drawing/2017/decorative" val="1"/>
+                <adec:decorative xmlns:adec="http://schemas.microsoft.com/office/drawing/2017/decorative" xmlns="" val="1"/>
               </a:ext>
             </a:extLst>
           </p:cNvPr>
@@ -7684,7 +7684,7 @@
           <p:nvPr>
             <p:extLst>
               <p:ext uri="{386F3935-93C4-4BCD-93E2-E3B085C9AB24}">
-                <p16:designElem xmlns:p16="http://schemas.microsoft.com/office/powerpoint/2015/main" val="1"/>
+                <p16:designElem xmlns:p16="http://schemas.microsoft.com/office/powerpoint/2015/main" xmlns="" val="1"/>
               </p:ext>
             </p:extLst>
           </p:nvPr>
@@ -7734,10 +7734,10 @@
           <p:cNvPr id="9" name="Group 8">
             <a:extLst>
               <a:ext uri="{FF2B5EF4-FFF2-40B4-BE49-F238E27FC236}">
-                <a16:creationId xmlns:a16="http://schemas.microsoft.com/office/drawing/2014/main" id="{2109F83F-40FE-4DB3-84CC-09FB3340D06D}"/>
+                <a16:creationId xmlns:a16="http://schemas.microsoft.com/office/drawing/2014/main" xmlns="" id="{2109F83F-40FE-4DB3-84CC-09FB3340D06D}"/>
               </a:ext>
               <a:ext uri="{C183D7F6-B498-43B3-948B-1728B52AA6E4}">
-                <adec:decorative xmlns:adec="http://schemas.microsoft.com/office/drawing/2017/decorative" val="1"/>
+                <adec:decorative xmlns:adec="http://schemas.microsoft.com/office/drawing/2017/decorative" xmlns="" val="1"/>
               </a:ext>
             </a:extLst>
           </p:cNvPr>
@@ -7747,7 +7747,7 @@
           <p:nvPr>
             <p:extLst>
               <p:ext uri="{386F3935-93C4-4BCD-93E2-E3B085C9AB24}">
-                <p16:designElem xmlns:p16="http://schemas.microsoft.com/office/powerpoint/2015/main" val="1"/>
+                <p16:designElem xmlns:p16="http://schemas.microsoft.com/office/powerpoint/2015/main" xmlns="" val="1"/>
               </p:ext>
             </p:extLst>
           </p:nvPr>
@@ -7765,10 +7765,10 @@
             <p:cNvPr id="10" name="Straight Connector 9">
               <a:extLst>
                 <a:ext uri="{FF2B5EF4-FFF2-40B4-BE49-F238E27FC236}">
-                  <a16:creationId xmlns:a16="http://schemas.microsoft.com/office/drawing/2014/main" id="{1DE492D7-C3C3-48FF-80C8-37021EA0262F}"/>
+                  <a16:creationId xmlns:a16="http://schemas.microsoft.com/office/drawing/2014/main" xmlns="" id="{1DE492D7-C3C3-48FF-80C8-37021EA0262F}"/>
                 </a:ext>
                 <a:ext uri="{C183D7F6-B498-43B3-948B-1728B52AA6E4}">
-                  <adec:decorative xmlns:adec="http://schemas.microsoft.com/office/drawing/2017/decorative" val="1"/>
+                  <adec:decorative xmlns:adec="http://schemas.microsoft.com/office/drawing/2017/decorative" xmlns="" val="1"/>
                 </a:ext>
               </a:extLst>
             </p:cNvPr>
@@ -7776,7 +7776,7 @@
             <p:nvPr>
               <p:extLst>
                 <p:ext uri="{386F3935-93C4-4BCD-93E2-E3B085C9AB24}">
-                  <p16:designElem xmlns:p16="http://schemas.microsoft.com/office/powerpoint/2015/main" val="1"/>
+                  <p16:designElem xmlns:p16="http://schemas.microsoft.com/office/powerpoint/2015/main" xmlns="" val="1"/>
                 </p:ext>
               </p:extLst>
             </p:nvPr>
@@ -7817,10 +7817,10 @@
             <p:cNvPr id="11" name="Rectangle 23">
               <a:extLst>
                 <a:ext uri="{FF2B5EF4-FFF2-40B4-BE49-F238E27FC236}">
-                  <a16:creationId xmlns:a16="http://schemas.microsoft.com/office/drawing/2014/main" id="{0B30FF97-2E9A-490A-AED2-90BA2E0EC17F}"/>
+                  <a16:creationId xmlns:a16="http://schemas.microsoft.com/office/drawing/2014/main" xmlns="" id="{0B30FF97-2E9A-490A-AED2-90BA2E0EC17F}"/>
                 </a:ext>
                 <a:ext uri="{C183D7F6-B498-43B3-948B-1728B52AA6E4}">
-                  <adec:decorative xmlns:adec="http://schemas.microsoft.com/office/drawing/2017/decorative" val="1"/>
+                  <adec:decorative xmlns:adec="http://schemas.microsoft.com/office/drawing/2017/decorative" xmlns="" val="1"/>
                 </a:ext>
               </a:extLst>
             </p:cNvPr>
@@ -7828,7 +7828,7 @@
             <p:nvPr>
               <p:extLst>
                 <p:ext uri="{386F3935-93C4-4BCD-93E2-E3B085C9AB24}">
-                  <p16:designElem xmlns:p16="http://schemas.microsoft.com/office/powerpoint/2015/main" val="1"/>
+                  <p16:designElem xmlns:p16="http://schemas.microsoft.com/office/powerpoint/2015/main" xmlns="" val="1"/>
                 </p:ext>
               </p:extLst>
             </p:nvPr>
@@ -7895,10 +7895,10 @@
             <p:cNvPr id="12" name="Rectangle 25">
               <a:extLst>
                 <a:ext uri="{FF2B5EF4-FFF2-40B4-BE49-F238E27FC236}">
-                  <a16:creationId xmlns:a16="http://schemas.microsoft.com/office/drawing/2014/main" id="{B6D53C7D-A312-47B6-A66A-230A19CFACA6}"/>
+                  <a16:creationId xmlns:a16="http://schemas.microsoft.com/office/drawing/2014/main" xmlns="" id="{B6D53C7D-A312-47B6-A66A-230A19CFACA6}"/>
                 </a:ext>
                 <a:ext uri="{C183D7F6-B498-43B3-948B-1728B52AA6E4}">
-                  <adec:decorative xmlns:adec="http://schemas.microsoft.com/office/drawing/2017/decorative" val="1"/>
+                  <adec:decorative xmlns:adec="http://schemas.microsoft.com/office/drawing/2017/decorative" xmlns="" val="1"/>
                 </a:ext>
               </a:extLst>
             </p:cNvPr>
@@ -7906,7 +7906,7 @@
             <p:nvPr>
               <p:extLst>
                 <p:ext uri="{386F3935-93C4-4BCD-93E2-E3B085C9AB24}">
-                  <p16:designElem xmlns:p16="http://schemas.microsoft.com/office/powerpoint/2015/main" val="1"/>
+                  <p16:designElem xmlns:p16="http://schemas.microsoft.com/office/powerpoint/2015/main" xmlns="" val="1"/>
                 </p:ext>
               </p:extLst>
             </p:nvPr>
@@ -7973,10 +7973,10 @@
             <p:cNvPr id="13" name="Isosceles Triangle 12">
               <a:extLst>
                 <a:ext uri="{FF2B5EF4-FFF2-40B4-BE49-F238E27FC236}">
-                  <a16:creationId xmlns:a16="http://schemas.microsoft.com/office/drawing/2014/main" id="{9329D58C-0D2E-4A2B-AD6A-9CEE506784A8}"/>
+                  <a16:creationId xmlns:a16="http://schemas.microsoft.com/office/drawing/2014/main" xmlns="" id="{9329D58C-0D2E-4A2B-AD6A-9CEE506784A8}"/>
                 </a:ext>
                 <a:ext uri="{C183D7F6-B498-43B3-948B-1728B52AA6E4}">
-                  <adec:decorative xmlns:adec="http://schemas.microsoft.com/office/drawing/2017/decorative" val="1"/>
+                  <adec:decorative xmlns:adec="http://schemas.microsoft.com/office/drawing/2017/decorative" xmlns="" val="1"/>
                 </a:ext>
               </a:extLst>
             </p:cNvPr>
@@ -7984,7 +7984,7 @@
             <p:nvPr>
               <p:extLst>
                 <p:ext uri="{386F3935-93C4-4BCD-93E2-E3B085C9AB24}">
-                  <p16:designElem xmlns:p16="http://schemas.microsoft.com/office/powerpoint/2015/main" val="1"/>
+                  <p16:designElem xmlns:p16="http://schemas.microsoft.com/office/powerpoint/2015/main" xmlns="" val="1"/>
                 </p:ext>
               </p:extLst>
             </p:nvPr>
@@ -8029,10 +8029,10 @@
             <p:cNvPr id="14" name="Rectangle 27">
               <a:extLst>
                 <a:ext uri="{FF2B5EF4-FFF2-40B4-BE49-F238E27FC236}">
-                  <a16:creationId xmlns:a16="http://schemas.microsoft.com/office/drawing/2014/main" id="{9D446EDE-C690-4461-8BF2-7634808FC8B4}"/>
+                  <a16:creationId xmlns:a16="http://schemas.microsoft.com/office/drawing/2014/main" xmlns="" id="{9D446EDE-C690-4461-8BF2-7634808FC8B4}"/>
                 </a:ext>
                 <a:ext uri="{C183D7F6-B498-43B3-948B-1728B52AA6E4}">
-                  <adec:decorative xmlns:adec="http://schemas.microsoft.com/office/drawing/2017/decorative" val="1"/>
+                  <adec:decorative xmlns:adec="http://schemas.microsoft.com/office/drawing/2017/decorative" xmlns="" val="1"/>
                 </a:ext>
               </a:extLst>
             </p:cNvPr>
@@ -8040,7 +8040,7 @@
             <p:nvPr>
               <p:extLst>
                 <p:ext uri="{386F3935-93C4-4BCD-93E2-E3B085C9AB24}">
-                  <p16:designElem xmlns:p16="http://schemas.microsoft.com/office/powerpoint/2015/main" val="1"/>
+                  <p16:designElem xmlns:p16="http://schemas.microsoft.com/office/powerpoint/2015/main" xmlns="" val="1"/>
                 </p:ext>
               </p:extLst>
             </p:nvPr>
@@ -8108,10 +8108,10 @@
             <p:cNvPr id="15" name="Rectangle 28">
               <a:extLst>
                 <a:ext uri="{FF2B5EF4-FFF2-40B4-BE49-F238E27FC236}">
-                  <a16:creationId xmlns:a16="http://schemas.microsoft.com/office/drawing/2014/main" id="{323F3D34-6531-4AD7-A8C6-195A090281A1}"/>
+                  <a16:creationId xmlns:a16="http://schemas.microsoft.com/office/drawing/2014/main" xmlns="" id="{323F3D34-6531-4AD7-A8C6-195A090281A1}"/>
                 </a:ext>
                 <a:ext uri="{C183D7F6-B498-43B3-948B-1728B52AA6E4}">
-                  <adec:decorative xmlns:adec="http://schemas.microsoft.com/office/drawing/2017/decorative" val="1"/>
+                  <adec:decorative xmlns:adec="http://schemas.microsoft.com/office/drawing/2017/decorative" xmlns="" val="1"/>
                 </a:ext>
               </a:extLst>
             </p:cNvPr>
@@ -8119,7 +8119,7 @@
             <p:nvPr>
               <p:extLst>
                 <p:ext uri="{386F3935-93C4-4BCD-93E2-E3B085C9AB24}">
-                  <p16:designElem xmlns:p16="http://schemas.microsoft.com/office/powerpoint/2015/main" val="1"/>
+                  <p16:designElem xmlns:p16="http://schemas.microsoft.com/office/powerpoint/2015/main" xmlns="" val="1"/>
                 </p:ext>
               </p:extLst>
             </p:nvPr>
@@ -8188,10 +8188,10 @@
             <p:cNvPr id="16" name="Rectangle 29">
               <a:extLst>
                 <a:ext uri="{FF2B5EF4-FFF2-40B4-BE49-F238E27FC236}">
-                  <a16:creationId xmlns:a16="http://schemas.microsoft.com/office/drawing/2014/main" id="{B9B0AE3F-2350-435F-A9B0-C310BF876385}"/>
+                  <a16:creationId xmlns:a16="http://schemas.microsoft.com/office/drawing/2014/main" xmlns="" id="{B9B0AE3F-2350-435F-A9B0-C310BF876385}"/>
                 </a:ext>
                 <a:ext uri="{C183D7F6-B498-43B3-948B-1728B52AA6E4}">
-                  <adec:decorative xmlns:adec="http://schemas.microsoft.com/office/drawing/2017/decorative" val="1"/>
+                  <adec:decorative xmlns:adec="http://schemas.microsoft.com/office/drawing/2017/decorative" xmlns="" val="1"/>
                 </a:ext>
               </a:extLst>
             </p:cNvPr>
@@ -8199,7 +8199,7 @@
             <p:nvPr>
               <p:extLst>
                 <p:ext uri="{386F3935-93C4-4BCD-93E2-E3B085C9AB24}">
-                  <p16:designElem xmlns:p16="http://schemas.microsoft.com/office/powerpoint/2015/main" val="1"/>
+                  <p16:designElem xmlns:p16="http://schemas.microsoft.com/office/powerpoint/2015/main" xmlns="" val="1"/>
                 </p:ext>
               </p:extLst>
             </p:nvPr>
@@ -8266,10 +8266,10 @@
             <p:cNvPr id="17" name="Isosceles Triangle 16">
               <a:extLst>
                 <a:ext uri="{FF2B5EF4-FFF2-40B4-BE49-F238E27FC236}">
-                  <a16:creationId xmlns:a16="http://schemas.microsoft.com/office/drawing/2014/main" id="{4EFA655C-9E50-4C14-A89E-AD7B648E4E2B}"/>
+                  <a16:creationId xmlns:a16="http://schemas.microsoft.com/office/drawing/2014/main" xmlns="" id="{4EFA655C-9E50-4C14-A89E-AD7B648E4E2B}"/>
                 </a:ext>
                 <a:ext uri="{C183D7F6-B498-43B3-948B-1728B52AA6E4}">
-                  <adec:decorative xmlns:adec="http://schemas.microsoft.com/office/drawing/2017/decorative" val="1"/>
+                  <adec:decorative xmlns:adec="http://schemas.microsoft.com/office/drawing/2017/decorative" xmlns="" val="1"/>
                 </a:ext>
               </a:extLst>
             </p:cNvPr>
@@ -8277,7 +8277,7 @@
             <p:nvPr>
               <p:extLst>
                 <p:ext uri="{386F3935-93C4-4BCD-93E2-E3B085C9AB24}">
-                  <p16:designElem xmlns:p16="http://schemas.microsoft.com/office/powerpoint/2015/main" val="1"/>
+                  <p16:designElem xmlns:p16="http://schemas.microsoft.com/office/powerpoint/2015/main" xmlns="" val="1"/>
                 </p:ext>
               </p:extLst>
             </p:nvPr>
@@ -8322,10 +8322,10 @@
             <p:cNvPr id="18" name="Isosceles Triangle 17">
               <a:extLst>
                 <a:ext uri="{FF2B5EF4-FFF2-40B4-BE49-F238E27FC236}">
-                  <a16:creationId xmlns:a16="http://schemas.microsoft.com/office/drawing/2014/main" id="{3E843863-7D25-4C01-9A17-E817CB6D998A}"/>
+                  <a16:creationId xmlns:a16="http://schemas.microsoft.com/office/drawing/2014/main" xmlns="" id="{3E843863-7D25-4C01-9A17-E817CB6D998A}"/>
                 </a:ext>
                 <a:ext uri="{C183D7F6-B498-43B3-948B-1728B52AA6E4}">
-                  <adec:decorative xmlns:adec="http://schemas.microsoft.com/office/drawing/2017/decorative" val="1"/>
+                  <adec:decorative xmlns:adec="http://schemas.microsoft.com/office/drawing/2017/decorative" xmlns="" val="1"/>
                 </a:ext>
               </a:extLst>
             </p:cNvPr>
@@ -8333,7 +8333,7 @@
             <p:nvPr>
               <p:extLst>
                 <p:ext uri="{386F3935-93C4-4BCD-93E2-E3B085C9AB24}">
-                  <p16:designElem xmlns:p16="http://schemas.microsoft.com/office/powerpoint/2015/main" val="1"/>
+                  <p16:designElem xmlns:p16="http://schemas.microsoft.com/office/powerpoint/2015/main" xmlns="" val="1"/>
                 </p:ext>
               </p:extLst>
             </p:nvPr>
@@ -8379,10 +8379,10 @@
           <p:cNvPr id="20" name="Rectangle 19">
             <a:extLst>
               <a:ext uri="{FF2B5EF4-FFF2-40B4-BE49-F238E27FC236}">
-                <a16:creationId xmlns:a16="http://schemas.microsoft.com/office/drawing/2014/main" id="{7941F9B1-B01B-4A84-89D9-B169AEB4E456}"/>
+                <a16:creationId xmlns:a16="http://schemas.microsoft.com/office/drawing/2014/main" xmlns="" id="{7941F9B1-B01B-4A84-89D9-B169AEB4E456}"/>
               </a:ext>
               <a:ext uri="{C183D7F6-B498-43B3-948B-1728B52AA6E4}">
-                <adec:decorative xmlns:adec="http://schemas.microsoft.com/office/drawing/2017/decorative" val="1"/>
+                <adec:decorative xmlns:adec="http://schemas.microsoft.com/office/drawing/2017/decorative" xmlns="" val="1"/>
               </a:ext>
             </a:extLst>
           </p:cNvPr>
@@ -8392,7 +8392,7 @@
           <p:nvPr>
             <p:extLst>
               <p:ext uri="{386F3935-93C4-4BCD-93E2-E3B085C9AB24}">
-                <p16:designElem xmlns:p16="http://schemas.microsoft.com/office/powerpoint/2015/main" val="1"/>
+                <p16:designElem xmlns:p16="http://schemas.microsoft.com/office/powerpoint/2015/main" xmlns="" val="1"/>
               </p:ext>
             </p:extLst>
           </p:nvPr>
@@ -8449,7 +8449,7 @@
           <p:cNvPr id="2" name="slide5">
             <a:extLst>
               <a:ext uri="{FF2B5EF4-FFF2-40B4-BE49-F238E27FC236}">
-                <a16:creationId xmlns:a16="http://schemas.microsoft.com/office/drawing/2014/main" id="{94182144-0C60-4F43-BA64-AB22E6FA1BE4}"/>
+                <a16:creationId xmlns:a16="http://schemas.microsoft.com/office/drawing/2014/main" xmlns="" id="{94182144-0C60-4F43-BA64-AB22E6FA1BE4}"/>
               </a:ext>
             </a:extLst>
           </p:cNvPr>
@@ -8472,8 +8472,8 @@
         </p:blipFill>
         <p:spPr>
           <a:xfrm>
-            <a:off x="1979999" y="1131994"/>
-            <a:ext cx="8233878" cy="4590386"/>
+            <a:off x="1363526" y="640621"/>
+            <a:ext cx="9731738" cy="5425444"/>
           </a:xfrm>
           <a:prstGeom prst="rect">
             <a:avLst/>
@@ -8523,10 +8523,10 @@
           <p:cNvPr id="7" name="Rectangle 6">
             <a:extLst>
               <a:ext uri="{FF2B5EF4-FFF2-40B4-BE49-F238E27FC236}">
-                <a16:creationId xmlns:a16="http://schemas.microsoft.com/office/drawing/2014/main" id="{03E8462A-FEBA-4848-81CC-3F8DA3E477BE}"/>
+                <a16:creationId xmlns:a16="http://schemas.microsoft.com/office/drawing/2014/main" xmlns="" id="{03E8462A-FEBA-4848-81CC-3F8DA3E477BE}"/>
               </a:ext>
               <a:ext uri="{C183D7F6-B498-43B3-948B-1728B52AA6E4}">
-                <adec:decorative xmlns:adec="http://schemas.microsoft.com/office/drawing/2017/decorative" val="1"/>
+                <adec:decorative xmlns:adec="http://schemas.microsoft.com/office/drawing/2017/decorative" xmlns="" val="1"/>
               </a:ext>
             </a:extLst>
           </p:cNvPr>
@@ -8536,7 +8536,7 @@
           <p:nvPr>
             <p:extLst>
               <p:ext uri="{386F3935-93C4-4BCD-93E2-E3B085C9AB24}">
-                <p16:designElem xmlns:p16="http://schemas.microsoft.com/office/powerpoint/2015/main" val="1"/>
+                <p16:designElem xmlns:p16="http://schemas.microsoft.com/office/powerpoint/2015/main" xmlns="" val="1"/>
               </p:ext>
             </p:extLst>
           </p:nvPr>
@@ -8586,10 +8586,10 @@
           <p:cNvPr id="9" name="Group 8">
             <a:extLst>
               <a:ext uri="{FF2B5EF4-FFF2-40B4-BE49-F238E27FC236}">
-                <a16:creationId xmlns:a16="http://schemas.microsoft.com/office/drawing/2014/main" id="{2109F83F-40FE-4DB3-84CC-09FB3340D06D}"/>
+                <a16:creationId xmlns:a16="http://schemas.microsoft.com/office/drawing/2014/main" xmlns="" id="{2109F83F-40FE-4DB3-84CC-09FB3340D06D}"/>
               </a:ext>
               <a:ext uri="{C183D7F6-B498-43B3-948B-1728B52AA6E4}">
-                <adec:decorative xmlns:adec="http://schemas.microsoft.com/office/drawing/2017/decorative" val="1"/>
+                <adec:decorative xmlns:adec="http://schemas.microsoft.com/office/drawing/2017/decorative" xmlns="" val="1"/>
               </a:ext>
             </a:extLst>
           </p:cNvPr>
@@ -8599,7 +8599,7 @@
           <p:nvPr>
             <p:extLst>
               <p:ext uri="{386F3935-93C4-4BCD-93E2-E3B085C9AB24}">
-                <p16:designElem xmlns:p16="http://schemas.microsoft.com/office/powerpoint/2015/main" val="1"/>
+                <p16:designElem xmlns:p16="http://schemas.microsoft.com/office/powerpoint/2015/main" xmlns="" val="1"/>
               </p:ext>
             </p:extLst>
           </p:nvPr>
@@ -8617,10 +8617,10 @@
             <p:cNvPr id="10" name="Straight Connector 9">
               <a:extLst>
                 <a:ext uri="{FF2B5EF4-FFF2-40B4-BE49-F238E27FC236}">
-                  <a16:creationId xmlns:a16="http://schemas.microsoft.com/office/drawing/2014/main" id="{1DE492D7-C3C3-48FF-80C8-37021EA0262F}"/>
+                  <a16:creationId xmlns:a16="http://schemas.microsoft.com/office/drawing/2014/main" xmlns="" id="{1DE492D7-C3C3-48FF-80C8-37021EA0262F}"/>
                 </a:ext>
                 <a:ext uri="{C183D7F6-B498-43B3-948B-1728B52AA6E4}">
-                  <adec:decorative xmlns:adec="http://schemas.microsoft.com/office/drawing/2017/decorative" val="1"/>
+                  <adec:decorative xmlns:adec="http://schemas.microsoft.com/office/drawing/2017/decorative" xmlns="" val="1"/>
                 </a:ext>
               </a:extLst>
             </p:cNvPr>
@@ -8628,7 +8628,7 @@
             <p:nvPr>
               <p:extLst>
                 <p:ext uri="{386F3935-93C4-4BCD-93E2-E3B085C9AB24}">
-                  <p16:designElem xmlns:p16="http://schemas.microsoft.com/office/powerpoint/2015/main" val="1"/>
+                  <p16:designElem xmlns:p16="http://schemas.microsoft.com/office/powerpoint/2015/main" xmlns="" val="1"/>
                 </p:ext>
               </p:extLst>
             </p:nvPr>
@@ -8669,10 +8669,10 @@
             <p:cNvPr id="11" name="Rectangle 23">
               <a:extLst>
                 <a:ext uri="{FF2B5EF4-FFF2-40B4-BE49-F238E27FC236}">
-                  <a16:creationId xmlns:a16="http://schemas.microsoft.com/office/drawing/2014/main" id="{0B30FF97-2E9A-490A-AED2-90BA2E0EC17F}"/>
+                  <a16:creationId xmlns:a16="http://schemas.microsoft.com/office/drawing/2014/main" xmlns="" id="{0B30FF97-2E9A-490A-AED2-90BA2E0EC17F}"/>
                 </a:ext>
                 <a:ext uri="{C183D7F6-B498-43B3-948B-1728B52AA6E4}">
-                  <adec:decorative xmlns:adec="http://schemas.microsoft.com/office/drawing/2017/decorative" val="1"/>
+                  <adec:decorative xmlns:adec="http://schemas.microsoft.com/office/drawing/2017/decorative" xmlns="" val="1"/>
                 </a:ext>
               </a:extLst>
             </p:cNvPr>
@@ -8680,7 +8680,7 @@
             <p:nvPr>
               <p:extLst>
                 <p:ext uri="{386F3935-93C4-4BCD-93E2-E3B085C9AB24}">
-                  <p16:designElem xmlns:p16="http://schemas.microsoft.com/office/powerpoint/2015/main" val="1"/>
+                  <p16:designElem xmlns:p16="http://schemas.microsoft.com/office/powerpoint/2015/main" xmlns="" val="1"/>
                 </p:ext>
               </p:extLst>
             </p:nvPr>
@@ -8747,10 +8747,10 @@
             <p:cNvPr id="12" name="Rectangle 25">
               <a:extLst>
                 <a:ext uri="{FF2B5EF4-FFF2-40B4-BE49-F238E27FC236}">
-                  <a16:creationId xmlns:a16="http://schemas.microsoft.com/office/drawing/2014/main" id="{B6D53C7D-A312-47B6-A66A-230A19CFACA6}"/>
+                  <a16:creationId xmlns:a16="http://schemas.microsoft.com/office/drawing/2014/main" xmlns="" id="{B6D53C7D-A312-47B6-A66A-230A19CFACA6}"/>
                 </a:ext>
                 <a:ext uri="{C183D7F6-B498-43B3-948B-1728B52AA6E4}">
-                  <adec:decorative xmlns:adec="http://schemas.microsoft.com/office/drawing/2017/decorative" val="1"/>
+                  <adec:decorative xmlns:adec="http://schemas.microsoft.com/office/drawing/2017/decorative" xmlns="" val="1"/>
                 </a:ext>
               </a:extLst>
             </p:cNvPr>
@@ -8758,7 +8758,7 @@
             <p:nvPr>
               <p:extLst>
                 <p:ext uri="{386F3935-93C4-4BCD-93E2-E3B085C9AB24}">
-                  <p16:designElem xmlns:p16="http://schemas.microsoft.com/office/powerpoint/2015/main" val="1"/>
+                  <p16:designElem xmlns:p16="http://schemas.microsoft.com/office/powerpoint/2015/main" xmlns="" val="1"/>
                 </p:ext>
               </p:extLst>
             </p:nvPr>
@@ -8825,10 +8825,10 @@
             <p:cNvPr id="13" name="Isosceles Triangle 12">
               <a:extLst>
                 <a:ext uri="{FF2B5EF4-FFF2-40B4-BE49-F238E27FC236}">
-                  <a16:creationId xmlns:a16="http://schemas.microsoft.com/office/drawing/2014/main" id="{9329D58C-0D2E-4A2B-AD6A-9CEE506784A8}"/>
+                  <a16:creationId xmlns:a16="http://schemas.microsoft.com/office/drawing/2014/main" xmlns="" id="{9329D58C-0D2E-4A2B-AD6A-9CEE506784A8}"/>
                 </a:ext>
                 <a:ext uri="{C183D7F6-B498-43B3-948B-1728B52AA6E4}">
-                  <adec:decorative xmlns:adec="http://schemas.microsoft.com/office/drawing/2017/decorative" val="1"/>
+                  <adec:decorative xmlns:adec="http://schemas.microsoft.com/office/drawing/2017/decorative" xmlns="" val="1"/>
                 </a:ext>
               </a:extLst>
             </p:cNvPr>
@@ -8836,7 +8836,7 @@
             <p:nvPr>
               <p:extLst>
                 <p:ext uri="{386F3935-93C4-4BCD-93E2-E3B085C9AB24}">
-                  <p16:designElem xmlns:p16="http://schemas.microsoft.com/office/powerpoint/2015/main" val="1"/>
+                  <p16:designElem xmlns:p16="http://schemas.microsoft.com/office/powerpoint/2015/main" xmlns="" val="1"/>
                 </p:ext>
               </p:extLst>
             </p:nvPr>
@@ -8881,10 +8881,10 @@
             <p:cNvPr id="14" name="Rectangle 27">
               <a:extLst>
                 <a:ext uri="{FF2B5EF4-FFF2-40B4-BE49-F238E27FC236}">
-                  <a16:creationId xmlns:a16="http://schemas.microsoft.com/office/drawing/2014/main" id="{9D446EDE-C690-4461-8BF2-7634808FC8B4}"/>
+                  <a16:creationId xmlns:a16="http://schemas.microsoft.com/office/drawing/2014/main" xmlns="" id="{9D446EDE-C690-4461-8BF2-7634808FC8B4}"/>
                 </a:ext>
                 <a:ext uri="{C183D7F6-B498-43B3-948B-1728B52AA6E4}">
-                  <adec:decorative xmlns:adec="http://schemas.microsoft.com/office/drawing/2017/decorative" val="1"/>
+                  <adec:decorative xmlns:adec="http://schemas.microsoft.com/office/drawing/2017/decorative" xmlns="" val="1"/>
                 </a:ext>
               </a:extLst>
             </p:cNvPr>
@@ -8892,7 +8892,7 @@
             <p:nvPr>
               <p:extLst>
                 <p:ext uri="{386F3935-93C4-4BCD-93E2-E3B085C9AB24}">
-                  <p16:designElem xmlns:p16="http://schemas.microsoft.com/office/powerpoint/2015/main" val="1"/>
+                  <p16:designElem xmlns:p16="http://schemas.microsoft.com/office/powerpoint/2015/main" xmlns="" val="1"/>
                 </p:ext>
               </p:extLst>
             </p:nvPr>
@@ -8960,10 +8960,10 @@
             <p:cNvPr id="15" name="Rectangle 28">
               <a:extLst>
                 <a:ext uri="{FF2B5EF4-FFF2-40B4-BE49-F238E27FC236}">
-                  <a16:creationId xmlns:a16="http://schemas.microsoft.com/office/drawing/2014/main" id="{323F3D34-6531-4AD7-A8C6-195A090281A1}"/>
+                  <a16:creationId xmlns:a16="http://schemas.microsoft.com/office/drawing/2014/main" xmlns="" id="{323F3D34-6531-4AD7-A8C6-195A090281A1}"/>
                 </a:ext>
                 <a:ext uri="{C183D7F6-B498-43B3-948B-1728B52AA6E4}">
-                  <adec:decorative xmlns:adec="http://schemas.microsoft.com/office/drawing/2017/decorative" val="1"/>
+                  <adec:decorative xmlns:adec="http://schemas.microsoft.com/office/drawing/2017/decorative" xmlns="" val="1"/>
                 </a:ext>
               </a:extLst>
             </p:cNvPr>
@@ -8971,7 +8971,7 @@
             <p:nvPr>
               <p:extLst>
                 <p:ext uri="{386F3935-93C4-4BCD-93E2-E3B085C9AB24}">
-                  <p16:designElem xmlns:p16="http://schemas.microsoft.com/office/powerpoint/2015/main" val="1"/>
+                  <p16:designElem xmlns:p16="http://schemas.microsoft.com/office/powerpoint/2015/main" xmlns="" val="1"/>
                 </p:ext>
               </p:extLst>
             </p:nvPr>
@@ -9040,10 +9040,10 @@
             <p:cNvPr id="16" name="Rectangle 29">
               <a:extLst>
                 <a:ext uri="{FF2B5EF4-FFF2-40B4-BE49-F238E27FC236}">
-                  <a16:creationId xmlns:a16="http://schemas.microsoft.com/office/drawing/2014/main" id="{B9B0AE3F-2350-435F-A9B0-C310BF876385}"/>
+                  <a16:creationId xmlns:a16="http://schemas.microsoft.com/office/drawing/2014/main" xmlns="" id="{B9B0AE3F-2350-435F-A9B0-C310BF876385}"/>
                 </a:ext>
                 <a:ext uri="{C183D7F6-B498-43B3-948B-1728B52AA6E4}">
-                  <adec:decorative xmlns:adec="http://schemas.microsoft.com/office/drawing/2017/decorative" val="1"/>
+                  <adec:decorative xmlns:adec="http://schemas.microsoft.com/office/drawing/2017/decorative" xmlns="" val="1"/>
                 </a:ext>
               </a:extLst>
             </p:cNvPr>
@@ -9051,7 +9051,7 @@
             <p:nvPr>
               <p:extLst>
                 <p:ext uri="{386F3935-93C4-4BCD-93E2-E3B085C9AB24}">
-                  <p16:designElem xmlns:p16="http://schemas.microsoft.com/office/powerpoint/2015/main" val="1"/>
+                  <p16:designElem xmlns:p16="http://schemas.microsoft.com/office/powerpoint/2015/main" xmlns="" val="1"/>
                 </p:ext>
               </p:extLst>
             </p:nvPr>
@@ -9118,10 +9118,10 @@
             <p:cNvPr id="17" name="Isosceles Triangle 16">
               <a:extLst>
                 <a:ext uri="{FF2B5EF4-FFF2-40B4-BE49-F238E27FC236}">
-                  <a16:creationId xmlns:a16="http://schemas.microsoft.com/office/drawing/2014/main" id="{4EFA655C-9E50-4C14-A89E-AD7B648E4E2B}"/>
+                  <a16:creationId xmlns:a16="http://schemas.microsoft.com/office/drawing/2014/main" xmlns="" id="{4EFA655C-9E50-4C14-A89E-AD7B648E4E2B}"/>
                 </a:ext>
                 <a:ext uri="{C183D7F6-B498-43B3-948B-1728B52AA6E4}">
-                  <adec:decorative xmlns:adec="http://schemas.microsoft.com/office/drawing/2017/decorative" val="1"/>
+                  <adec:decorative xmlns:adec="http://schemas.microsoft.com/office/drawing/2017/decorative" xmlns="" val="1"/>
                 </a:ext>
               </a:extLst>
             </p:cNvPr>
@@ -9129,7 +9129,7 @@
             <p:nvPr>
               <p:extLst>
                 <p:ext uri="{386F3935-93C4-4BCD-93E2-E3B085C9AB24}">
-                  <p16:designElem xmlns:p16="http://schemas.microsoft.com/office/powerpoint/2015/main" val="1"/>
+                  <p16:designElem xmlns:p16="http://schemas.microsoft.com/office/powerpoint/2015/main" xmlns="" val="1"/>
                 </p:ext>
               </p:extLst>
             </p:nvPr>
@@ -9174,10 +9174,10 @@
             <p:cNvPr id="18" name="Isosceles Triangle 17">
               <a:extLst>
                 <a:ext uri="{FF2B5EF4-FFF2-40B4-BE49-F238E27FC236}">
-                  <a16:creationId xmlns:a16="http://schemas.microsoft.com/office/drawing/2014/main" id="{3E843863-7D25-4C01-9A17-E817CB6D998A}"/>
+                  <a16:creationId xmlns:a16="http://schemas.microsoft.com/office/drawing/2014/main" xmlns="" id="{3E843863-7D25-4C01-9A17-E817CB6D998A}"/>
                 </a:ext>
                 <a:ext uri="{C183D7F6-B498-43B3-948B-1728B52AA6E4}">
-                  <adec:decorative xmlns:adec="http://schemas.microsoft.com/office/drawing/2017/decorative" val="1"/>
+                  <adec:decorative xmlns:adec="http://schemas.microsoft.com/office/drawing/2017/decorative" xmlns="" val="1"/>
                 </a:ext>
               </a:extLst>
             </p:cNvPr>
@@ -9185,7 +9185,7 @@
             <p:nvPr>
               <p:extLst>
                 <p:ext uri="{386F3935-93C4-4BCD-93E2-E3B085C9AB24}">
-                  <p16:designElem xmlns:p16="http://schemas.microsoft.com/office/powerpoint/2015/main" val="1"/>
+                  <p16:designElem xmlns:p16="http://schemas.microsoft.com/office/powerpoint/2015/main" xmlns="" val="1"/>
                 </p:ext>
               </p:extLst>
             </p:nvPr>
@@ -9231,10 +9231,10 @@
           <p:cNvPr id="20" name="Rectangle 19">
             <a:extLst>
               <a:ext uri="{FF2B5EF4-FFF2-40B4-BE49-F238E27FC236}">
-                <a16:creationId xmlns:a16="http://schemas.microsoft.com/office/drawing/2014/main" id="{7941F9B1-B01B-4A84-89D9-B169AEB4E456}"/>
+                <a16:creationId xmlns:a16="http://schemas.microsoft.com/office/drawing/2014/main" xmlns="" id="{7941F9B1-B01B-4A84-89D9-B169AEB4E456}"/>
               </a:ext>
               <a:ext uri="{C183D7F6-B498-43B3-948B-1728B52AA6E4}">
-                <adec:decorative xmlns:adec="http://schemas.microsoft.com/office/drawing/2017/decorative" val="1"/>
+                <adec:decorative xmlns:adec="http://schemas.microsoft.com/office/drawing/2017/decorative" xmlns="" val="1"/>
               </a:ext>
             </a:extLst>
           </p:cNvPr>
@@ -9244,7 +9244,7 @@
           <p:nvPr>
             <p:extLst>
               <p:ext uri="{386F3935-93C4-4BCD-93E2-E3B085C9AB24}">
-                <p16:designElem xmlns:p16="http://schemas.microsoft.com/office/powerpoint/2015/main" val="1"/>
+                <p16:designElem xmlns:p16="http://schemas.microsoft.com/office/powerpoint/2015/main" xmlns="" val="1"/>
               </p:ext>
             </p:extLst>
           </p:nvPr>
@@ -9301,7 +9301,7 @@
           <p:cNvPr id="2" name="slide5">
             <a:extLst>
               <a:ext uri="{FF2B5EF4-FFF2-40B4-BE49-F238E27FC236}">
-                <a16:creationId xmlns:a16="http://schemas.microsoft.com/office/drawing/2014/main" id="{CB09CC84-714C-413C-8D43-B84CF370BCBF}"/>
+                <a16:creationId xmlns:a16="http://schemas.microsoft.com/office/drawing/2014/main" xmlns="" id="{CB09CC84-714C-413C-8D43-B84CF370BCBF}"/>
               </a:ext>
             </a:extLst>
           </p:cNvPr>
@@ -9324,8 +9324,8 @@
         </p:blipFill>
         <p:spPr>
           <a:xfrm>
-            <a:off x="1979999" y="1131994"/>
-            <a:ext cx="8233878" cy="4590386"/>
+            <a:off x="1338943" y="667929"/>
+            <a:ext cx="9707336" cy="5411839"/>
           </a:xfrm>
           <a:prstGeom prst="rect">
             <a:avLst/>
@@ -9375,10 +9375,10 @@
           <p:cNvPr id="8" name="Rectangle 7">
             <a:extLst>
               <a:ext uri="{FF2B5EF4-FFF2-40B4-BE49-F238E27FC236}">
-                <a16:creationId xmlns:a16="http://schemas.microsoft.com/office/drawing/2014/main" id="{03E8462A-FEBA-4848-81CC-3F8DA3E477BE}"/>
+                <a16:creationId xmlns:a16="http://schemas.microsoft.com/office/drawing/2014/main" xmlns="" id="{03E8462A-FEBA-4848-81CC-3F8DA3E477BE}"/>
               </a:ext>
               <a:ext uri="{C183D7F6-B498-43B3-948B-1728B52AA6E4}">
-                <adec:decorative xmlns:adec="http://schemas.microsoft.com/office/drawing/2017/decorative" val="1"/>
+                <adec:decorative xmlns:adec="http://schemas.microsoft.com/office/drawing/2017/decorative" xmlns="" val="1"/>
               </a:ext>
             </a:extLst>
           </p:cNvPr>
@@ -9388,7 +9388,7 @@
           <p:nvPr>
             <p:extLst>
               <p:ext uri="{386F3935-93C4-4BCD-93E2-E3B085C9AB24}">
-                <p16:designElem xmlns:p16="http://schemas.microsoft.com/office/powerpoint/2015/main" val="1"/>
+                <p16:designElem xmlns:p16="http://schemas.microsoft.com/office/powerpoint/2015/main" xmlns="" val="1"/>
               </p:ext>
             </p:extLst>
           </p:nvPr>
@@ -9438,10 +9438,10 @@
           <p:cNvPr id="10" name="Group 9">
             <a:extLst>
               <a:ext uri="{FF2B5EF4-FFF2-40B4-BE49-F238E27FC236}">
-                <a16:creationId xmlns:a16="http://schemas.microsoft.com/office/drawing/2014/main" id="{2109F83F-40FE-4DB3-84CC-09FB3340D06D}"/>
+                <a16:creationId xmlns:a16="http://schemas.microsoft.com/office/drawing/2014/main" xmlns="" id="{2109F83F-40FE-4DB3-84CC-09FB3340D06D}"/>
               </a:ext>
               <a:ext uri="{C183D7F6-B498-43B3-948B-1728B52AA6E4}">
-                <adec:decorative xmlns:adec="http://schemas.microsoft.com/office/drawing/2017/decorative" val="1"/>
+                <adec:decorative xmlns:adec="http://schemas.microsoft.com/office/drawing/2017/decorative" xmlns="" val="1"/>
               </a:ext>
             </a:extLst>
           </p:cNvPr>
@@ -9451,7 +9451,7 @@
           <p:nvPr>
             <p:extLst>
               <p:ext uri="{386F3935-93C4-4BCD-93E2-E3B085C9AB24}">
-                <p16:designElem xmlns:p16="http://schemas.microsoft.com/office/powerpoint/2015/main" val="1"/>
+                <p16:designElem xmlns:p16="http://schemas.microsoft.com/office/powerpoint/2015/main" xmlns="" val="1"/>
               </p:ext>
             </p:extLst>
           </p:nvPr>
@@ -9469,10 +9469,10 @@
             <p:cNvPr id="11" name="Straight Connector 10">
               <a:extLst>
                 <a:ext uri="{FF2B5EF4-FFF2-40B4-BE49-F238E27FC236}">
-                  <a16:creationId xmlns:a16="http://schemas.microsoft.com/office/drawing/2014/main" id="{1DE492D7-C3C3-48FF-80C8-37021EA0262F}"/>
+                  <a16:creationId xmlns:a16="http://schemas.microsoft.com/office/drawing/2014/main" xmlns="" id="{1DE492D7-C3C3-48FF-80C8-37021EA0262F}"/>
                 </a:ext>
                 <a:ext uri="{C183D7F6-B498-43B3-948B-1728B52AA6E4}">
-                  <adec:decorative xmlns:adec="http://schemas.microsoft.com/office/drawing/2017/decorative" val="1"/>
+                  <adec:decorative xmlns:adec="http://schemas.microsoft.com/office/drawing/2017/decorative" xmlns="" val="1"/>
                 </a:ext>
               </a:extLst>
             </p:cNvPr>
@@ -9480,7 +9480,7 @@
             <p:nvPr>
               <p:extLst>
                 <p:ext uri="{386F3935-93C4-4BCD-93E2-E3B085C9AB24}">
-                  <p16:designElem xmlns:p16="http://schemas.microsoft.com/office/powerpoint/2015/main" val="1"/>
+                  <p16:designElem xmlns:p16="http://schemas.microsoft.com/office/powerpoint/2015/main" xmlns="" val="1"/>
                 </p:ext>
               </p:extLst>
             </p:nvPr>
@@ -9521,10 +9521,10 @@
             <p:cNvPr id="12" name="Rectangle 23">
               <a:extLst>
                 <a:ext uri="{FF2B5EF4-FFF2-40B4-BE49-F238E27FC236}">
-                  <a16:creationId xmlns:a16="http://schemas.microsoft.com/office/drawing/2014/main" id="{0B30FF97-2E9A-490A-AED2-90BA2E0EC17F}"/>
+                  <a16:creationId xmlns:a16="http://schemas.microsoft.com/office/drawing/2014/main" xmlns="" id="{0B30FF97-2E9A-490A-AED2-90BA2E0EC17F}"/>
                 </a:ext>
                 <a:ext uri="{C183D7F6-B498-43B3-948B-1728B52AA6E4}">
-                  <adec:decorative xmlns:adec="http://schemas.microsoft.com/office/drawing/2017/decorative" val="1"/>
+                  <adec:decorative xmlns:adec="http://schemas.microsoft.com/office/drawing/2017/decorative" xmlns="" val="1"/>
                 </a:ext>
               </a:extLst>
             </p:cNvPr>
@@ -9532,7 +9532,7 @@
             <p:nvPr>
               <p:extLst>
                 <p:ext uri="{386F3935-93C4-4BCD-93E2-E3B085C9AB24}">
-                  <p16:designElem xmlns:p16="http://schemas.microsoft.com/office/powerpoint/2015/main" val="1"/>
+                  <p16:designElem xmlns:p16="http://schemas.microsoft.com/office/powerpoint/2015/main" xmlns="" val="1"/>
                 </p:ext>
               </p:extLst>
             </p:nvPr>
@@ -9599,10 +9599,10 @@
             <p:cNvPr id="13" name="Rectangle 25">
               <a:extLst>
                 <a:ext uri="{FF2B5EF4-FFF2-40B4-BE49-F238E27FC236}">
-                  <a16:creationId xmlns:a16="http://schemas.microsoft.com/office/drawing/2014/main" id="{B6D53C7D-A312-47B6-A66A-230A19CFACA6}"/>
+                  <a16:creationId xmlns:a16="http://schemas.microsoft.com/office/drawing/2014/main" xmlns="" id="{B6D53C7D-A312-47B6-A66A-230A19CFACA6}"/>
                 </a:ext>
                 <a:ext uri="{C183D7F6-B498-43B3-948B-1728B52AA6E4}">
-                  <adec:decorative xmlns:adec="http://schemas.microsoft.com/office/drawing/2017/decorative" val="1"/>
+                  <adec:decorative xmlns:adec="http://schemas.microsoft.com/office/drawing/2017/decorative" xmlns="" val="1"/>
                 </a:ext>
               </a:extLst>
             </p:cNvPr>
@@ -9610,7 +9610,7 @@
             <p:nvPr>
               <p:extLst>
                 <p:ext uri="{386F3935-93C4-4BCD-93E2-E3B085C9AB24}">
-                  <p16:designElem xmlns:p16="http://schemas.microsoft.com/office/powerpoint/2015/main" val="1"/>
+                  <p16:designElem xmlns:p16="http://schemas.microsoft.com/office/powerpoint/2015/main" xmlns="" val="1"/>
                 </p:ext>
               </p:extLst>
             </p:nvPr>
@@ -9677,10 +9677,10 @@
             <p:cNvPr id="14" name="Isosceles Triangle 13">
               <a:extLst>
                 <a:ext uri="{FF2B5EF4-FFF2-40B4-BE49-F238E27FC236}">
-                  <a16:creationId xmlns:a16="http://schemas.microsoft.com/office/drawing/2014/main" id="{9329D58C-0D2E-4A2B-AD6A-9CEE506784A8}"/>
+                  <a16:creationId xmlns:a16="http://schemas.microsoft.com/office/drawing/2014/main" xmlns="" id="{9329D58C-0D2E-4A2B-AD6A-9CEE506784A8}"/>
                 </a:ext>
                 <a:ext uri="{C183D7F6-B498-43B3-948B-1728B52AA6E4}">
-                  <adec:decorative xmlns:adec="http://schemas.microsoft.com/office/drawing/2017/decorative" val="1"/>
+                  <adec:decorative xmlns:adec="http://schemas.microsoft.com/office/drawing/2017/decorative" xmlns="" val="1"/>
                 </a:ext>
               </a:extLst>
             </p:cNvPr>
@@ -9688,7 +9688,7 @@
             <p:nvPr>
               <p:extLst>
                 <p:ext uri="{386F3935-93C4-4BCD-93E2-E3B085C9AB24}">
-                  <p16:designElem xmlns:p16="http://schemas.microsoft.com/office/powerpoint/2015/main" val="1"/>
+                  <p16:designElem xmlns:p16="http://schemas.microsoft.com/office/powerpoint/2015/main" xmlns="" val="1"/>
                 </p:ext>
               </p:extLst>
             </p:nvPr>
@@ -9733,10 +9733,10 @@
             <p:cNvPr id="15" name="Rectangle 27">
               <a:extLst>
                 <a:ext uri="{FF2B5EF4-FFF2-40B4-BE49-F238E27FC236}">
-                  <a16:creationId xmlns:a16="http://schemas.microsoft.com/office/drawing/2014/main" id="{9D446EDE-C690-4461-8BF2-7634808FC8B4}"/>
+                  <a16:creationId xmlns:a16="http://schemas.microsoft.com/office/drawing/2014/main" xmlns="" id="{9D446EDE-C690-4461-8BF2-7634808FC8B4}"/>
                 </a:ext>
                 <a:ext uri="{C183D7F6-B498-43B3-948B-1728B52AA6E4}">
-                  <adec:decorative xmlns:adec="http://schemas.microsoft.com/office/drawing/2017/decorative" val="1"/>
+                  <adec:decorative xmlns:adec="http://schemas.microsoft.com/office/drawing/2017/decorative" xmlns="" val="1"/>
                 </a:ext>
               </a:extLst>
             </p:cNvPr>
@@ -9744,7 +9744,7 @@
             <p:nvPr>
               <p:extLst>
                 <p:ext uri="{386F3935-93C4-4BCD-93E2-E3B085C9AB24}">
-                  <p16:designElem xmlns:p16="http://schemas.microsoft.com/office/powerpoint/2015/main" val="1"/>
+                  <p16:designElem xmlns:p16="http://schemas.microsoft.com/office/powerpoint/2015/main" xmlns="" val="1"/>
                 </p:ext>
               </p:extLst>
             </p:nvPr>
@@ -9812,10 +9812,10 @@
             <p:cNvPr id="16" name="Rectangle 28">
               <a:extLst>
                 <a:ext uri="{FF2B5EF4-FFF2-40B4-BE49-F238E27FC236}">
-                  <a16:creationId xmlns:a16="http://schemas.microsoft.com/office/drawing/2014/main" id="{323F3D34-6531-4AD7-A8C6-195A090281A1}"/>
+                  <a16:creationId xmlns:a16="http://schemas.microsoft.com/office/drawing/2014/main" xmlns="" id="{323F3D34-6531-4AD7-A8C6-195A090281A1}"/>
                 </a:ext>
                 <a:ext uri="{C183D7F6-B498-43B3-948B-1728B52AA6E4}">
-                  <adec:decorative xmlns:adec="http://schemas.microsoft.com/office/drawing/2017/decorative" val="1"/>
+                  <adec:decorative xmlns:adec="http://schemas.microsoft.com/office/drawing/2017/decorative" xmlns="" val="1"/>
                 </a:ext>
               </a:extLst>
             </p:cNvPr>
@@ -9823,7 +9823,7 @@
             <p:nvPr>
               <p:extLst>
                 <p:ext uri="{386F3935-93C4-4BCD-93E2-E3B085C9AB24}">
-                  <p16:designElem xmlns:p16="http://schemas.microsoft.com/office/powerpoint/2015/main" val="1"/>
+                  <p16:designElem xmlns:p16="http://schemas.microsoft.com/office/powerpoint/2015/main" xmlns="" val="1"/>
                 </p:ext>
               </p:extLst>
             </p:nvPr>
@@ -9892,10 +9892,10 @@
             <p:cNvPr id="17" name="Rectangle 29">
               <a:extLst>
                 <a:ext uri="{FF2B5EF4-FFF2-40B4-BE49-F238E27FC236}">
-                  <a16:creationId xmlns:a16="http://schemas.microsoft.com/office/drawing/2014/main" id="{B9B0AE3F-2350-435F-A9B0-C310BF876385}"/>
+                  <a16:creationId xmlns:a16="http://schemas.microsoft.com/office/drawing/2014/main" xmlns="" id="{B9B0AE3F-2350-435F-A9B0-C310BF876385}"/>
                 </a:ext>
                 <a:ext uri="{C183D7F6-B498-43B3-948B-1728B52AA6E4}">
-                  <adec:decorative xmlns:adec="http://schemas.microsoft.com/office/drawing/2017/decorative" val="1"/>
+                  <adec:decorative xmlns:adec="http://schemas.microsoft.com/office/drawing/2017/decorative" xmlns="" val="1"/>
                 </a:ext>
               </a:extLst>
             </p:cNvPr>
@@ -9903,7 +9903,7 @@
             <p:nvPr>
               <p:extLst>
                 <p:ext uri="{386F3935-93C4-4BCD-93E2-E3B085C9AB24}">
-                  <p16:designElem xmlns:p16="http://schemas.microsoft.com/office/powerpoint/2015/main" val="1"/>
+                  <p16:designElem xmlns:p16="http://schemas.microsoft.com/office/powerpoint/2015/main" xmlns="" val="1"/>
                 </p:ext>
               </p:extLst>
             </p:nvPr>
@@ -9970,10 +9970,10 @@
             <p:cNvPr id="18" name="Isosceles Triangle 17">
               <a:extLst>
                 <a:ext uri="{FF2B5EF4-FFF2-40B4-BE49-F238E27FC236}">
-                  <a16:creationId xmlns:a16="http://schemas.microsoft.com/office/drawing/2014/main" id="{4EFA655C-9E50-4C14-A89E-AD7B648E4E2B}"/>
+                  <a16:creationId xmlns:a16="http://schemas.microsoft.com/office/drawing/2014/main" xmlns="" id="{4EFA655C-9E50-4C14-A89E-AD7B648E4E2B}"/>
                 </a:ext>
                 <a:ext uri="{C183D7F6-B498-43B3-948B-1728B52AA6E4}">
-                  <adec:decorative xmlns:adec="http://schemas.microsoft.com/office/drawing/2017/decorative" val="1"/>
+                  <adec:decorative xmlns:adec="http://schemas.microsoft.com/office/drawing/2017/decorative" xmlns="" val="1"/>
                 </a:ext>
               </a:extLst>
             </p:cNvPr>
@@ -9981,7 +9981,7 @@
             <p:nvPr>
               <p:extLst>
                 <p:ext uri="{386F3935-93C4-4BCD-93E2-E3B085C9AB24}">
-                  <p16:designElem xmlns:p16="http://schemas.microsoft.com/office/powerpoint/2015/main" val="1"/>
+                  <p16:designElem xmlns:p16="http://schemas.microsoft.com/office/powerpoint/2015/main" xmlns="" val="1"/>
                 </p:ext>
               </p:extLst>
             </p:nvPr>
@@ -10026,10 +10026,10 @@
             <p:cNvPr id="19" name="Isosceles Triangle 18">
               <a:extLst>
                 <a:ext uri="{FF2B5EF4-FFF2-40B4-BE49-F238E27FC236}">
-                  <a16:creationId xmlns:a16="http://schemas.microsoft.com/office/drawing/2014/main" id="{3E843863-7D25-4C01-9A17-E817CB6D998A}"/>
+                  <a16:creationId xmlns:a16="http://schemas.microsoft.com/office/drawing/2014/main" xmlns="" id="{3E843863-7D25-4C01-9A17-E817CB6D998A}"/>
                 </a:ext>
                 <a:ext uri="{C183D7F6-B498-43B3-948B-1728B52AA6E4}">
-                  <adec:decorative xmlns:adec="http://schemas.microsoft.com/office/drawing/2017/decorative" val="1"/>
+                  <adec:decorative xmlns:adec="http://schemas.microsoft.com/office/drawing/2017/decorative" xmlns="" val="1"/>
                 </a:ext>
               </a:extLst>
             </p:cNvPr>
@@ -10037,7 +10037,7 @@
             <p:nvPr>
               <p:extLst>
                 <p:ext uri="{386F3935-93C4-4BCD-93E2-E3B085C9AB24}">
-                  <p16:designElem xmlns:p16="http://schemas.microsoft.com/office/powerpoint/2015/main" val="1"/>
+                  <p16:designElem xmlns:p16="http://schemas.microsoft.com/office/powerpoint/2015/main" xmlns="" val="1"/>
                 </p:ext>
               </p:extLst>
             </p:nvPr>
@@ -10083,10 +10083,10 @@
           <p:cNvPr id="21" name="Rectangle 20">
             <a:extLst>
               <a:ext uri="{FF2B5EF4-FFF2-40B4-BE49-F238E27FC236}">
-                <a16:creationId xmlns:a16="http://schemas.microsoft.com/office/drawing/2014/main" id="{7941F9B1-B01B-4A84-89D9-B169AEB4E456}"/>
+                <a16:creationId xmlns:a16="http://schemas.microsoft.com/office/drawing/2014/main" xmlns="" id="{7941F9B1-B01B-4A84-89D9-B169AEB4E456}"/>
               </a:ext>
               <a:ext uri="{C183D7F6-B498-43B3-948B-1728B52AA6E4}">
-                <adec:decorative xmlns:adec="http://schemas.microsoft.com/office/drawing/2017/decorative" val="1"/>
+                <adec:decorative xmlns:adec="http://schemas.microsoft.com/office/drawing/2017/decorative" xmlns="" val="1"/>
               </a:ext>
             </a:extLst>
           </p:cNvPr>
@@ -10096,7 +10096,7 @@
           <p:nvPr>
             <p:extLst>
               <p:ext uri="{386F3935-93C4-4BCD-93E2-E3B085C9AB24}">
-                <p16:designElem xmlns:p16="http://schemas.microsoft.com/office/powerpoint/2015/main" val="1"/>
+                <p16:designElem xmlns:p16="http://schemas.microsoft.com/office/powerpoint/2015/main" xmlns="" val="1"/>
               </p:ext>
             </p:extLst>
           </p:nvPr>
@@ -10153,7 +10153,7 @@
           <p:cNvPr id="3" name="Obraz 2">
             <a:extLst>
               <a:ext uri="{FF2B5EF4-FFF2-40B4-BE49-F238E27FC236}">
-                <a16:creationId xmlns:a16="http://schemas.microsoft.com/office/drawing/2014/main" id="{41E3278D-7ACF-4078-BB00-54A366119131}"/>
+                <a16:creationId xmlns:a16="http://schemas.microsoft.com/office/drawing/2014/main" xmlns="" id="{41E3278D-7ACF-4078-BB00-54A366119131}"/>
               </a:ext>
             </a:extLst>
           </p:cNvPr>
@@ -10227,10 +10227,10 @@
           <p:cNvPr id="8" name="Rectangle 7">
             <a:extLst>
               <a:ext uri="{FF2B5EF4-FFF2-40B4-BE49-F238E27FC236}">
-                <a16:creationId xmlns:a16="http://schemas.microsoft.com/office/drawing/2014/main" id="{03E8462A-FEBA-4848-81CC-3F8DA3E477BE}"/>
+                <a16:creationId xmlns:a16="http://schemas.microsoft.com/office/drawing/2014/main" xmlns="" id="{03E8462A-FEBA-4848-81CC-3F8DA3E477BE}"/>
               </a:ext>
               <a:ext uri="{C183D7F6-B498-43B3-948B-1728B52AA6E4}">
-                <adec:decorative xmlns:adec="http://schemas.microsoft.com/office/drawing/2017/decorative" val="1"/>
+                <adec:decorative xmlns:adec="http://schemas.microsoft.com/office/drawing/2017/decorative" xmlns="" val="1"/>
               </a:ext>
             </a:extLst>
           </p:cNvPr>
@@ -10240,7 +10240,7 @@
           <p:nvPr>
             <p:extLst>
               <p:ext uri="{386F3935-93C4-4BCD-93E2-E3B085C9AB24}">
-                <p16:designElem xmlns:p16="http://schemas.microsoft.com/office/powerpoint/2015/main" val="1"/>
+                <p16:designElem xmlns:p16="http://schemas.microsoft.com/office/powerpoint/2015/main" xmlns="" val="1"/>
               </p:ext>
             </p:extLst>
           </p:nvPr>
@@ -10290,10 +10290,10 @@
           <p:cNvPr id="10" name="Group 9">
             <a:extLst>
               <a:ext uri="{FF2B5EF4-FFF2-40B4-BE49-F238E27FC236}">
-                <a16:creationId xmlns:a16="http://schemas.microsoft.com/office/drawing/2014/main" id="{2109F83F-40FE-4DB3-84CC-09FB3340D06D}"/>
+                <a16:creationId xmlns:a16="http://schemas.microsoft.com/office/drawing/2014/main" xmlns="" id="{2109F83F-40FE-4DB3-84CC-09FB3340D06D}"/>
               </a:ext>
               <a:ext uri="{C183D7F6-B498-43B3-948B-1728B52AA6E4}">
-                <adec:decorative xmlns:adec="http://schemas.microsoft.com/office/drawing/2017/decorative" val="1"/>
+                <adec:decorative xmlns:adec="http://schemas.microsoft.com/office/drawing/2017/decorative" xmlns="" val="1"/>
               </a:ext>
             </a:extLst>
           </p:cNvPr>
@@ -10303,7 +10303,7 @@
           <p:nvPr>
             <p:extLst>
               <p:ext uri="{386F3935-93C4-4BCD-93E2-E3B085C9AB24}">
-                <p16:designElem xmlns:p16="http://schemas.microsoft.com/office/powerpoint/2015/main" val="1"/>
+                <p16:designElem xmlns:p16="http://schemas.microsoft.com/office/powerpoint/2015/main" xmlns="" val="1"/>
               </p:ext>
             </p:extLst>
           </p:nvPr>
@@ -10321,10 +10321,10 @@
             <p:cNvPr id="11" name="Straight Connector 10">
               <a:extLst>
                 <a:ext uri="{FF2B5EF4-FFF2-40B4-BE49-F238E27FC236}">
-                  <a16:creationId xmlns:a16="http://schemas.microsoft.com/office/drawing/2014/main" id="{1DE492D7-C3C3-48FF-80C8-37021EA0262F}"/>
+                  <a16:creationId xmlns:a16="http://schemas.microsoft.com/office/drawing/2014/main" xmlns="" id="{1DE492D7-C3C3-48FF-80C8-37021EA0262F}"/>
                 </a:ext>
                 <a:ext uri="{C183D7F6-B498-43B3-948B-1728B52AA6E4}">
-                  <adec:decorative xmlns:adec="http://schemas.microsoft.com/office/drawing/2017/decorative" val="1"/>
+                  <adec:decorative xmlns:adec="http://schemas.microsoft.com/office/drawing/2017/decorative" xmlns="" val="1"/>
                 </a:ext>
               </a:extLst>
             </p:cNvPr>
@@ -10332,7 +10332,7 @@
             <p:nvPr>
               <p:extLst>
                 <p:ext uri="{386F3935-93C4-4BCD-93E2-E3B085C9AB24}">
-                  <p16:designElem xmlns:p16="http://schemas.microsoft.com/office/powerpoint/2015/main" val="1"/>
+                  <p16:designElem xmlns:p16="http://schemas.microsoft.com/office/powerpoint/2015/main" xmlns="" val="1"/>
                 </p:ext>
               </p:extLst>
             </p:nvPr>
@@ -10373,10 +10373,10 @@
             <p:cNvPr id="12" name="Rectangle 23">
               <a:extLst>
                 <a:ext uri="{FF2B5EF4-FFF2-40B4-BE49-F238E27FC236}">
-                  <a16:creationId xmlns:a16="http://schemas.microsoft.com/office/drawing/2014/main" id="{0B30FF97-2E9A-490A-AED2-90BA2E0EC17F}"/>
+                  <a16:creationId xmlns:a16="http://schemas.microsoft.com/office/drawing/2014/main" xmlns="" id="{0B30FF97-2E9A-490A-AED2-90BA2E0EC17F}"/>
                 </a:ext>
                 <a:ext uri="{C183D7F6-B498-43B3-948B-1728B52AA6E4}">
-                  <adec:decorative xmlns:adec="http://schemas.microsoft.com/office/drawing/2017/decorative" val="1"/>
+                  <adec:decorative xmlns:adec="http://schemas.microsoft.com/office/drawing/2017/decorative" xmlns="" val="1"/>
                 </a:ext>
               </a:extLst>
             </p:cNvPr>
@@ -10384,7 +10384,7 @@
             <p:nvPr>
               <p:extLst>
                 <p:ext uri="{386F3935-93C4-4BCD-93E2-E3B085C9AB24}">
-                  <p16:designElem xmlns:p16="http://schemas.microsoft.com/office/powerpoint/2015/main" val="1"/>
+                  <p16:designElem xmlns:p16="http://schemas.microsoft.com/office/powerpoint/2015/main" xmlns="" val="1"/>
                 </p:ext>
               </p:extLst>
             </p:nvPr>
@@ -10451,10 +10451,10 @@
             <p:cNvPr id="13" name="Rectangle 25">
               <a:extLst>
                 <a:ext uri="{FF2B5EF4-FFF2-40B4-BE49-F238E27FC236}">
-                  <a16:creationId xmlns:a16="http://schemas.microsoft.com/office/drawing/2014/main" id="{B6D53C7D-A312-47B6-A66A-230A19CFACA6}"/>
+                  <a16:creationId xmlns:a16="http://schemas.microsoft.com/office/drawing/2014/main" xmlns="" id="{B6D53C7D-A312-47B6-A66A-230A19CFACA6}"/>
                 </a:ext>
                 <a:ext uri="{C183D7F6-B498-43B3-948B-1728B52AA6E4}">
-                  <adec:decorative xmlns:adec="http://schemas.microsoft.com/office/drawing/2017/decorative" val="1"/>
+                  <adec:decorative xmlns:adec="http://schemas.microsoft.com/office/drawing/2017/decorative" xmlns="" val="1"/>
                 </a:ext>
               </a:extLst>
             </p:cNvPr>
@@ -10462,7 +10462,7 @@
             <p:nvPr>
               <p:extLst>
                 <p:ext uri="{386F3935-93C4-4BCD-93E2-E3B085C9AB24}">
-                  <p16:designElem xmlns:p16="http://schemas.microsoft.com/office/powerpoint/2015/main" val="1"/>
+                  <p16:designElem xmlns:p16="http://schemas.microsoft.com/office/powerpoint/2015/main" xmlns="" val="1"/>
                 </p:ext>
               </p:extLst>
             </p:nvPr>
@@ -10529,10 +10529,10 @@
             <p:cNvPr id="14" name="Isosceles Triangle 13">
               <a:extLst>
                 <a:ext uri="{FF2B5EF4-FFF2-40B4-BE49-F238E27FC236}">
-                  <a16:creationId xmlns:a16="http://schemas.microsoft.com/office/drawing/2014/main" id="{9329D58C-0D2E-4A2B-AD6A-9CEE506784A8}"/>
+                  <a16:creationId xmlns:a16="http://schemas.microsoft.com/office/drawing/2014/main" xmlns="" id="{9329D58C-0D2E-4A2B-AD6A-9CEE506784A8}"/>
                 </a:ext>
                 <a:ext uri="{C183D7F6-B498-43B3-948B-1728B52AA6E4}">
-                  <adec:decorative xmlns:adec="http://schemas.microsoft.com/office/drawing/2017/decorative" val="1"/>
+                  <adec:decorative xmlns:adec="http://schemas.microsoft.com/office/drawing/2017/decorative" xmlns="" val="1"/>
                 </a:ext>
               </a:extLst>
             </p:cNvPr>
@@ -10540,7 +10540,7 @@
             <p:nvPr>
               <p:extLst>
                 <p:ext uri="{386F3935-93C4-4BCD-93E2-E3B085C9AB24}">
-                  <p16:designElem xmlns:p16="http://schemas.microsoft.com/office/powerpoint/2015/main" val="1"/>
+                  <p16:designElem xmlns:p16="http://schemas.microsoft.com/office/powerpoint/2015/main" xmlns="" val="1"/>
                 </p:ext>
               </p:extLst>
             </p:nvPr>
@@ -10585,10 +10585,10 @@
             <p:cNvPr id="15" name="Rectangle 27">
               <a:extLst>
                 <a:ext uri="{FF2B5EF4-FFF2-40B4-BE49-F238E27FC236}">
-                  <a16:creationId xmlns:a16="http://schemas.microsoft.com/office/drawing/2014/main" id="{9D446EDE-C690-4461-8BF2-7634808FC8B4}"/>
+                  <a16:creationId xmlns:a16="http://schemas.microsoft.com/office/drawing/2014/main" xmlns="" id="{9D446EDE-C690-4461-8BF2-7634808FC8B4}"/>
                 </a:ext>
                 <a:ext uri="{C183D7F6-B498-43B3-948B-1728B52AA6E4}">
-                  <adec:decorative xmlns:adec="http://schemas.microsoft.com/office/drawing/2017/decorative" val="1"/>
+                  <adec:decorative xmlns:adec="http://schemas.microsoft.com/office/drawing/2017/decorative" xmlns="" val="1"/>
                 </a:ext>
               </a:extLst>
             </p:cNvPr>
@@ -10596,7 +10596,7 @@
             <p:nvPr>
               <p:extLst>
                 <p:ext uri="{386F3935-93C4-4BCD-93E2-E3B085C9AB24}">
-                  <p16:designElem xmlns:p16="http://schemas.microsoft.com/office/powerpoint/2015/main" val="1"/>
+                  <p16:designElem xmlns:p16="http://schemas.microsoft.com/office/powerpoint/2015/main" xmlns="" val="1"/>
                 </p:ext>
               </p:extLst>
             </p:nvPr>
@@ -10664,10 +10664,10 @@
             <p:cNvPr id="16" name="Rectangle 28">
               <a:extLst>
                 <a:ext uri="{FF2B5EF4-FFF2-40B4-BE49-F238E27FC236}">
-                  <a16:creationId xmlns:a16="http://schemas.microsoft.com/office/drawing/2014/main" id="{323F3D34-6531-4AD7-A8C6-195A090281A1}"/>
+                  <a16:creationId xmlns:a16="http://schemas.microsoft.com/office/drawing/2014/main" xmlns="" id="{323F3D34-6531-4AD7-A8C6-195A090281A1}"/>
                 </a:ext>
                 <a:ext uri="{C183D7F6-B498-43B3-948B-1728B52AA6E4}">
-                  <adec:decorative xmlns:adec="http://schemas.microsoft.com/office/drawing/2017/decorative" val="1"/>
+                  <adec:decorative xmlns:adec="http://schemas.microsoft.com/office/drawing/2017/decorative" xmlns="" val="1"/>
                 </a:ext>
               </a:extLst>
             </p:cNvPr>
@@ -10675,7 +10675,7 @@
             <p:nvPr>
               <p:extLst>
                 <p:ext uri="{386F3935-93C4-4BCD-93E2-E3B085C9AB24}">
-                  <p16:designElem xmlns:p16="http://schemas.microsoft.com/office/powerpoint/2015/main" val="1"/>
+                  <p16:designElem xmlns:p16="http://schemas.microsoft.com/office/powerpoint/2015/main" xmlns="" val="1"/>
                 </p:ext>
               </p:extLst>
             </p:nvPr>
@@ -10744,10 +10744,10 @@
             <p:cNvPr id="17" name="Rectangle 29">
               <a:extLst>
                 <a:ext uri="{FF2B5EF4-FFF2-40B4-BE49-F238E27FC236}">
-                  <a16:creationId xmlns:a16="http://schemas.microsoft.com/office/drawing/2014/main" id="{B9B0AE3F-2350-435F-A9B0-C310BF876385}"/>
+                  <a16:creationId xmlns:a16="http://schemas.microsoft.com/office/drawing/2014/main" xmlns="" id="{B9B0AE3F-2350-435F-A9B0-C310BF876385}"/>
                 </a:ext>
                 <a:ext uri="{C183D7F6-B498-43B3-948B-1728B52AA6E4}">
-                  <adec:decorative xmlns:adec="http://schemas.microsoft.com/office/drawing/2017/decorative" val="1"/>
+                  <adec:decorative xmlns:adec="http://schemas.microsoft.com/office/drawing/2017/decorative" xmlns="" val="1"/>
                 </a:ext>
               </a:extLst>
             </p:cNvPr>
@@ -10755,7 +10755,7 @@
             <p:nvPr>
               <p:extLst>
                 <p:ext uri="{386F3935-93C4-4BCD-93E2-E3B085C9AB24}">
-                  <p16:designElem xmlns:p16="http://schemas.microsoft.com/office/powerpoint/2015/main" val="1"/>
+                  <p16:designElem xmlns:p16="http://schemas.microsoft.com/office/powerpoint/2015/main" xmlns="" val="1"/>
                 </p:ext>
               </p:extLst>
             </p:nvPr>
@@ -10822,10 +10822,10 @@
             <p:cNvPr id="18" name="Isosceles Triangle 17">
               <a:extLst>
                 <a:ext uri="{FF2B5EF4-FFF2-40B4-BE49-F238E27FC236}">
-                  <a16:creationId xmlns:a16="http://schemas.microsoft.com/office/drawing/2014/main" id="{4EFA655C-9E50-4C14-A89E-AD7B648E4E2B}"/>
+                  <a16:creationId xmlns:a16="http://schemas.microsoft.com/office/drawing/2014/main" xmlns="" id="{4EFA655C-9E50-4C14-A89E-AD7B648E4E2B}"/>
                 </a:ext>
                 <a:ext uri="{C183D7F6-B498-43B3-948B-1728B52AA6E4}">
-                  <adec:decorative xmlns:adec="http://schemas.microsoft.com/office/drawing/2017/decorative" val="1"/>
+                  <adec:decorative xmlns:adec="http://schemas.microsoft.com/office/drawing/2017/decorative" xmlns="" val="1"/>
                 </a:ext>
               </a:extLst>
             </p:cNvPr>
@@ -10833,7 +10833,7 @@
             <p:nvPr>
               <p:extLst>
                 <p:ext uri="{386F3935-93C4-4BCD-93E2-E3B085C9AB24}">
-                  <p16:designElem xmlns:p16="http://schemas.microsoft.com/office/powerpoint/2015/main" val="1"/>
+                  <p16:designElem xmlns:p16="http://schemas.microsoft.com/office/powerpoint/2015/main" xmlns="" val="1"/>
                 </p:ext>
               </p:extLst>
             </p:nvPr>
@@ -10878,10 +10878,10 @@
             <p:cNvPr id="19" name="Isosceles Triangle 18">
               <a:extLst>
                 <a:ext uri="{FF2B5EF4-FFF2-40B4-BE49-F238E27FC236}">
-                  <a16:creationId xmlns:a16="http://schemas.microsoft.com/office/drawing/2014/main" id="{3E843863-7D25-4C01-9A17-E817CB6D998A}"/>
+                  <a16:creationId xmlns:a16="http://schemas.microsoft.com/office/drawing/2014/main" xmlns="" id="{3E843863-7D25-4C01-9A17-E817CB6D998A}"/>
                 </a:ext>
                 <a:ext uri="{C183D7F6-B498-43B3-948B-1728B52AA6E4}">
-                  <adec:decorative xmlns:adec="http://schemas.microsoft.com/office/drawing/2017/decorative" val="1"/>
+                  <adec:decorative xmlns:adec="http://schemas.microsoft.com/office/drawing/2017/decorative" xmlns="" val="1"/>
                 </a:ext>
               </a:extLst>
             </p:cNvPr>
@@ -10889,7 +10889,7 @@
             <p:nvPr>
               <p:extLst>
                 <p:ext uri="{386F3935-93C4-4BCD-93E2-E3B085C9AB24}">
-                  <p16:designElem xmlns:p16="http://schemas.microsoft.com/office/powerpoint/2015/main" val="1"/>
+                  <p16:designElem xmlns:p16="http://schemas.microsoft.com/office/powerpoint/2015/main" xmlns="" val="1"/>
                 </p:ext>
               </p:extLst>
             </p:nvPr>
@@ -10935,10 +10935,10 @@
           <p:cNvPr id="21" name="Rectangle 20">
             <a:extLst>
               <a:ext uri="{FF2B5EF4-FFF2-40B4-BE49-F238E27FC236}">
-                <a16:creationId xmlns:a16="http://schemas.microsoft.com/office/drawing/2014/main" id="{7941F9B1-B01B-4A84-89D9-B169AEB4E456}"/>
+                <a16:creationId xmlns:a16="http://schemas.microsoft.com/office/drawing/2014/main" xmlns="" id="{7941F9B1-B01B-4A84-89D9-B169AEB4E456}"/>
               </a:ext>
               <a:ext uri="{C183D7F6-B498-43B3-948B-1728B52AA6E4}">
-                <adec:decorative xmlns:adec="http://schemas.microsoft.com/office/drawing/2017/decorative" val="1"/>
+                <adec:decorative xmlns:adec="http://schemas.microsoft.com/office/drawing/2017/decorative" xmlns="" val="1"/>
               </a:ext>
             </a:extLst>
           </p:cNvPr>
@@ -10948,7 +10948,7 @@
           <p:nvPr>
             <p:extLst>
               <p:ext uri="{386F3935-93C4-4BCD-93E2-E3B085C9AB24}">
-                <p16:designElem xmlns:p16="http://schemas.microsoft.com/office/powerpoint/2015/main" val="1"/>
+                <p16:designElem xmlns:p16="http://schemas.microsoft.com/office/powerpoint/2015/main" xmlns="" val="1"/>
               </p:ext>
             </p:extLst>
           </p:nvPr>
@@ -11005,7 +11005,7 @@
           <p:cNvPr id="3" name="Obraz 2">
             <a:extLst>
               <a:ext uri="{FF2B5EF4-FFF2-40B4-BE49-F238E27FC236}">
-                <a16:creationId xmlns:a16="http://schemas.microsoft.com/office/drawing/2014/main" id="{4BC8A3DE-2630-45CF-B8BE-E247F3BDAC93}"/>
+                <a16:creationId xmlns:a16="http://schemas.microsoft.com/office/drawing/2014/main" xmlns="" id="{4BC8A3DE-2630-45CF-B8BE-E247F3BDAC93}"/>
               </a:ext>
             </a:extLst>
           </p:cNvPr>
@@ -11079,10 +11079,10 @@
           <p:cNvPr id="8" name="Rectangle 7">
             <a:extLst>
               <a:ext uri="{FF2B5EF4-FFF2-40B4-BE49-F238E27FC236}">
-                <a16:creationId xmlns:a16="http://schemas.microsoft.com/office/drawing/2014/main" id="{03E8462A-FEBA-4848-81CC-3F8DA3E477BE}"/>
+                <a16:creationId xmlns:a16="http://schemas.microsoft.com/office/drawing/2014/main" xmlns="" id="{03E8462A-FEBA-4848-81CC-3F8DA3E477BE}"/>
               </a:ext>
               <a:ext uri="{C183D7F6-B498-43B3-948B-1728B52AA6E4}">
-                <adec:decorative xmlns:adec="http://schemas.microsoft.com/office/drawing/2017/decorative" val="1"/>
+                <adec:decorative xmlns:adec="http://schemas.microsoft.com/office/drawing/2017/decorative" xmlns="" val="1"/>
               </a:ext>
             </a:extLst>
           </p:cNvPr>
@@ -11092,7 +11092,7 @@
           <p:nvPr>
             <p:extLst>
               <p:ext uri="{386F3935-93C4-4BCD-93E2-E3B085C9AB24}">
-                <p16:designElem xmlns:p16="http://schemas.microsoft.com/office/powerpoint/2015/main" val="1"/>
+                <p16:designElem xmlns:p16="http://schemas.microsoft.com/office/powerpoint/2015/main" xmlns="" val="1"/>
               </p:ext>
             </p:extLst>
           </p:nvPr>
@@ -11142,10 +11142,10 @@
           <p:cNvPr id="10" name="Group 9">
             <a:extLst>
               <a:ext uri="{FF2B5EF4-FFF2-40B4-BE49-F238E27FC236}">
-                <a16:creationId xmlns:a16="http://schemas.microsoft.com/office/drawing/2014/main" id="{2109F83F-40FE-4DB3-84CC-09FB3340D06D}"/>
+                <a16:creationId xmlns:a16="http://schemas.microsoft.com/office/drawing/2014/main" xmlns="" id="{2109F83F-40FE-4DB3-84CC-09FB3340D06D}"/>
               </a:ext>
               <a:ext uri="{C183D7F6-B498-43B3-948B-1728B52AA6E4}">
-                <adec:decorative xmlns:adec="http://schemas.microsoft.com/office/drawing/2017/decorative" val="1"/>
+                <adec:decorative xmlns:adec="http://schemas.microsoft.com/office/drawing/2017/decorative" xmlns="" val="1"/>
               </a:ext>
             </a:extLst>
           </p:cNvPr>
@@ -11155,7 +11155,7 @@
           <p:nvPr>
             <p:extLst>
               <p:ext uri="{386F3935-93C4-4BCD-93E2-E3B085C9AB24}">
-                <p16:designElem xmlns:p16="http://schemas.microsoft.com/office/powerpoint/2015/main" val="1"/>
+                <p16:designElem xmlns:p16="http://schemas.microsoft.com/office/powerpoint/2015/main" xmlns="" val="1"/>
               </p:ext>
             </p:extLst>
           </p:nvPr>
@@ -11173,10 +11173,10 @@
             <p:cNvPr id="11" name="Straight Connector 10">
               <a:extLst>
                 <a:ext uri="{FF2B5EF4-FFF2-40B4-BE49-F238E27FC236}">
-                  <a16:creationId xmlns:a16="http://schemas.microsoft.com/office/drawing/2014/main" id="{1DE492D7-C3C3-48FF-80C8-37021EA0262F}"/>
+                  <a16:creationId xmlns:a16="http://schemas.microsoft.com/office/drawing/2014/main" xmlns="" id="{1DE492D7-C3C3-48FF-80C8-37021EA0262F}"/>
                 </a:ext>
                 <a:ext uri="{C183D7F6-B498-43B3-948B-1728B52AA6E4}">
-                  <adec:decorative xmlns:adec="http://schemas.microsoft.com/office/drawing/2017/decorative" val="1"/>
+                  <adec:decorative xmlns:adec="http://schemas.microsoft.com/office/drawing/2017/decorative" xmlns="" val="1"/>
                 </a:ext>
               </a:extLst>
             </p:cNvPr>
@@ -11184,7 +11184,7 @@
             <p:nvPr>
               <p:extLst>
                 <p:ext uri="{386F3935-93C4-4BCD-93E2-E3B085C9AB24}">
-                  <p16:designElem xmlns:p16="http://schemas.microsoft.com/office/powerpoint/2015/main" val="1"/>
+                  <p16:designElem xmlns:p16="http://schemas.microsoft.com/office/powerpoint/2015/main" xmlns="" val="1"/>
                 </p:ext>
               </p:extLst>
             </p:nvPr>
@@ -11225,10 +11225,10 @@
             <p:cNvPr id="12" name="Rectangle 23">
               <a:extLst>
                 <a:ext uri="{FF2B5EF4-FFF2-40B4-BE49-F238E27FC236}">
-                  <a16:creationId xmlns:a16="http://schemas.microsoft.com/office/drawing/2014/main" id="{0B30FF97-2E9A-490A-AED2-90BA2E0EC17F}"/>
+                  <a16:creationId xmlns:a16="http://schemas.microsoft.com/office/drawing/2014/main" xmlns="" id="{0B30FF97-2E9A-490A-AED2-90BA2E0EC17F}"/>
                 </a:ext>
                 <a:ext uri="{C183D7F6-B498-43B3-948B-1728B52AA6E4}">
-                  <adec:decorative xmlns:adec="http://schemas.microsoft.com/office/drawing/2017/decorative" val="1"/>
+                  <adec:decorative xmlns:adec="http://schemas.microsoft.com/office/drawing/2017/decorative" xmlns="" val="1"/>
                 </a:ext>
               </a:extLst>
             </p:cNvPr>
@@ -11236,7 +11236,7 @@
             <p:nvPr>
               <p:extLst>
                 <p:ext uri="{386F3935-93C4-4BCD-93E2-E3B085C9AB24}">
-                  <p16:designElem xmlns:p16="http://schemas.microsoft.com/office/powerpoint/2015/main" val="1"/>
+                  <p16:designElem xmlns:p16="http://schemas.microsoft.com/office/powerpoint/2015/main" xmlns="" val="1"/>
                 </p:ext>
               </p:extLst>
             </p:nvPr>
@@ -11303,10 +11303,10 @@
             <p:cNvPr id="13" name="Rectangle 25">
               <a:extLst>
                 <a:ext uri="{FF2B5EF4-FFF2-40B4-BE49-F238E27FC236}">
-                  <a16:creationId xmlns:a16="http://schemas.microsoft.com/office/drawing/2014/main" id="{B6D53C7D-A312-47B6-A66A-230A19CFACA6}"/>
+                  <a16:creationId xmlns:a16="http://schemas.microsoft.com/office/drawing/2014/main" xmlns="" id="{B6D53C7D-A312-47B6-A66A-230A19CFACA6}"/>
                 </a:ext>
                 <a:ext uri="{C183D7F6-B498-43B3-948B-1728B52AA6E4}">
-                  <adec:decorative xmlns:adec="http://schemas.microsoft.com/office/drawing/2017/decorative" val="1"/>
+                  <adec:decorative xmlns:adec="http://schemas.microsoft.com/office/drawing/2017/decorative" xmlns="" val="1"/>
                 </a:ext>
               </a:extLst>
             </p:cNvPr>
@@ -11314,7 +11314,7 @@
             <p:nvPr>
               <p:extLst>
                 <p:ext uri="{386F3935-93C4-4BCD-93E2-E3B085C9AB24}">
-                  <p16:designElem xmlns:p16="http://schemas.microsoft.com/office/powerpoint/2015/main" val="1"/>
+                  <p16:designElem xmlns:p16="http://schemas.microsoft.com/office/powerpoint/2015/main" xmlns="" val="1"/>
                 </p:ext>
               </p:extLst>
             </p:nvPr>
@@ -11381,10 +11381,10 @@
             <p:cNvPr id="14" name="Isosceles Triangle 13">
               <a:extLst>
                 <a:ext uri="{FF2B5EF4-FFF2-40B4-BE49-F238E27FC236}">
-                  <a16:creationId xmlns:a16="http://schemas.microsoft.com/office/drawing/2014/main" id="{9329D58C-0D2E-4A2B-AD6A-9CEE506784A8}"/>
+                  <a16:creationId xmlns:a16="http://schemas.microsoft.com/office/drawing/2014/main" xmlns="" id="{9329D58C-0D2E-4A2B-AD6A-9CEE506784A8}"/>
                 </a:ext>
                 <a:ext uri="{C183D7F6-B498-43B3-948B-1728B52AA6E4}">
-                  <adec:decorative xmlns:adec="http://schemas.microsoft.com/office/drawing/2017/decorative" val="1"/>
+                  <adec:decorative xmlns:adec="http://schemas.microsoft.com/office/drawing/2017/decorative" xmlns="" val="1"/>
                 </a:ext>
               </a:extLst>
             </p:cNvPr>
@@ -11392,7 +11392,7 @@
             <p:nvPr>
               <p:extLst>
                 <p:ext uri="{386F3935-93C4-4BCD-93E2-E3B085C9AB24}">
-                  <p16:designElem xmlns:p16="http://schemas.microsoft.com/office/powerpoint/2015/main" val="1"/>
+                  <p16:designElem xmlns:p16="http://schemas.microsoft.com/office/powerpoint/2015/main" xmlns="" val="1"/>
                 </p:ext>
               </p:extLst>
             </p:nvPr>
@@ -11437,10 +11437,10 @@
             <p:cNvPr id="15" name="Rectangle 27">
               <a:extLst>
                 <a:ext uri="{FF2B5EF4-FFF2-40B4-BE49-F238E27FC236}">
-                  <a16:creationId xmlns:a16="http://schemas.microsoft.com/office/drawing/2014/main" id="{9D446EDE-C690-4461-8BF2-7634808FC8B4}"/>
+                  <a16:creationId xmlns:a16="http://schemas.microsoft.com/office/drawing/2014/main" xmlns="" id="{9D446EDE-C690-4461-8BF2-7634808FC8B4}"/>
                 </a:ext>
                 <a:ext uri="{C183D7F6-B498-43B3-948B-1728B52AA6E4}">
-                  <adec:decorative xmlns:adec="http://schemas.microsoft.com/office/drawing/2017/decorative" val="1"/>
+                  <adec:decorative xmlns:adec="http://schemas.microsoft.com/office/drawing/2017/decorative" xmlns="" val="1"/>
                 </a:ext>
               </a:extLst>
             </p:cNvPr>
@@ -11448,7 +11448,7 @@
             <p:nvPr>
               <p:extLst>
                 <p:ext uri="{386F3935-93C4-4BCD-93E2-E3B085C9AB24}">
-                  <p16:designElem xmlns:p16="http://schemas.microsoft.com/office/powerpoint/2015/main" val="1"/>
+                  <p16:designElem xmlns:p16="http://schemas.microsoft.com/office/powerpoint/2015/main" xmlns="" val="1"/>
                 </p:ext>
               </p:extLst>
             </p:nvPr>
@@ -11516,10 +11516,10 @@
             <p:cNvPr id="16" name="Rectangle 28">
               <a:extLst>
                 <a:ext uri="{FF2B5EF4-FFF2-40B4-BE49-F238E27FC236}">
-                  <a16:creationId xmlns:a16="http://schemas.microsoft.com/office/drawing/2014/main" id="{323F3D34-6531-4AD7-A8C6-195A090281A1}"/>
+                  <a16:creationId xmlns:a16="http://schemas.microsoft.com/office/drawing/2014/main" xmlns="" id="{323F3D34-6531-4AD7-A8C6-195A090281A1}"/>
                 </a:ext>
                 <a:ext uri="{C183D7F6-B498-43B3-948B-1728B52AA6E4}">
-                  <adec:decorative xmlns:adec="http://schemas.microsoft.com/office/drawing/2017/decorative" val="1"/>
+                  <adec:decorative xmlns:adec="http://schemas.microsoft.com/office/drawing/2017/decorative" xmlns="" val="1"/>
                 </a:ext>
               </a:extLst>
             </p:cNvPr>
@@ -11527,7 +11527,7 @@
             <p:nvPr>
               <p:extLst>
                 <p:ext uri="{386F3935-93C4-4BCD-93E2-E3B085C9AB24}">
-                  <p16:designElem xmlns:p16="http://schemas.microsoft.com/office/powerpoint/2015/main" val="1"/>
+                  <p16:designElem xmlns:p16="http://schemas.microsoft.com/office/powerpoint/2015/main" xmlns="" val="1"/>
                 </p:ext>
               </p:extLst>
             </p:nvPr>
@@ -11596,10 +11596,10 @@
             <p:cNvPr id="17" name="Rectangle 29">
               <a:extLst>
                 <a:ext uri="{FF2B5EF4-FFF2-40B4-BE49-F238E27FC236}">
-                  <a16:creationId xmlns:a16="http://schemas.microsoft.com/office/drawing/2014/main" id="{B9B0AE3F-2350-435F-A9B0-C310BF876385}"/>
+                  <a16:creationId xmlns:a16="http://schemas.microsoft.com/office/drawing/2014/main" xmlns="" id="{B9B0AE3F-2350-435F-A9B0-C310BF876385}"/>
                 </a:ext>
                 <a:ext uri="{C183D7F6-B498-43B3-948B-1728B52AA6E4}">
-                  <adec:decorative xmlns:adec="http://schemas.microsoft.com/office/drawing/2017/decorative" val="1"/>
+                  <adec:decorative xmlns:adec="http://schemas.microsoft.com/office/drawing/2017/decorative" xmlns="" val="1"/>
                 </a:ext>
               </a:extLst>
             </p:cNvPr>
@@ -11607,7 +11607,7 @@
             <p:nvPr>
               <p:extLst>
                 <p:ext uri="{386F3935-93C4-4BCD-93E2-E3B085C9AB24}">
-                  <p16:designElem xmlns:p16="http://schemas.microsoft.com/office/powerpoint/2015/main" val="1"/>
+                  <p16:designElem xmlns:p16="http://schemas.microsoft.com/office/powerpoint/2015/main" xmlns="" val="1"/>
                 </p:ext>
               </p:extLst>
             </p:nvPr>
@@ -11674,10 +11674,10 @@
             <p:cNvPr id="18" name="Isosceles Triangle 17">
               <a:extLst>
                 <a:ext uri="{FF2B5EF4-FFF2-40B4-BE49-F238E27FC236}">
-                  <a16:creationId xmlns:a16="http://schemas.microsoft.com/office/drawing/2014/main" id="{4EFA655C-9E50-4C14-A89E-AD7B648E4E2B}"/>
+                  <a16:creationId xmlns:a16="http://schemas.microsoft.com/office/drawing/2014/main" xmlns="" id="{4EFA655C-9E50-4C14-A89E-AD7B648E4E2B}"/>
                 </a:ext>
                 <a:ext uri="{C183D7F6-B498-43B3-948B-1728B52AA6E4}">
-                  <adec:decorative xmlns:adec="http://schemas.microsoft.com/office/drawing/2017/decorative" val="1"/>
+                  <adec:decorative xmlns:adec="http://schemas.microsoft.com/office/drawing/2017/decorative" xmlns="" val="1"/>
                 </a:ext>
               </a:extLst>
             </p:cNvPr>
@@ -11685,7 +11685,7 @@
             <p:nvPr>
               <p:extLst>
                 <p:ext uri="{386F3935-93C4-4BCD-93E2-E3B085C9AB24}">
-                  <p16:designElem xmlns:p16="http://schemas.microsoft.com/office/powerpoint/2015/main" val="1"/>
+                  <p16:designElem xmlns:p16="http://schemas.microsoft.com/office/powerpoint/2015/main" xmlns="" val="1"/>
                 </p:ext>
               </p:extLst>
             </p:nvPr>
@@ -11730,10 +11730,10 @@
             <p:cNvPr id="19" name="Isosceles Triangle 18">
               <a:extLst>
                 <a:ext uri="{FF2B5EF4-FFF2-40B4-BE49-F238E27FC236}">
-                  <a16:creationId xmlns:a16="http://schemas.microsoft.com/office/drawing/2014/main" id="{3E843863-7D25-4C01-9A17-E817CB6D998A}"/>
+                  <a16:creationId xmlns:a16="http://schemas.microsoft.com/office/drawing/2014/main" xmlns="" id="{3E843863-7D25-4C01-9A17-E817CB6D998A}"/>
                 </a:ext>
                 <a:ext uri="{C183D7F6-B498-43B3-948B-1728B52AA6E4}">
-                  <adec:decorative xmlns:adec="http://schemas.microsoft.com/office/drawing/2017/decorative" val="1"/>
+                  <adec:decorative xmlns:adec="http://schemas.microsoft.com/office/drawing/2017/decorative" xmlns="" val="1"/>
                 </a:ext>
               </a:extLst>
             </p:cNvPr>
@@ -11741,7 +11741,7 @@
             <p:nvPr>
               <p:extLst>
                 <p:ext uri="{386F3935-93C4-4BCD-93E2-E3B085C9AB24}">
-                  <p16:designElem xmlns:p16="http://schemas.microsoft.com/office/powerpoint/2015/main" val="1"/>
+                  <p16:designElem xmlns:p16="http://schemas.microsoft.com/office/powerpoint/2015/main" xmlns="" val="1"/>
                 </p:ext>
               </p:extLst>
             </p:nvPr>
@@ -11787,10 +11787,10 @@
           <p:cNvPr id="21" name="Rectangle 20">
             <a:extLst>
               <a:ext uri="{FF2B5EF4-FFF2-40B4-BE49-F238E27FC236}">
-                <a16:creationId xmlns:a16="http://schemas.microsoft.com/office/drawing/2014/main" id="{7941F9B1-B01B-4A84-89D9-B169AEB4E456}"/>
+                <a16:creationId xmlns:a16="http://schemas.microsoft.com/office/drawing/2014/main" xmlns="" id="{7941F9B1-B01B-4A84-89D9-B169AEB4E456}"/>
               </a:ext>
               <a:ext uri="{C183D7F6-B498-43B3-948B-1728B52AA6E4}">
-                <adec:decorative xmlns:adec="http://schemas.microsoft.com/office/drawing/2017/decorative" val="1"/>
+                <adec:decorative xmlns:adec="http://schemas.microsoft.com/office/drawing/2017/decorative" xmlns="" val="1"/>
               </a:ext>
             </a:extLst>
           </p:cNvPr>
@@ -11800,7 +11800,7 @@
           <p:nvPr>
             <p:extLst>
               <p:ext uri="{386F3935-93C4-4BCD-93E2-E3B085C9AB24}">
-                <p16:designElem xmlns:p16="http://schemas.microsoft.com/office/powerpoint/2015/main" val="1"/>
+                <p16:designElem xmlns:p16="http://schemas.microsoft.com/office/powerpoint/2015/main" xmlns="" val="1"/>
               </p:ext>
             </p:extLst>
           </p:nvPr>
@@ -11857,7 +11857,7 @@
           <p:cNvPr id="3" name="Obraz 2">
             <a:extLst>
               <a:ext uri="{FF2B5EF4-FFF2-40B4-BE49-F238E27FC236}">
-                <a16:creationId xmlns:a16="http://schemas.microsoft.com/office/drawing/2014/main" id="{920661B1-0D90-4098-84B9-DA7A3B28F4AA}"/>
+                <a16:creationId xmlns:a16="http://schemas.microsoft.com/office/drawing/2014/main" xmlns="" id="{920661B1-0D90-4098-84B9-DA7A3B28F4AA}"/>
               </a:ext>
             </a:extLst>
           </p:cNvPr>
@@ -11931,10 +11931,10 @@
           <p:cNvPr id="8" name="Group 7">
             <a:extLst>
               <a:ext uri="{FF2B5EF4-FFF2-40B4-BE49-F238E27FC236}">
-                <a16:creationId xmlns:a16="http://schemas.microsoft.com/office/drawing/2014/main" id="{28460BD8-AE3F-4AC9-9D0B-717052AA5D3A}"/>
+                <a16:creationId xmlns:a16="http://schemas.microsoft.com/office/drawing/2014/main" xmlns="" id="{28460BD8-AE3F-4AC9-9D0B-717052AA5D3A}"/>
               </a:ext>
               <a:ext uri="{C183D7F6-B498-43B3-948B-1728B52AA6E4}">
-                <adec:decorative xmlns:adec="http://schemas.microsoft.com/office/drawing/2017/decorative" val="1"/>
+                <adec:decorative xmlns:adec="http://schemas.microsoft.com/office/drawing/2017/decorative" xmlns="" val="1"/>
               </a:ext>
             </a:extLst>
           </p:cNvPr>
@@ -11944,7 +11944,7 @@
           <p:nvPr>
             <p:extLst>
               <p:ext uri="{386F3935-93C4-4BCD-93E2-E3B085C9AB24}">
-                <p16:designElem xmlns:p16="http://schemas.microsoft.com/office/powerpoint/2015/main" val="1"/>
+                <p16:designElem xmlns:p16="http://schemas.microsoft.com/office/powerpoint/2015/main" xmlns="" val="1"/>
               </p:ext>
             </p:extLst>
           </p:nvPr>
@@ -11962,10 +11962,10 @@
             <p:cNvPr id="9" name="Straight Connector 8">
               <a:extLst>
                 <a:ext uri="{FF2B5EF4-FFF2-40B4-BE49-F238E27FC236}">
-                  <a16:creationId xmlns:a16="http://schemas.microsoft.com/office/drawing/2014/main" id="{54420CFE-F482-466E-9E1E-C78513C0B85D}"/>
+                  <a16:creationId xmlns:a16="http://schemas.microsoft.com/office/drawing/2014/main" xmlns="" id="{54420CFE-F482-466E-9E1E-C78513C0B85D}"/>
                 </a:ext>
                 <a:ext uri="{C183D7F6-B498-43B3-948B-1728B52AA6E4}">
-                  <adec:decorative xmlns:adec="http://schemas.microsoft.com/office/drawing/2017/decorative" val="1"/>
+                  <adec:decorative xmlns:adec="http://schemas.microsoft.com/office/drawing/2017/decorative" xmlns="" val="1"/>
                 </a:ext>
               </a:extLst>
             </p:cNvPr>
@@ -11973,7 +11973,7 @@
             <p:nvPr>
               <p:extLst>
                 <p:ext uri="{386F3935-93C4-4BCD-93E2-E3B085C9AB24}">
-                  <p16:designElem xmlns:p16="http://schemas.microsoft.com/office/powerpoint/2015/main" val="1"/>
+                  <p16:designElem xmlns:p16="http://schemas.microsoft.com/office/powerpoint/2015/main" xmlns="" val="1"/>
                 </p:ext>
               </p:extLst>
             </p:nvPr>
@@ -12014,10 +12014,10 @@
             <p:cNvPr id="10" name="Straight Connector 9">
               <a:extLst>
                 <a:ext uri="{FF2B5EF4-FFF2-40B4-BE49-F238E27FC236}">
-                  <a16:creationId xmlns:a16="http://schemas.microsoft.com/office/drawing/2014/main" id="{5331032B-BD21-4BDA-920C-12E358052567}"/>
+                  <a16:creationId xmlns:a16="http://schemas.microsoft.com/office/drawing/2014/main" xmlns="" id="{5331032B-BD21-4BDA-920C-12E358052567}"/>
                 </a:ext>
                 <a:ext uri="{C183D7F6-B498-43B3-948B-1728B52AA6E4}">
-                  <adec:decorative xmlns:adec="http://schemas.microsoft.com/office/drawing/2017/decorative" val="1"/>
+                  <adec:decorative xmlns:adec="http://schemas.microsoft.com/office/drawing/2017/decorative" xmlns="" val="1"/>
                 </a:ext>
               </a:extLst>
             </p:cNvPr>
@@ -12025,7 +12025,7 @@
             <p:nvPr>
               <p:extLst>
                 <p:ext uri="{386F3935-93C4-4BCD-93E2-E3B085C9AB24}">
-                  <p16:designElem xmlns:p16="http://schemas.microsoft.com/office/powerpoint/2015/main" val="1"/>
+                  <p16:designElem xmlns:p16="http://schemas.microsoft.com/office/powerpoint/2015/main" xmlns="" val="1"/>
                 </p:ext>
               </p:extLst>
             </p:nvPr>
@@ -12066,10 +12066,10 @@
             <p:cNvPr id="11" name="Rectangle 23">
               <a:extLst>
                 <a:ext uri="{FF2B5EF4-FFF2-40B4-BE49-F238E27FC236}">
-                  <a16:creationId xmlns:a16="http://schemas.microsoft.com/office/drawing/2014/main" id="{E7514DA3-59E7-409E-8A3B-AD097F6E5644}"/>
+                  <a16:creationId xmlns:a16="http://schemas.microsoft.com/office/drawing/2014/main" xmlns="" id="{E7514DA3-59E7-409E-8A3B-AD097F6E5644}"/>
                 </a:ext>
                 <a:ext uri="{C183D7F6-B498-43B3-948B-1728B52AA6E4}">
-                  <adec:decorative xmlns:adec="http://schemas.microsoft.com/office/drawing/2017/decorative" val="1"/>
+                  <adec:decorative xmlns:adec="http://schemas.microsoft.com/office/drawing/2017/decorative" xmlns="" val="1"/>
                 </a:ext>
               </a:extLst>
             </p:cNvPr>
@@ -12077,7 +12077,7 @@
             <p:nvPr>
               <p:extLst>
                 <p:ext uri="{386F3935-93C4-4BCD-93E2-E3B085C9AB24}">
-                  <p16:designElem xmlns:p16="http://schemas.microsoft.com/office/powerpoint/2015/main" val="1"/>
+                  <p16:designElem xmlns:p16="http://schemas.microsoft.com/office/powerpoint/2015/main" xmlns="" val="1"/>
                 </p:ext>
               </p:extLst>
             </p:nvPr>
@@ -12144,10 +12144,10 @@
             <p:cNvPr id="12" name="Rectangle 25">
               <a:extLst>
                 <a:ext uri="{FF2B5EF4-FFF2-40B4-BE49-F238E27FC236}">
-                  <a16:creationId xmlns:a16="http://schemas.microsoft.com/office/drawing/2014/main" id="{57B9A2A6-3BE4-4599-9364-F71C5BFD61F8}"/>
+                  <a16:creationId xmlns:a16="http://schemas.microsoft.com/office/drawing/2014/main" xmlns="" id="{57B9A2A6-3BE4-4599-9364-F71C5BFD61F8}"/>
                 </a:ext>
                 <a:ext uri="{C183D7F6-B498-43B3-948B-1728B52AA6E4}">
-                  <adec:decorative xmlns:adec="http://schemas.microsoft.com/office/drawing/2017/decorative" val="1"/>
+                  <adec:decorative xmlns:adec="http://schemas.microsoft.com/office/drawing/2017/decorative" xmlns="" val="1"/>
                 </a:ext>
               </a:extLst>
             </p:cNvPr>
@@ -12155,7 +12155,7 @@
             <p:nvPr>
               <p:extLst>
                 <p:ext uri="{386F3935-93C4-4BCD-93E2-E3B085C9AB24}">
-                  <p16:designElem xmlns:p16="http://schemas.microsoft.com/office/powerpoint/2015/main" val="1"/>
+                  <p16:designElem xmlns:p16="http://schemas.microsoft.com/office/powerpoint/2015/main" xmlns="" val="1"/>
                 </p:ext>
               </p:extLst>
             </p:nvPr>
@@ -12222,10 +12222,10 @@
             <p:cNvPr id="13" name="Isosceles Triangle 12">
               <a:extLst>
                 <a:ext uri="{FF2B5EF4-FFF2-40B4-BE49-F238E27FC236}">
-                  <a16:creationId xmlns:a16="http://schemas.microsoft.com/office/drawing/2014/main" id="{4FD744C6-4ED8-4BC9-BF68-6BDF701C5DB4}"/>
+                  <a16:creationId xmlns:a16="http://schemas.microsoft.com/office/drawing/2014/main" xmlns="" id="{4FD744C6-4ED8-4BC9-BF68-6BDF701C5DB4}"/>
                 </a:ext>
                 <a:ext uri="{C183D7F6-B498-43B3-948B-1728B52AA6E4}">
-                  <adec:decorative xmlns:adec="http://schemas.microsoft.com/office/drawing/2017/decorative" val="1"/>
+                  <adec:decorative xmlns:adec="http://schemas.microsoft.com/office/drawing/2017/decorative" xmlns="" val="1"/>
                 </a:ext>
               </a:extLst>
             </p:cNvPr>
@@ -12233,7 +12233,7 @@
             <p:nvPr>
               <p:extLst>
                 <p:ext uri="{386F3935-93C4-4BCD-93E2-E3B085C9AB24}">
-                  <p16:designElem xmlns:p16="http://schemas.microsoft.com/office/powerpoint/2015/main" val="1"/>
+                  <p16:designElem xmlns:p16="http://schemas.microsoft.com/office/powerpoint/2015/main" xmlns="" val="1"/>
                 </p:ext>
               </p:extLst>
             </p:nvPr>
@@ -12278,10 +12278,10 @@
             <p:cNvPr id="14" name="Rectangle 27">
               <a:extLst>
                 <a:ext uri="{FF2B5EF4-FFF2-40B4-BE49-F238E27FC236}">
-                  <a16:creationId xmlns:a16="http://schemas.microsoft.com/office/drawing/2014/main" id="{092C5BAD-C911-4F8F-A1C5-470268BE668B}"/>
+                  <a16:creationId xmlns:a16="http://schemas.microsoft.com/office/drawing/2014/main" xmlns="" id="{092C5BAD-C911-4F8F-A1C5-470268BE668B}"/>
                 </a:ext>
                 <a:ext uri="{C183D7F6-B498-43B3-948B-1728B52AA6E4}">
-                  <adec:decorative xmlns:adec="http://schemas.microsoft.com/office/drawing/2017/decorative" val="1"/>
+                  <adec:decorative xmlns:adec="http://schemas.microsoft.com/office/drawing/2017/decorative" xmlns="" val="1"/>
                 </a:ext>
               </a:extLst>
             </p:cNvPr>
@@ -12289,7 +12289,7 @@
             <p:nvPr>
               <p:extLst>
                 <p:ext uri="{386F3935-93C4-4BCD-93E2-E3B085C9AB24}">
-                  <p16:designElem xmlns:p16="http://schemas.microsoft.com/office/powerpoint/2015/main" val="1"/>
+                  <p16:designElem xmlns:p16="http://schemas.microsoft.com/office/powerpoint/2015/main" xmlns="" val="1"/>
                 </p:ext>
               </p:extLst>
             </p:nvPr>
@@ -12357,10 +12357,10 @@
             <p:cNvPr id="15" name="Rectangle 28">
               <a:extLst>
                 <a:ext uri="{FF2B5EF4-FFF2-40B4-BE49-F238E27FC236}">
-                  <a16:creationId xmlns:a16="http://schemas.microsoft.com/office/drawing/2014/main" id="{B133D0C8-4EC4-424F-8E70-0482D5B1B653}"/>
+                  <a16:creationId xmlns:a16="http://schemas.microsoft.com/office/drawing/2014/main" xmlns="" id="{B133D0C8-4EC4-424F-8E70-0482D5B1B653}"/>
                 </a:ext>
                 <a:ext uri="{C183D7F6-B498-43B3-948B-1728B52AA6E4}">
-                  <adec:decorative xmlns:adec="http://schemas.microsoft.com/office/drawing/2017/decorative" val="1"/>
+                  <adec:decorative xmlns:adec="http://schemas.microsoft.com/office/drawing/2017/decorative" xmlns="" val="1"/>
                 </a:ext>
               </a:extLst>
             </p:cNvPr>
@@ -12368,7 +12368,7 @@
             <p:nvPr>
               <p:extLst>
                 <p:ext uri="{386F3935-93C4-4BCD-93E2-E3B085C9AB24}">
-                  <p16:designElem xmlns:p16="http://schemas.microsoft.com/office/powerpoint/2015/main" val="1"/>
+                  <p16:designElem xmlns:p16="http://schemas.microsoft.com/office/powerpoint/2015/main" xmlns="" val="1"/>
                 </p:ext>
               </p:extLst>
             </p:nvPr>
@@ -12437,10 +12437,10 @@
             <p:cNvPr id="16" name="Rectangle 29">
               <a:extLst>
                 <a:ext uri="{FF2B5EF4-FFF2-40B4-BE49-F238E27FC236}">
-                  <a16:creationId xmlns:a16="http://schemas.microsoft.com/office/drawing/2014/main" id="{7B1532A0-F4B3-4DE8-B18F-740CAAD25AC4}"/>
+                  <a16:creationId xmlns:a16="http://schemas.microsoft.com/office/drawing/2014/main" xmlns="" id="{7B1532A0-F4B3-4DE8-B18F-740CAAD25AC4}"/>
                 </a:ext>
                 <a:ext uri="{C183D7F6-B498-43B3-948B-1728B52AA6E4}">
-                  <adec:decorative xmlns:adec="http://schemas.microsoft.com/office/drawing/2017/decorative" val="1"/>
+                  <adec:decorative xmlns:adec="http://schemas.microsoft.com/office/drawing/2017/decorative" xmlns="" val="1"/>
                 </a:ext>
               </a:extLst>
             </p:cNvPr>
@@ -12448,7 +12448,7 @@
             <p:nvPr>
               <p:extLst>
                 <p:ext uri="{386F3935-93C4-4BCD-93E2-E3B085C9AB24}">
-                  <p16:designElem xmlns:p16="http://schemas.microsoft.com/office/powerpoint/2015/main" val="1"/>
+                  <p16:designElem xmlns:p16="http://schemas.microsoft.com/office/powerpoint/2015/main" xmlns="" val="1"/>
                 </p:ext>
               </p:extLst>
             </p:nvPr>
@@ -12515,10 +12515,10 @@
             <p:cNvPr id="17" name="Isosceles Triangle 16">
               <a:extLst>
                 <a:ext uri="{FF2B5EF4-FFF2-40B4-BE49-F238E27FC236}">
-                  <a16:creationId xmlns:a16="http://schemas.microsoft.com/office/drawing/2014/main" id="{8EFDD162-BBBA-4062-8BBF-53DBA1091374}"/>
+                  <a16:creationId xmlns:a16="http://schemas.microsoft.com/office/drawing/2014/main" xmlns="" id="{8EFDD162-BBBA-4062-8BBF-53DBA1091374}"/>
                 </a:ext>
                 <a:ext uri="{C183D7F6-B498-43B3-948B-1728B52AA6E4}">
-                  <adec:decorative xmlns:adec="http://schemas.microsoft.com/office/drawing/2017/decorative" val="1"/>
+                  <adec:decorative xmlns:adec="http://schemas.microsoft.com/office/drawing/2017/decorative" xmlns="" val="1"/>
                 </a:ext>
               </a:extLst>
             </p:cNvPr>
@@ -12526,7 +12526,7 @@
             <p:nvPr>
               <p:extLst>
                 <p:ext uri="{386F3935-93C4-4BCD-93E2-E3B085C9AB24}">
-                  <p16:designElem xmlns:p16="http://schemas.microsoft.com/office/powerpoint/2015/main" val="1"/>
+                  <p16:designElem xmlns:p16="http://schemas.microsoft.com/office/powerpoint/2015/main" xmlns="" val="1"/>
                 </p:ext>
               </p:extLst>
             </p:nvPr>
@@ -12571,10 +12571,10 @@
             <p:cNvPr id="18" name="Isosceles Triangle 17">
               <a:extLst>
                 <a:ext uri="{FF2B5EF4-FFF2-40B4-BE49-F238E27FC236}">
-                  <a16:creationId xmlns:a16="http://schemas.microsoft.com/office/drawing/2014/main" id="{DCFC9E65-3E19-4483-B952-25D29683CA56}"/>
+                  <a16:creationId xmlns:a16="http://schemas.microsoft.com/office/drawing/2014/main" xmlns="" id="{DCFC9E65-3E19-4483-B952-25D29683CA56}"/>
                 </a:ext>
                 <a:ext uri="{C183D7F6-B498-43B3-948B-1728B52AA6E4}">
-                  <adec:decorative xmlns:adec="http://schemas.microsoft.com/office/drawing/2017/decorative" val="1"/>
+                  <adec:decorative xmlns:adec="http://schemas.microsoft.com/office/drawing/2017/decorative" xmlns="" val="1"/>
                 </a:ext>
               </a:extLst>
             </p:cNvPr>
@@ -12582,7 +12582,7 @@
             <p:nvPr>
               <p:extLst>
                 <p:ext uri="{386F3935-93C4-4BCD-93E2-E3B085C9AB24}">
-                  <p16:designElem xmlns:p16="http://schemas.microsoft.com/office/powerpoint/2015/main" val="1"/>
+                  <p16:designElem xmlns:p16="http://schemas.microsoft.com/office/powerpoint/2015/main" xmlns="" val="1"/>
                 </p:ext>
               </p:extLst>
             </p:nvPr>
@@ -12628,10 +12628,10 @@
           <p:cNvPr id="20" name="Rectangle 19">
             <a:extLst>
               <a:ext uri="{FF2B5EF4-FFF2-40B4-BE49-F238E27FC236}">
-                <a16:creationId xmlns:a16="http://schemas.microsoft.com/office/drawing/2014/main" id="{2783C067-F8BF-4755-B516-8A0CD74CF60C}"/>
+                <a16:creationId xmlns:a16="http://schemas.microsoft.com/office/drawing/2014/main" xmlns="" id="{2783C067-F8BF-4755-B516-8A0CD74CF60C}"/>
               </a:ext>
               <a:ext uri="{C183D7F6-B498-43B3-948B-1728B52AA6E4}">
-                <adec:decorative xmlns:adec="http://schemas.microsoft.com/office/drawing/2017/decorative" val="1"/>
+                <adec:decorative xmlns:adec="http://schemas.microsoft.com/office/drawing/2017/decorative" xmlns="" val="1"/>
               </a:ext>
             </a:extLst>
           </p:cNvPr>
@@ -12641,7 +12641,7 @@
           <p:nvPr>
             <p:extLst>
               <p:ext uri="{386F3935-93C4-4BCD-93E2-E3B085C9AB24}">
-                <p16:designElem xmlns:p16="http://schemas.microsoft.com/office/powerpoint/2015/main" val="1"/>
+                <p16:designElem xmlns:p16="http://schemas.microsoft.com/office/powerpoint/2015/main" xmlns="" val="1"/>
               </p:ext>
             </p:extLst>
           </p:nvPr>
@@ -12688,10 +12688,10 @@
           <p:cNvPr id="22" name="Isosceles Triangle 21">
             <a:extLst>
               <a:ext uri="{FF2B5EF4-FFF2-40B4-BE49-F238E27FC236}">
-                <a16:creationId xmlns:a16="http://schemas.microsoft.com/office/drawing/2014/main" id="{2ED796EC-E7FF-46DB-B912-FB08BF12AA6E}"/>
+                <a16:creationId xmlns:a16="http://schemas.microsoft.com/office/drawing/2014/main" xmlns="" id="{2ED796EC-E7FF-46DB-B912-FB08BF12AA6E}"/>
               </a:ext>
               <a:ext uri="{C183D7F6-B498-43B3-948B-1728B52AA6E4}">
-                <adec:decorative xmlns:adec="http://schemas.microsoft.com/office/drawing/2017/decorative" val="1"/>
+                <adec:decorative xmlns:adec="http://schemas.microsoft.com/office/drawing/2017/decorative" xmlns="" val="1"/>
               </a:ext>
             </a:extLst>
           </p:cNvPr>
@@ -12701,7 +12701,7 @@
           <p:nvPr>
             <p:extLst>
               <p:ext uri="{386F3935-93C4-4BCD-93E2-E3B085C9AB24}">
-                <p16:designElem xmlns:p16="http://schemas.microsoft.com/office/powerpoint/2015/main" val="1"/>
+                <p16:designElem xmlns:p16="http://schemas.microsoft.com/office/powerpoint/2015/main" xmlns="" val="1"/>
               </p:ext>
             </p:extLst>
           </p:nvPr>
@@ -12744,10 +12744,10 @@
           <p:cNvPr id="24" name="Isosceles Triangle 23">
             <a:extLst>
               <a:ext uri="{FF2B5EF4-FFF2-40B4-BE49-F238E27FC236}">
-                <a16:creationId xmlns:a16="http://schemas.microsoft.com/office/drawing/2014/main" id="{549A2DAB-B431-487D-95AD-BB0FECB49E57}"/>
+                <a16:creationId xmlns:a16="http://schemas.microsoft.com/office/drawing/2014/main" xmlns="" id="{549A2DAB-B431-487D-95AD-BB0FECB49E57}"/>
               </a:ext>
               <a:ext uri="{C183D7F6-B498-43B3-948B-1728B52AA6E4}">
-                <adec:decorative xmlns:adec="http://schemas.microsoft.com/office/drawing/2017/decorative" val="1"/>
+                <adec:decorative xmlns:adec="http://schemas.microsoft.com/office/drawing/2017/decorative" xmlns="" val="1"/>
               </a:ext>
             </a:extLst>
           </p:cNvPr>
@@ -12757,7 +12757,7 @@
           <p:nvPr>
             <p:extLst>
               <p:ext uri="{386F3935-93C4-4BCD-93E2-E3B085C9AB24}">
-                <p16:designElem xmlns:p16="http://schemas.microsoft.com/office/powerpoint/2015/main" val="1"/>
+                <p16:designElem xmlns:p16="http://schemas.microsoft.com/office/powerpoint/2015/main" xmlns="" val="1"/>
               </p:ext>
             </p:extLst>
           </p:nvPr>
@@ -12802,10 +12802,10 @@
           <p:cNvPr id="26" name="Rectangle 27">
             <a:extLst>
               <a:ext uri="{FF2B5EF4-FFF2-40B4-BE49-F238E27FC236}">
-                <a16:creationId xmlns:a16="http://schemas.microsoft.com/office/drawing/2014/main" id="{0819F787-32B4-46A8-BC57-C6571BCEE243}"/>
+                <a16:creationId xmlns:a16="http://schemas.microsoft.com/office/drawing/2014/main" xmlns="" id="{0819F787-32B4-46A8-BC57-C6571BCEE243}"/>
               </a:ext>
               <a:ext uri="{C183D7F6-B498-43B3-948B-1728B52AA6E4}">
-                <adec:decorative xmlns:adec="http://schemas.microsoft.com/office/drawing/2017/decorative" val="1"/>
+                <adec:decorative xmlns:adec="http://schemas.microsoft.com/office/drawing/2017/decorative" xmlns="" val="1"/>
               </a:ext>
             </a:extLst>
           </p:cNvPr>
@@ -12815,7 +12815,7 @@
           <p:nvPr>
             <p:extLst>
               <p:ext uri="{386F3935-93C4-4BCD-93E2-E3B085C9AB24}">
-                <p16:designElem xmlns:p16="http://schemas.microsoft.com/office/powerpoint/2015/main" val="1"/>
+                <p16:designElem xmlns:p16="http://schemas.microsoft.com/office/powerpoint/2015/main" xmlns="" val="1"/>
               </p:ext>
             </p:extLst>
           </p:nvPr>
@@ -12880,10 +12880,10 @@
           <p:cNvPr id="28" name="Straight Connector 27">
             <a:extLst>
               <a:ext uri="{FF2B5EF4-FFF2-40B4-BE49-F238E27FC236}">
-                <a16:creationId xmlns:a16="http://schemas.microsoft.com/office/drawing/2014/main" id="{C5ECDEE1-7093-418F-9CF5-24EEB115C1C1}"/>
+                <a16:creationId xmlns:a16="http://schemas.microsoft.com/office/drawing/2014/main" xmlns="" id="{C5ECDEE1-7093-418F-9CF5-24EEB115C1C1}"/>
               </a:ext>
               <a:ext uri="{C183D7F6-B498-43B3-948B-1728B52AA6E4}">
-                <adec:decorative xmlns:adec="http://schemas.microsoft.com/office/drawing/2017/decorative" val="1"/>
+                <adec:decorative xmlns:adec="http://schemas.microsoft.com/office/drawing/2017/decorative" xmlns="" val="1"/>
               </a:ext>
             </a:extLst>
           </p:cNvPr>
@@ -12893,7 +12893,7 @@
           <p:nvPr>
             <p:extLst>
               <p:ext uri="{386F3935-93C4-4BCD-93E2-E3B085C9AB24}">
-                <p16:designElem xmlns:p16="http://schemas.microsoft.com/office/powerpoint/2015/main" val="1"/>
+                <p16:designElem xmlns:p16="http://schemas.microsoft.com/office/powerpoint/2015/main" xmlns="" val="1"/>
               </p:ext>
             </p:extLst>
           </p:nvPr>
@@ -12933,10 +12933,10 @@
           <p:cNvPr id="30" name="Straight Connector 29">
             <a:extLst>
               <a:ext uri="{FF2B5EF4-FFF2-40B4-BE49-F238E27FC236}">
-                <a16:creationId xmlns:a16="http://schemas.microsoft.com/office/drawing/2014/main" id="{045062AF-EB11-4651-BC4A-4DA21768DE8E}"/>
+                <a16:creationId xmlns:a16="http://schemas.microsoft.com/office/drawing/2014/main" xmlns="" id="{045062AF-EB11-4651-BC4A-4DA21768DE8E}"/>
               </a:ext>
               <a:ext uri="{C183D7F6-B498-43B3-948B-1728B52AA6E4}">
-                <adec:decorative xmlns:adec="http://schemas.microsoft.com/office/drawing/2017/decorative" val="1"/>
+                <adec:decorative xmlns:adec="http://schemas.microsoft.com/office/drawing/2017/decorative" xmlns="" val="1"/>
               </a:ext>
             </a:extLst>
           </p:cNvPr>
@@ -12946,7 +12946,7 @@
           <p:nvPr>
             <p:extLst>
               <p:ext uri="{386F3935-93C4-4BCD-93E2-E3B085C9AB24}">
-                <p16:designElem xmlns:p16="http://schemas.microsoft.com/office/powerpoint/2015/main" val="1"/>
+                <p16:designElem xmlns:p16="http://schemas.microsoft.com/office/powerpoint/2015/main" xmlns="" val="1"/>
               </p:ext>
             </p:extLst>
           </p:nvPr>
@@ -12985,7 +12985,7 @@
           <p:cNvPr id="3" name="Tytuł 1">
             <a:extLst>
               <a:ext uri="{FF2B5EF4-FFF2-40B4-BE49-F238E27FC236}">
-                <a16:creationId xmlns:a16="http://schemas.microsoft.com/office/drawing/2014/main" id="{5E35C810-131E-41A2-8782-357CEDF6392D}"/>
+                <a16:creationId xmlns:a16="http://schemas.microsoft.com/office/drawing/2014/main" xmlns="" id="{5E35C810-131E-41A2-8782-357CEDF6392D}"/>
               </a:ext>
             </a:extLst>
           </p:cNvPr>
@@ -13139,10 +13139,10 @@
           <p:cNvPr id="23" name="Rectangle 8">
             <a:extLst>
               <a:ext uri="{FF2B5EF4-FFF2-40B4-BE49-F238E27FC236}">
-                <a16:creationId xmlns:a16="http://schemas.microsoft.com/office/drawing/2014/main" id="{AA3CC463-F933-4AC4-86E1-5AC14B0C3163}"/>
+                <a16:creationId xmlns:a16="http://schemas.microsoft.com/office/drawing/2014/main" xmlns="" id="{AA3CC463-F933-4AC4-86E1-5AC14B0C3163}"/>
               </a:ext>
               <a:ext uri="{C183D7F6-B498-43B3-948B-1728B52AA6E4}">
-                <adec:decorative xmlns:adec="http://schemas.microsoft.com/office/drawing/2017/decorative" val="1"/>
+                <adec:decorative xmlns:adec="http://schemas.microsoft.com/office/drawing/2017/decorative" xmlns="" val="1"/>
               </a:ext>
             </a:extLst>
           </p:cNvPr>
@@ -13152,7 +13152,7 @@
           <p:nvPr>
             <p:extLst>
               <p:ext uri="{386F3935-93C4-4BCD-93E2-E3B085C9AB24}">
-                <p16:designElem xmlns:p16="http://schemas.microsoft.com/office/powerpoint/2015/main" val="1"/>
+                <p16:designElem xmlns:p16="http://schemas.microsoft.com/office/powerpoint/2015/main" xmlns="" val="1"/>
               </p:ext>
             </p:extLst>
           </p:nvPr>
@@ -13205,10 +13205,10 @@
           <p:cNvPr id="24" name="Rectangle 10">
             <a:extLst>
               <a:ext uri="{FF2B5EF4-FFF2-40B4-BE49-F238E27FC236}">
-                <a16:creationId xmlns:a16="http://schemas.microsoft.com/office/drawing/2014/main" id="{6025D2DB-A12A-44DB-B00E-F4D622329EDD}"/>
+                <a16:creationId xmlns:a16="http://schemas.microsoft.com/office/drawing/2014/main" xmlns="" id="{6025D2DB-A12A-44DB-B00E-F4D622329EDD}"/>
               </a:ext>
               <a:ext uri="{C183D7F6-B498-43B3-948B-1728B52AA6E4}">
-                <adec:decorative xmlns:adec="http://schemas.microsoft.com/office/drawing/2017/decorative" val="1"/>
+                <adec:decorative xmlns:adec="http://schemas.microsoft.com/office/drawing/2017/decorative" xmlns="" val="1"/>
               </a:ext>
             </a:extLst>
           </p:cNvPr>
@@ -13218,7 +13218,7 @@
           <p:nvPr>
             <p:extLst>
               <p:ext uri="{386F3935-93C4-4BCD-93E2-E3B085C9AB24}">
-                <p16:designElem xmlns:p16="http://schemas.microsoft.com/office/powerpoint/2015/main" val="1"/>
+                <p16:designElem xmlns:p16="http://schemas.microsoft.com/office/powerpoint/2015/main" xmlns="" val="1"/>
               </p:ext>
             </p:extLst>
           </p:nvPr>
@@ -13270,7 +13270,7 @@
           <p:cNvPr id="3" name="slide10">
             <a:extLst>
               <a:ext uri="{FF2B5EF4-FFF2-40B4-BE49-F238E27FC236}">
-                <a16:creationId xmlns:a16="http://schemas.microsoft.com/office/drawing/2014/main" id="{F045544C-9DD1-4338-B4A7-CA589E7A5973}"/>
+                <a16:creationId xmlns:a16="http://schemas.microsoft.com/office/drawing/2014/main" xmlns="" id="{F045544C-9DD1-4338-B4A7-CA589E7A5973}"/>
               </a:ext>
             </a:extLst>
           </p:cNvPr>
@@ -13280,7 +13280,7 @@
           <p:nvPr/>
         </p:nvPicPr>
         <p:blipFill>
-          <a:blip r:embed="rId2">
+          <a:blip r:embed="rId2" cstate="print">
             <a:extLst>
               <a:ext uri="{28A0092B-C50C-407E-A947-70E740481C1C}">
                 <a14:useLocalDpi xmlns:a14="http://schemas.microsoft.com/office/drawing/2010/main" val="0"/>
@@ -13306,10 +13306,10 @@
           <p:cNvPr id="13" name="Rectangle 12">
             <a:extLst>
               <a:ext uri="{FF2B5EF4-FFF2-40B4-BE49-F238E27FC236}">
-                <a16:creationId xmlns:a16="http://schemas.microsoft.com/office/drawing/2014/main" id="{CE7E7877-F64E-4EEA-B778-138031EFF874}"/>
+                <a16:creationId xmlns:a16="http://schemas.microsoft.com/office/drawing/2014/main" xmlns="" id="{CE7E7877-F64E-4EEA-B778-138031EFF874}"/>
               </a:ext>
               <a:ext uri="{C183D7F6-B498-43B3-948B-1728B52AA6E4}">
-                <adec:decorative xmlns:adec="http://schemas.microsoft.com/office/drawing/2017/decorative" val="1"/>
+                <adec:decorative xmlns:adec="http://schemas.microsoft.com/office/drawing/2017/decorative" xmlns="" val="1"/>
               </a:ext>
             </a:extLst>
           </p:cNvPr>
@@ -13319,7 +13319,7 @@
           <p:nvPr>
             <p:extLst>
               <p:ext uri="{386F3935-93C4-4BCD-93E2-E3B085C9AB24}">
-                <p16:designElem xmlns:p16="http://schemas.microsoft.com/office/powerpoint/2015/main" val="1"/>
+                <p16:designElem xmlns:p16="http://schemas.microsoft.com/office/powerpoint/2015/main" xmlns="" val="1"/>
               </p:ext>
             </p:extLst>
           </p:nvPr>
@@ -13371,7 +13371,7 @@
           <p:cNvPr id="4" name="slide8">
             <a:extLst>
               <a:ext uri="{FF2B5EF4-FFF2-40B4-BE49-F238E27FC236}">
-                <a16:creationId xmlns:a16="http://schemas.microsoft.com/office/drawing/2014/main" id="{FA5C2059-60E2-4564-A338-7D03B245AC0A}"/>
+                <a16:creationId xmlns:a16="http://schemas.microsoft.com/office/drawing/2014/main" xmlns="" id="{FA5C2059-60E2-4564-A338-7D03B245AC0A}"/>
               </a:ext>
             </a:extLst>
           </p:cNvPr>
@@ -13381,7 +13381,7 @@
           <p:nvPr/>
         </p:nvPicPr>
         <p:blipFill>
-          <a:blip r:embed="rId3">
+          <a:blip r:embed="rId3" cstate="print">
             <a:extLst>
               <a:ext uri="{28A0092B-C50C-407E-A947-70E740481C1C}">
                 <a14:useLocalDpi xmlns:a14="http://schemas.microsoft.com/office/drawing/2010/main" val="0"/>
@@ -13407,10 +13407,10 @@
           <p:cNvPr id="25" name="Rectangle 14">
             <a:extLst>
               <a:ext uri="{FF2B5EF4-FFF2-40B4-BE49-F238E27FC236}">
-                <a16:creationId xmlns:a16="http://schemas.microsoft.com/office/drawing/2014/main" id="{7DD6C4F3-70FD-4F13-919C-702EE4886499}"/>
+                <a16:creationId xmlns:a16="http://schemas.microsoft.com/office/drawing/2014/main" xmlns="" id="{7DD6C4F3-70FD-4F13-919C-702EE4886499}"/>
               </a:ext>
               <a:ext uri="{C183D7F6-B498-43B3-948B-1728B52AA6E4}">
-                <adec:decorative xmlns:adec="http://schemas.microsoft.com/office/drawing/2017/decorative" val="1"/>
+                <adec:decorative xmlns:adec="http://schemas.microsoft.com/office/drawing/2017/decorative" xmlns="" val="1"/>
               </a:ext>
             </a:extLst>
           </p:cNvPr>
@@ -13420,7 +13420,7 @@
           <p:nvPr>
             <p:extLst>
               <p:ext uri="{386F3935-93C4-4BCD-93E2-E3B085C9AB24}">
-                <p16:designElem xmlns:p16="http://schemas.microsoft.com/office/powerpoint/2015/main" val="1"/>
+                <p16:designElem xmlns:p16="http://schemas.microsoft.com/office/powerpoint/2015/main" xmlns="" val="1"/>
               </p:ext>
             </p:extLst>
           </p:nvPr>
@@ -13470,7 +13470,7 @@
           <p:cNvPr id="2" name="slide9">
             <a:extLst>
               <a:ext uri="{FF2B5EF4-FFF2-40B4-BE49-F238E27FC236}">
-                <a16:creationId xmlns:a16="http://schemas.microsoft.com/office/drawing/2014/main" id="{B1B15371-67D2-4221-AEE5-0CD2CEE4040E}"/>
+                <a16:creationId xmlns:a16="http://schemas.microsoft.com/office/drawing/2014/main" xmlns="" id="{B1B15371-67D2-4221-AEE5-0CD2CEE4040E}"/>
               </a:ext>
             </a:extLst>
           </p:cNvPr>
@@ -13544,7 +13544,7 @@
           <p:cNvPr id="3" name="slide4">
             <a:extLst>
               <a:ext uri="{FF2B5EF4-FFF2-40B4-BE49-F238E27FC236}">
-                <a16:creationId xmlns:a16="http://schemas.microsoft.com/office/drawing/2014/main" id="{69CBD875-E81A-4BB9-8585-DE34389A940B}"/>
+                <a16:creationId xmlns:a16="http://schemas.microsoft.com/office/drawing/2014/main" xmlns="" id="{69CBD875-E81A-4BB9-8585-DE34389A940B}"/>
               </a:ext>
             </a:extLst>
           </p:cNvPr>
@@ -13554,7 +13554,7 @@
           <p:nvPr/>
         </p:nvPicPr>
         <p:blipFill>
-          <a:blip r:embed="rId2">
+          <a:blip r:embed="rId2" cstate="print">
             <a:extLst>
               <a:ext uri="{28A0092B-C50C-407E-A947-70E740481C1C}">
                 <a14:useLocalDpi xmlns:a14="http://schemas.microsoft.com/office/drawing/2010/main" val="0"/>
@@ -13580,10 +13580,10 @@
           <p:cNvPr id="10" name="Straight Connector 9">
             <a:extLst>
               <a:ext uri="{FF2B5EF4-FFF2-40B4-BE49-F238E27FC236}">
-                <a16:creationId xmlns:a16="http://schemas.microsoft.com/office/drawing/2014/main" id="{91B6081D-D3E8-4209-B85B-EB1C655A6272}"/>
+                <a16:creationId xmlns:a16="http://schemas.microsoft.com/office/drawing/2014/main" xmlns="" id="{91B6081D-D3E8-4209-B85B-EB1C655A6272}"/>
               </a:ext>
               <a:ext uri="{C183D7F6-B498-43B3-948B-1728B52AA6E4}">
-                <adec:decorative xmlns:adec="http://schemas.microsoft.com/office/drawing/2017/decorative" val="1"/>
+                <adec:decorative xmlns:adec="http://schemas.microsoft.com/office/drawing/2017/decorative" xmlns="" val="1"/>
               </a:ext>
             </a:extLst>
           </p:cNvPr>
@@ -13593,7 +13593,7 @@
           <p:nvPr>
             <p:extLst>
               <p:ext uri="{386F3935-93C4-4BCD-93E2-E3B085C9AB24}">
-                <p16:designElem xmlns:p16="http://schemas.microsoft.com/office/powerpoint/2015/main" val="1"/>
+                <p16:designElem xmlns:p16="http://schemas.microsoft.com/office/powerpoint/2015/main" xmlns="" val="1"/>
               </p:ext>
             </p:extLst>
           </p:nvPr>
@@ -13632,7 +13632,7 @@
           <p:cNvPr id="4" name="slide5">
             <a:extLst>
               <a:ext uri="{FF2B5EF4-FFF2-40B4-BE49-F238E27FC236}">
-                <a16:creationId xmlns:a16="http://schemas.microsoft.com/office/drawing/2014/main" id="{B3624E7A-DAFC-4F71-B12D-D6336B95062E}"/>
+                <a16:creationId xmlns:a16="http://schemas.microsoft.com/office/drawing/2014/main" xmlns="" id="{B3624E7A-DAFC-4F71-B12D-D6336B95062E}"/>
               </a:ext>
             </a:extLst>
           </p:cNvPr>
@@ -13642,7 +13642,7 @@
           <p:nvPr/>
         </p:nvPicPr>
         <p:blipFill>
-          <a:blip r:embed="rId3">
+          <a:blip r:embed="rId3" cstate="print">
             <a:extLst>
               <a:ext uri="{28A0092B-C50C-407E-A947-70E740481C1C}">
                 <a14:useLocalDpi xmlns:a14="http://schemas.microsoft.com/office/drawing/2010/main" val="0"/>
@@ -13668,10 +13668,10 @@
           <p:cNvPr id="12" name="Straight Connector 11">
             <a:extLst>
               <a:ext uri="{FF2B5EF4-FFF2-40B4-BE49-F238E27FC236}">
-                <a16:creationId xmlns:a16="http://schemas.microsoft.com/office/drawing/2014/main" id="{28CA55E4-1295-45C8-BA05-5A9E705B749A}"/>
+                <a16:creationId xmlns:a16="http://schemas.microsoft.com/office/drawing/2014/main" xmlns="" id="{28CA55E4-1295-45C8-BA05-5A9E705B749A}"/>
               </a:ext>
               <a:ext uri="{C183D7F6-B498-43B3-948B-1728B52AA6E4}">
-                <adec:decorative xmlns:adec="http://schemas.microsoft.com/office/drawing/2017/decorative" val="1"/>
+                <adec:decorative xmlns:adec="http://schemas.microsoft.com/office/drawing/2017/decorative" xmlns="" val="1"/>
               </a:ext>
             </a:extLst>
           </p:cNvPr>
@@ -13681,7 +13681,7 @@
           <p:nvPr>
             <p:extLst>
               <p:ext uri="{386F3935-93C4-4BCD-93E2-E3B085C9AB24}">
-                <p16:designElem xmlns:p16="http://schemas.microsoft.com/office/powerpoint/2015/main" val="1"/>
+                <p16:designElem xmlns:p16="http://schemas.microsoft.com/office/powerpoint/2015/main" xmlns="" val="1"/>
               </p:ext>
             </p:extLst>
           </p:nvPr>
@@ -13720,10 +13720,10 @@
           <p:cNvPr id="14" name="Straight Connector 13">
             <a:extLst>
               <a:ext uri="{FF2B5EF4-FFF2-40B4-BE49-F238E27FC236}">
-                <a16:creationId xmlns:a16="http://schemas.microsoft.com/office/drawing/2014/main" id="{08C5794E-A9A1-4A23-AF68-C79A7822334C}"/>
+                <a16:creationId xmlns:a16="http://schemas.microsoft.com/office/drawing/2014/main" xmlns="" id="{08C5794E-A9A1-4A23-AF68-C79A7822334C}"/>
               </a:ext>
               <a:ext uri="{C183D7F6-B498-43B3-948B-1728B52AA6E4}">
-                <adec:decorative xmlns:adec="http://schemas.microsoft.com/office/drawing/2017/decorative" val="1"/>
+                <adec:decorative xmlns:adec="http://schemas.microsoft.com/office/drawing/2017/decorative" xmlns="" val="1"/>
               </a:ext>
             </a:extLst>
           </p:cNvPr>
@@ -13733,7 +13733,7 @@
           <p:nvPr>
             <p:extLst>
               <p:ext uri="{386F3935-93C4-4BCD-93E2-E3B085C9AB24}">
-                <p16:designElem xmlns:p16="http://schemas.microsoft.com/office/powerpoint/2015/main" val="1"/>
+                <p16:designElem xmlns:p16="http://schemas.microsoft.com/office/powerpoint/2015/main" xmlns="" val="1"/>
               </p:ext>
             </p:extLst>
           </p:nvPr>
@@ -13772,7 +13772,7 @@
           <p:cNvPr id="2" name="slide3">
             <a:extLst>
               <a:ext uri="{FF2B5EF4-FFF2-40B4-BE49-F238E27FC236}">
-                <a16:creationId xmlns:a16="http://schemas.microsoft.com/office/drawing/2014/main" id="{66226FF5-3052-4B87-B290-DF5322CE9FA9}"/>
+                <a16:creationId xmlns:a16="http://schemas.microsoft.com/office/drawing/2014/main" xmlns="" id="{66226FF5-3052-4B87-B290-DF5322CE9FA9}"/>
               </a:ext>
             </a:extLst>
           </p:cNvPr>
@@ -13782,7 +13782,7 @@
           <p:nvPr/>
         </p:nvPicPr>
         <p:blipFill>
-          <a:blip r:embed="rId4">
+          <a:blip r:embed="rId4" cstate="print">
             <a:extLst>
               <a:ext uri="{28A0092B-C50C-407E-A947-70E740481C1C}">
                 <a14:useLocalDpi xmlns:a14="http://schemas.microsoft.com/office/drawing/2010/main" val="0"/>
@@ -13808,7 +13808,7 @@
           <p:cNvPr id="5" name="slide6">
             <a:extLst>
               <a:ext uri="{FF2B5EF4-FFF2-40B4-BE49-F238E27FC236}">
-                <a16:creationId xmlns:a16="http://schemas.microsoft.com/office/drawing/2014/main" id="{68F416CC-D521-4273-BF3E-FA6181F163CC}"/>
+                <a16:creationId xmlns:a16="http://schemas.microsoft.com/office/drawing/2014/main" xmlns="" id="{68F416CC-D521-4273-BF3E-FA6181F163CC}"/>
               </a:ext>
             </a:extLst>
           </p:cNvPr>
@@ -13818,7 +13818,7 @@
           <p:nvPr/>
         </p:nvPicPr>
         <p:blipFill>
-          <a:blip r:embed="rId5">
+          <a:blip r:embed="rId5" cstate="print">
             <a:extLst>
               <a:ext uri="{28A0092B-C50C-407E-A947-70E740481C1C}">
                 <a14:useLocalDpi xmlns:a14="http://schemas.microsoft.com/office/drawing/2010/main" val="0"/>
@@ -13882,10 +13882,10 @@
           <p:cNvPr id="7" name="Rectangle 6">
             <a:extLst>
               <a:ext uri="{FF2B5EF4-FFF2-40B4-BE49-F238E27FC236}">
-                <a16:creationId xmlns:a16="http://schemas.microsoft.com/office/drawing/2014/main" id="{03E8462A-FEBA-4848-81CC-3F8DA3E477BE}"/>
+                <a16:creationId xmlns:a16="http://schemas.microsoft.com/office/drawing/2014/main" xmlns="" id="{03E8462A-FEBA-4848-81CC-3F8DA3E477BE}"/>
               </a:ext>
               <a:ext uri="{C183D7F6-B498-43B3-948B-1728B52AA6E4}">
-                <adec:decorative xmlns:adec="http://schemas.microsoft.com/office/drawing/2017/decorative" val="1"/>
+                <adec:decorative xmlns:adec="http://schemas.microsoft.com/office/drawing/2017/decorative" xmlns="" val="1"/>
               </a:ext>
             </a:extLst>
           </p:cNvPr>
@@ -13895,7 +13895,7 @@
           <p:nvPr>
             <p:extLst>
               <p:ext uri="{386F3935-93C4-4BCD-93E2-E3B085C9AB24}">
-                <p16:designElem xmlns:p16="http://schemas.microsoft.com/office/powerpoint/2015/main" val="1"/>
+                <p16:designElem xmlns:p16="http://schemas.microsoft.com/office/powerpoint/2015/main" xmlns="" val="1"/>
               </p:ext>
             </p:extLst>
           </p:nvPr>
@@ -13945,10 +13945,10 @@
           <p:cNvPr id="9" name="Group 8">
             <a:extLst>
               <a:ext uri="{FF2B5EF4-FFF2-40B4-BE49-F238E27FC236}">
-                <a16:creationId xmlns:a16="http://schemas.microsoft.com/office/drawing/2014/main" id="{2109F83F-40FE-4DB3-84CC-09FB3340D06D}"/>
+                <a16:creationId xmlns:a16="http://schemas.microsoft.com/office/drawing/2014/main" xmlns="" id="{2109F83F-40FE-4DB3-84CC-09FB3340D06D}"/>
               </a:ext>
               <a:ext uri="{C183D7F6-B498-43B3-948B-1728B52AA6E4}">
-                <adec:decorative xmlns:adec="http://schemas.microsoft.com/office/drawing/2017/decorative" val="1"/>
+                <adec:decorative xmlns:adec="http://schemas.microsoft.com/office/drawing/2017/decorative" xmlns="" val="1"/>
               </a:ext>
             </a:extLst>
           </p:cNvPr>
@@ -13958,7 +13958,7 @@
           <p:nvPr>
             <p:extLst>
               <p:ext uri="{386F3935-93C4-4BCD-93E2-E3B085C9AB24}">
-                <p16:designElem xmlns:p16="http://schemas.microsoft.com/office/powerpoint/2015/main" val="1"/>
+                <p16:designElem xmlns:p16="http://schemas.microsoft.com/office/powerpoint/2015/main" xmlns="" val="1"/>
               </p:ext>
             </p:extLst>
           </p:nvPr>
@@ -13976,10 +13976,10 @@
             <p:cNvPr id="10" name="Straight Connector 9">
               <a:extLst>
                 <a:ext uri="{FF2B5EF4-FFF2-40B4-BE49-F238E27FC236}">
-                  <a16:creationId xmlns:a16="http://schemas.microsoft.com/office/drawing/2014/main" id="{1DE492D7-C3C3-48FF-80C8-37021EA0262F}"/>
+                  <a16:creationId xmlns:a16="http://schemas.microsoft.com/office/drawing/2014/main" xmlns="" id="{1DE492D7-C3C3-48FF-80C8-37021EA0262F}"/>
                 </a:ext>
                 <a:ext uri="{C183D7F6-B498-43B3-948B-1728B52AA6E4}">
-                  <adec:decorative xmlns:adec="http://schemas.microsoft.com/office/drawing/2017/decorative" val="1"/>
+                  <adec:decorative xmlns:adec="http://schemas.microsoft.com/office/drawing/2017/decorative" xmlns="" val="1"/>
                 </a:ext>
               </a:extLst>
             </p:cNvPr>
@@ -13987,7 +13987,7 @@
             <p:nvPr>
               <p:extLst>
                 <p:ext uri="{386F3935-93C4-4BCD-93E2-E3B085C9AB24}">
-                  <p16:designElem xmlns:p16="http://schemas.microsoft.com/office/powerpoint/2015/main" val="1"/>
+                  <p16:designElem xmlns:p16="http://schemas.microsoft.com/office/powerpoint/2015/main" xmlns="" val="1"/>
                 </p:ext>
               </p:extLst>
             </p:nvPr>
@@ -14028,10 +14028,10 @@
             <p:cNvPr id="11" name="Rectangle 23">
               <a:extLst>
                 <a:ext uri="{FF2B5EF4-FFF2-40B4-BE49-F238E27FC236}">
-                  <a16:creationId xmlns:a16="http://schemas.microsoft.com/office/drawing/2014/main" id="{0B30FF97-2E9A-490A-AED2-90BA2E0EC17F}"/>
+                  <a16:creationId xmlns:a16="http://schemas.microsoft.com/office/drawing/2014/main" xmlns="" id="{0B30FF97-2E9A-490A-AED2-90BA2E0EC17F}"/>
                 </a:ext>
                 <a:ext uri="{C183D7F6-B498-43B3-948B-1728B52AA6E4}">
-                  <adec:decorative xmlns:adec="http://schemas.microsoft.com/office/drawing/2017/decorative" val="1"/>
+                  <adec:decorative xmlns:adec="http://schemas.microsoft.com/office/drawing/2017/decorative" xmlns="" val="1"/>
                 </a:ext>
               </a:extLst>
             </p:cNvPr>
@@ -14039,7 +14039,7 @@
             <p:nvPr>
               <p:extLst>
                 <p:ext uri="{386F3935-93C4-4BCD-93E2-E3B085C9AB24}">
-                  <p16:designElem xmlns:p16="http://schemas.microsoft.com/office/powerpoint/2015/main" val="1"/>
+                  <p16:designElem xmlns:p16="http://schemas.microsoft.com/office/powerpoint/2015/main" xmlns="" val="1"/>
                 </p:ext>
               </p:extLst>
             </p:nvPr>
@@ -14106,10 +14106,10 @@
             <p:cNvPr id="12" name="Rectangle 25">
               <a:extLst>
                 <a:ext uri="{FF2B5EF4-FFF2-40B4-BE49-F238E27FC236}">
-                  <a16:creationId xmlns:a16="http://schemas.microsoft.com/office/drawing/2014/main" id="{B6D53C7D-A312-47B6-A66A-230A19CFACA6}"/>
+                  <a16:creationId xmlns:a16="http://schemas.microsoft.com/office/drawing/2014/main" xmlns="" id="{B6D53C7D-A312-47B6-A66A-230A19CFACA6}"/>
                 </a:ext>
                 <a:ext uri="{C183D7F6-B498-43B3-948B-1728B52AA6E4}">
-                  <adec:decorative xmlns:adec="http://schemas.microsoft.com/office/drawing/2017/decorative" val="1"/>
+                  <adec:decorative xmlns:adec="http://schemas.microsoft.com/office/drawing/2017/decorative" xmlns="" val="1"/>
                 </a:ext>
               </a:extLst>
             </p:cNvPr>
@@ -14117,7 +14117,7 @@
             <p:nvPr>
               <p:extLst>
                 <p:ext uri="{386F3935-93C4-4BCD-93E2-E3B085C9AB24}">
-                  <p16:designElem xmlns:p16="http://schemas.microsoft.com/office/powerpoint/2015/main" val="1"/>
+                  <p16:designElem xmlns:p16="http://schemas.microsoft.com/office/powerpoint/2015/main" xmlns="" val="1"/>
                 </p:ext>
               </p:extLst>
             </p:nvPr>
@@ -14184,10 +14184,10 @@
             <p:cNvPr id="13" name="Isosceles Triangle 12">
               <a:extLst>
                 <a:ext uri="{FF2B5EF4-FFF2-40B4-BE49-F238E27FC236}">
-                  <a16:creationId xmlns:a16="http://schemas.microsoft.com/office/drawing/2014/main" id="{9329D58C-0D2E-4A2B-AD6A-9CEE506784A8}"/>
+                  <a16:creationId xmlns:a16="http://schemas.microsoft.com/office/drawing/2014/main" xmlns="" id="{9329D58C-0D2E-4A2B-AD6A-9CEE506784A8}"/>
                 </a:ext>
                 <a:ext uri="{C183D7F6-B498-43B3-948B-1728B52AA6E4}">
-                  <adec:decorative xmlns:adec="http://schemas.microsoft.com/office/drawing/2017/decorative" val="1"/>
+                  <adec:decorative xmlns:adec="http://schemas.microsoft.com/office/drawing/2017/decorative" xmlns="" val="1"/>
                 </a:ext>
               </a:extLst>
             </p:cNvPr>
@@ -14195,7 +14195,7 @@
             <p:nvPr>
               <p:extLst>
                 <p:ext uri="{386F3935-93C4-4BCD-93E2-E3B085C9AB24}">
-                  <p16:designElem xmlns:p16="http://schemas.microsoft.com/office/powerpoint/2015/main" val="1"/>
+                  <p16:designElem xmlns:p16="http://schemas.microsoft.com/office/powerpoint/2015/main" xmlns="" val="1"/>
                 </p:ext>
               </p:extLst>
             </p:nvPr>
@@ -14240,10 +14240,10 @@
             <p:cNvPr id="14" name="Rectangle 27">
               <a:extLst>
                 <a:ext uri="{FF2B5EF4-FFF2-40B4-BE49-F238E27FC236}">
-                  <a16:creationId xmlns:a16="http://schemas.microsoft.com/office/drawing/2014/main" id="{9D446EDE-C690-4461-8BF2-7634808FC8B4}"/>
+                  <a16:creationId xmlns:a16="http://schemas.microsoft.com/office/drawing/2014/main" xmlns="" id="{9D446EDE-C690-4461-8BF2-7634808FC8B4}"/>
                 </a:ext>
                 <a:ext uri="{C183D7F6-B498-43B3-948B-1728B52AA6E4}">
-                  <adec:decorative xmlns:adec="http://schemas.microsoft.com/office/drawing/2017/decorative" val="1"/>
+                  <adec:decorative xmlns:adec="http://schemas.microsoft.com/office/drawing/2017/decorative" xmlns="" val="1"/>
                 </a:ext>
               </a:extLst>
             </p:cNvPr>
@@ -14251,7 +14251,7 @@
             <p:nvPr>
               <p:extLst>
                 <p:ext uri="{386F3935-93C4-4BCD-93E2-E3B085C9AB24}">
-                  <p16:designElem xmlns:p16="http://schemas.microsoft.com/office/powerpoint/2015/main" val="1"/>
+                  <p16:designElem xmlns:p16="http://schemas.microsoft.com/office/powerpoint/2015/main" xmlns="" val="1"/>
                 </p:ext>
               </p:extLst>
             </p:nvPr>
@@ -14319,10 +14319,10 @@
             <p:cNvPr id="15" name="Rectangle 28">
               <a:extLst>
                 <a:ext uri="{FF2B5EF4-FFF2-40B4-BE49-F238E27FC236}">
-                  <a16:creationId xmlns:a16="http://schemas.microsoft.com/office/drawing/2014/main" id="{323F3D34-6531-4AD7-A8C6-195A090281A1}"/>
+                  <a16:creationId xmlns:a16="http://schemas.microsoft.com/office/drawing/2014/main" xmlns="" id="{323F3D34-6531-4AD7-A8C6-195A090281A1}"/>
                 </a:ext>
                 <a:ext uri="{C183D7F6-B498-43B3-948B-1728B52AA6E4}">
-                  <adec:decorative xmlns:adec="http://schemas.microsoft.com/office/drawing/2017/decorative" val="1"/>
+                  <adec:decorative xmlns:adec="http://schemas.microsoft.com/office/drawing/2017/decorative" xmlns="" val="1"/>
                 </a:ext>
               </a:extLst>
             </p:cNvPr>
@@ -14330,7 +14330,7 @@
             <p:nvPr>
               <p:extLst>
                 <p:ext uri="{386F3935-93C4-4BCD-93E2-E3B085C9AB24}">
-                  <p16:designElem xmlns:p16="http://schemas.microsoft.com/office/powerpoint/2015/main" val="1"/>
+                  <p16:designElem xmlns:p16="http://schemas.microsoft.com/office/powerpoint/2015/main" xmlns="" val="1"/>
                 </p:ext>
               </p:extLst>
             </p:nvPr>
@@ -14399,10 +14399,10 @@
             <p:cNvPr id="16" name="Rectangle 29">
               <a:extLst>
                 <a:ext uri="{FF2B5EF4-FFF2-40B4-BE49-F238E27FC236}">
-                  <a16:creationId xmlns:a16="http://schemas.microsoft.com/office/drawing/2014/main" id="{B9B0AE3F-2350-435F-A9B0-C310BF876385}"/>
+                  <a16:creationId xmlns:a16="http://schemas.microsoft.com/office/drawing/2014/main" xmlns="" id="{B9B0AE3F-2350-435F-A9B0-C310BF876385}"/>
                 </a:ext>
                 <a:ext uri="{C183D7F6-B498-43B3-948B-1728B52AA6E4}">
-                  <adec:decorative xmlns:adec="http://schemas.microsoft.com/office/drawing/2017/decorative" val="1"/>
+                  <adec:decorative xmlns:adec="http://schemas.microsoft.com/office/drawing/2017/decorative" xmlns="" val="1"/>
                 </a:ext>
               </a:extLst>
             </p:cNvPr>
@@ -14410,7 +14410,7 @@
             <p:nvPr>
               <p:extLst>
                 <p:ext uri="{386F3935-93C4-4BCD-93E2-E3B085C9AB24}">
-                  <p16:designElem xmlns:p16="http://schemas.microsoft.com/office/powerpoint/2015/main" val="1"/>
+                  <p16:designElem xmlns:p16="http://schemas.microsoft.com/office/powerpoint/2015/main" xmlns="" val="1"/>
                 </p:ext>
               </p:extLst>
             </p:nvPr>
@@ -14477,10 +14477,10 @@
             <p:cNvPr id="17" name="Isosceles Triangle 16">
               <a:extLst>
                 <a:ext uri="{FF2B5EF4-FFF2-40B4-BE49-F238E27FC236}">
-                  <a16:creationId xmlns:a16="http://schemas.microsoft.com/office/drawing/2014/main" id="{4EFA655C-9E50-4C14-A89E-AD7B648E4E2B}"/>
+                  <a16:creationId xmlns:a16="http://schemas.microsoft.com/office/drawing/2014/main" xmlns="" id="{4EFA655C-9E50-4C14-A89E-AD7B648E4E2B}"/>
                 </a:ext>
                 <a:ext uri="{C183D7F6-B498-43B3-948B-1728B52AA6E4}">
-                  <adec:decorative xmlns:adec="http://schemas.microsoft.com/office/drawing/2017/decorative" val="1"/>
+                  <adec:decorative xmlns:adec="http://schemas.microsoft.com/office/drawing/2017/decorative" xmlns="" val="1"/>
                 </a:ext>
               </a:extLst>
             </p:cNvPr>
@@ -14488,7 +14488,7 @@
             <p:nvPr>
               <p:extLst>
                 <p:ext uri="{386F3935-93C4-4BCD-93E2-E3B085C9AB24}">
-                  <p16:designElem xmlns:p16="http://schemas.microsoft.com/office/powerpoint/2015/main" val="1"/>
+                  <p16:designElem xmlns:p16="http://schemas.microsoft.com/office/powerpoint/2015/main" xmlns="" val="1"/>
                 </p:ext>
               </p:extLst>
             </p:nvPr>
@@ -14533,10 +14533,10 @@
             <p:cNvPr id="18" name="Isosceles Triangle 17">
               <a:extLst>
                 <a:ext uri="{FF2B5EF4-FFF2-40B4-BE49-F238E27FC236}">
-                  <a16:creationId xmlns:a16="http://schemas.microsoft.com/office/drawing/2014/main" id="{3E843863-7D25-4C01-9A17-E817CB6D998A}"/>
+                  <a16:creationId xmlns:a16="http://schemas.microsoft.com/office/drawing/2014/main" xmlns="" id="{3E843863-7D25-4C01-9A17-E817CB6D998A}"/>
                 </a:ext>
                 <a:ext uri="{C183D7F6-B498-43B3-948B-1728B52AA6E4}">
-                  <adec:decorative xmlns:adec="http://schemas.microsoft.com/office/drawing/2017/decorative" val="1"/>
+                  <adec:decorative xmlns:adec="http://schemas.microsoft.com/office/drawing/2017/decorative" xmlns="" val="1"/>
                 </a:ext>
               </a:extLst>
             </p:cNvPr>
@@ -14544,7 +14544,7 @@
             <p:nvPr>
               <p:extLst>
                 <p:ext uri="{386F3935-93C4-4BCD-93E2-E3B085C9AB24}">
-                  <p16:designElem xmlns:p16="http://schemas.microsoft.com/office/powerpoint/2015/main" val="1"/>
+                  <p16:designElem xmlns:p16="http://schemas.microsoft.com/office/powerpoint/2015/main" xmlns="" val="1"/>
                 </p:ext>
               </p:extLst>
             </p:nvPr>
@@ -14590,10 +14590,10 @@
           <p:cNvPr id="20" name="Rectangle 19">
             <a:extLst>
               <a:ext uri="{FF2B5EF4-FFF2-40B4-BE49-F238E27FC236}">
-                <a16:creationId xmlns:a16="http://schemas.microsoft.com/office/drawing/2014/main" id="{7941F9B1-B01B-4A84-89D9-B169AEB4E456}"/>
+                <a16:creationId xmlns:a16="http://schemas.microsoft.com/office/drawing/2014/main" xmlns="" id="{7941F9B1-B01B-4A84-89D9-B169AEB4E456}"/>
               </a:ext>
               <a:ext uri="{C183D7F6-B498-43B3-948B-1728B52AA6E4}">
-                <adec:decorative xmlns:adec="http://schemas.microsoft.com/office/drawing/2017/decorative" val="1"/>
+                <adec:decorative xmlns:adec="http://schemas.microsoft.com/office/drawing/2017/decorative" xmlns="" val="1"/>
               </a:ext>
             </a:extLst>
           </p:cNvPr>
@@ -14603,7 +14603,7 @@
           <p:nvPr>
             <p:extLst>
               <p:ext uri="{386F3935-93C4-4BCD-93E2-E3B085C9AB24}">
-                <p16:designElem xmlns:p16="http://schemas.microsoft.com/office/powerpoint/2015/main" val="1"/>
+                <p16:designElem xmlns:p16="http://schemas.microsoft.com/office/powerpoint/2015/main" xmlns="" val="1"/>
               </p:ext>
             </p:extLst>
           </p:nvPr>
@@ -14660,7 +14660,7 @@
           <p:cNvPr id="2" name="slide7">
             <a:extLst>
               <a:ext uri="{FF2B5EF4-FFF2-40B4-BE49-F238E27FC236}">
-                <a16:creationId xmlns:a16="http://schemas.microsoft.com/office/drawing/2014/main" id="{32FA218C-9DCC-4749-AE77-6B7422F4D2E4}"/>
+                <a16:creationId xmlns:a16="http://schemas.microsoft.com/office/drawing/2014/main" xmlns="" id="{32FA218C-9DCC-4749-AE77-6B7422F4D2E4}"/>
               </a:ext>
             </a:extLst>
           </p:cNvPr>
@@ -14726,7 +14726,7 @@
           <p:cNvPr id="2" name="slide12">
             <a:extLst>
               <a:ext uri="{FF2B5EF4-FFF2-40B4-BE49-F238E27FC236}">
-                <a16:creationId xmlns:a16="http://schemas.microsoft.com/office/drawing/2014/main" id="{182788E9-656A-4F10-9AA0-9542414F6BC9}"/>
+                <a16:creationId xmlns:a16="http://schemas.microsoft.com/office/drawing/2014/main" xmlns="" id="{182788E9-656A-4F10-9AA0-9542414F6BC9}"/>
               </a:ext>
             </a:extLst>
           </p:cNvPr>
@@ -14762,7 +14762,7 @@
           <p:cNvPr id="3" name="slide13">
             <a:extLst>
               <a:ext uri="{FF2B5EF4-FFF2-40B4-BE49-F238E27FC236}">
-                <a16:creationId xmlns:a16="http://schemas.microsoft.com/office/drawing/2014/main" id="{BD5FCEEC-5BC0-4443-BB76-C818E5150BCA}"/>
+                <a16:creationId xmlns:a16="http://schemas.microsoft.com/office/drawing/2014/main" xmlns="" id="{BD5FCEEC-5BC0-4443-BB76-C818E5150BCA}"/>
               </a:ext>
             </a:extLst>
           </p:cNvPr>
@@ -14836,7 +14836,7 @@
           <p:cNvPr id="4" name="slide17">
             <a:extLst>
               <a:ext uri="{FF2B5EF4-FFF2-40B4-BE49-F238E27FC236}">
-                <a16:creationId xmlns:a16="http://schemas.microsoft.com/office/drawing/2014/main" id="{A7CE866C-AA16-41F3-A929-534EA195EEC5}"/>
+                <a16:creationId xmlns:a16="http://schemas.microsoft.com/office/drawing/2014/main" xmlns="" id="{A7CE866C-AA16-41F3-A929-534EA195EEC5}"/>
               </a:ext>
             </a:extLst>
           </p:cNvPr>
@@ -14846,7 +14846,7 @@
           <p:nvPr/>
         </p:nvPicPr>
         <p:blipFill>
-          <a:blip r:embed="rId2">
+          <a:blip r:embed="rId2" cstate="print">
             <a:extLst>
               <a:ext uri="{28A0092B-C50C-407E-A947-70E740481C1C}">
                 <a14:useLocalDpi xmlns:a14="http://schemas.microsoft.com/office/drawing/2010/main" val="0"/>
@@ -14872,10 +14872,10 @@
           <p:cNvPr id="23" name="Rectangle 22">
             <a:extLst>
               <a:ext uri="{FF2B5EF4-FFF2-40B4-BE49-F238E27FC236}">
-                <a16:creationId xmlns:a16="http://schemas.microsoft.com/office/drawing/2014/main" id="{E3B4FF89-C45F-4E24-B963-61E855708F2A}"/>
+                <a16:creationId xmlns:a16="http://schemas.microsoft.com/office/drawing/2014/main" xmlns="" id="{E3B4FF89-C45F-4E24-B963-61E855708F2A}"/>
               </a:ext>
               <a:ext uri="{C183D7F6-B498-43B3-948B-1728B52AA6E4}">
-                <adec:decorative xmlns:adec="http://schemas.microsoft.com/office/drawing/2017/decorative" val="1"/>
+                <adec:decorative xmlns:adec="http://schemas.microsoft.com/office/drawing/2017/decorative" xmlns="" val="1"/>
               </a:ext>
             </a:extLst>
           </p:cNvPr>
@@ -14885,7 +14885,7 @@
           <p:nvPr>
             <p:extLst>
               <p:ext uri="{386F3935-93C4-4BCD-93E2-E3B085C9AB24}">
-                <p16:designElem xmlns:p16="http://schemas.microsoft.com/office/powerpoint/2015/main" val="1"/>
+                <p16:designElem xmlns:p16="http://schemas.microsoft.com/office/powerpoint/2015/main" xmlns="" val="1"/>
               </p:ext>
             </p:extLst>
           </p:nvPr>
@@ -14938,7 +14938,7 @@
           <p:cNvPr id="18" name="slide18">
             <a:extLst>
               <a:ext uri="{FF2B5EF4-FFF2-40B4-BE49-F238E27FC236}">
-                <a16:creationId xmlns:a16="http://schemas.microsoft.com/office/drawing/2014/main" id="{CDE01BE3-72CA-4DA3-8D2A-2D277FB5BC72}"/>
+                <a16:creationId xmlns:a16="http://schemas.microsoft.com/office/drawing/2014/main" xmlns="" id="{CDE01BE3-72CA-4DA3-8D2A-2D277FB5BC72}"/>
               </a:ext>
             </a:extLst>
           </p:cNvPr>
@@ -14948,7 +14948,7 @@
           <p:nvPr/>
         </p:nvPicPr>
         <p:blipFill>
-          <a:blip r:embed="rId3">
+          <a:blip r:embed="rId3" cstate="print">
             <a:extLst>
               <a:ext uri="{28A0092B-C50C-407E-A947-70E740481C1C}">
                 <a14:useLocalDpi xmlns:a14="http://schemas.microsoft.com/office/drawing/2010/main" val="0"/>
@@ -14974,10 +14974,10 @@
           <p:cNvPr id="25" name="Rectangle 24">
             <a:extLst>
               <a:ext uri="{FF2B5EF4-FFF2-40B4-BE49-F238E27FC236}">
-                <a16:creationId xmlns:a16="http://schemas.microsoft.com/office/drawing/2014/main" id="{14F25C03-EF67-4344-8AEA-7B3FA0DED024}"/>
+                <a16:creationId xmlns:a16="http://schemas.microsoft.com/office/drawing/2014/main" xmlns="" id="{14F25C03-EF67-4344-8AEA-7B3FA0DED024}"/>
               </a:ext>
               <a:ext uri="{C183D7F6-B498-43B3-948B-1728B52AA6E4}">
-                <adec:decorative xmlns:adec="http://schemas.microsoft.com/office/drawing/2017/decorative" val="1"/>
+                <adec:decorative xmlns:adec="http://schemas.microsoft.com/office/drawing/2017/decorative" xmlns="" val="1"/>
               </a:ext>
             </a:extLst>
           </p:cNvPr>
@@ -14987,7 +14987,7 @@
           <p:nvPr>
             <p:extLst>
               <p:ext uri="{386F3935-93C4-4BCD-93E2-E3B085C9AB24}">
-                <p16:designElem xmlns:p16="http://schemas.microsoft.com/office/powerpoint/2015/main" val="1"/>
+                <p16:designElem xmlns:p16="http://schemas.microsoft.com/office/powerpoint/2015/main" xmlns="" val="1"/>
               </p:ext>
             </p:extLst>
           </p:nvPr>
@@ -15040,7 +15040,7 @@
           <p:cNvPr id="5" name="slide14">
             <a:extLst>
               <a:ext uri="{FF2B5EF4-FFF2-40B4-BE49-F238E27FC236}">
-                <a16:creationId xmlns:a16="http://schemas.microsoft.com/office/drawing/2014/main" id="{65CBC0E9-7F65-4EA2-B5D9-780087582710}"/>
+                <a16:creationId xmlns:a16="http://schemas.microsoft.com/office/drawing/2014/main" xmlns="" id="{65CBC0E9-7F65-4EA2-B5D9-780087582710}"/>
               </a:ext>
             </a:extLst>
           </p:cNvPr>
@@ -15050,7 +15050,7 @@
           <p:nvPr/>
         </p:nvPicPr>
         <p:blipFill>
-          <a:blip r:embed="rId4">
+          <a:blip r:embed="rId4" cstate="print">
             <a:extLst>
               <a:ext uri="{28A0092B-C50C-407E-A947-70E740481C1C}">
                 <a14:useLocalDpi xmlns:a14="http://schemas.microsoft.com/office/drawing/2010/main" val="0"/>
@@ -15076,10 +15076,10 @@
           <p:cNvPr id="27" name="Rectangle 26">
             <a:extLst>
               <a:ext uri="{FF2B5EF4-FFF2-40B4-BE49-F238E27FC236}">
-                <a16:creationId xmlns:a16="http://schemas.microsoft.com/office/drawing/2014/main" id="{F74793DE-3651-410B-B243-8F0B1468E6A4}"/>
+                <a16:creationId xmlns:a16="http://schemas.microsoft.com/office/drawing/2014/main" xmlns="" id="{F74793DE-3651-410B-B243-8F0B1468E6A4}"/>
               </a:ext>
               <a:ext uri="{C183D7F6-B498-43B3-948B-1728B52AA6E4}">
-                <adec:decorative xmlns:adec="http://schemas.microsoft.com/office/drawing/2017/decorative" val="1"/>
+                <adec:decorative xmlns:adec="http://schemas.microsoft.com/office/drawing/2017/decorative" xmlns="" val="1"/>
               </a:ext>
             </a:extLst>
           </p:cNvPr>
@@ -15089,7 +15089,7 @@
           <p:nvPr>
             <p:extLst>
               <p:ext uri="{386F3935-93C4-4BCD-93E2-E3B085C9AB24}">
-                <p16:designElem xmlns:p16="http://schemas.microsoft.com/office/powerpoint/2015/main" val="1"/>
+                <p16:designElem xmlns:p16="http://schemas.microsoft.com/office/powerpoint/2015/main" xmlns="" val="1"/>
               </p:ext>
             </p:extLst>
           </p:nvPr>
@@ -15142,7 +15142,7 @@
           <p:cNvPr id="6" name="slide15">
             <a:extLst>
               <a:ext uri="{FF2B5EF4-FFF2-40B4-BE49-F238E27FC236}">
-                <a16:creationId xmlns:a16="http://schemas.microsoft.com/office/drawing/2014/main" id="{27FFCC14-00B1-4992-8208-5E3A6F94FCE1}"/>
+                <a16:creationId xmlns:a16="http://schemas.microsoft.com/office/drawing/2014/main" xmlns="" id="{27FFCC14-00B1-4992-8208-5E3A6F94FCE1}"/>
               </a:ext>
             </a:extLst>
           </p:cNvPr>
@@ -15152,7 +15152,7 @@
           <p:nvPr/>
         </p:nvPicPr>
         <p:blipFill>
-          <a:blip r:embed="rId5">
+          <a:blip r:embed="rId5" cstate="print">
             <a:extLst>
               <a:ext uri="{28A0092B-C50C-407E-A947-70E740481C1C}">
                 <a14:useLocalDpi xmlns:a14="http://schemas.microsoft.com/office/drawing/2010/main" val="0"/>
@@ -15178,7 +15178,7 @@
           <p:cNvPr id="3" name="slide16">
             <a:extLst>
               <a:ext uri="{FF2B5EF4-FFF2-40B4-BE49-F238E27FC236}">
-                <a16:creationId xmlns:a16="http://schemas.microsoft.com/office/drawing/2014/main" id="{B0269140-4735-46C2-9544-928A9A9AA4A7}"/>
+                <a16:creationId xmlns:a16="http://schemas.microsoft.com/office/drawing/2014/main" xmlns="" id="{B0269140-4735-46C2-9544-928A9A9AA4A7}"/>
               </a:ext>
             </a:extLst>
           </p:cNvPr>
@@ -15188,7 +15188,7 @@
           <p:nvPr/>
         </p:nvPicPr>
         <p:blipFill>
-          <a:blip r:embed="rId6">
+          <a:blip r:embed="rId6" cstate="print">
             <a:extLst>
               <a:ext uri="{28A0092B-C50C-407E-A947-70E740481C1C}">
                 <a14:useLocalDpi xmlns:a14="http://schemas.microsoft.com/office/drawing/2010/main" val="0"/>
@@ -15214,7 +15214,7 @@
           <p:cNvPr id="7" name="slide13">
             <a:extLst>
               <a:ext uri="{FF2B5EF4-FFF2-40B4-BE49-F238E27FC236}">
-                <a16:creationId xmlns:a16="http://schemas.microsoft.com/office/drawing/2014/main" id="{B35B683C-C529-4100-B043-1BF7416E3B9E}"/>
+                <a16:creationId xmlns:a16="http://schemas.microsoft.com/office/drawing/2014/main" xmlns="" id="{B35B683C-C529-4100-B043-1BF7416E3B9E}"/>
               </a:ext>
             </a:extLst>
           </p:cNvPr>
@@ -15224,7 +15224,7 @@
           <p:nvPr/>
         </p:nvPicPr>
         <p:blipFill>
-          <a:blip r:embed="rId7">
+          <a:blip r:embed="rId7" cstate="print">
             <a:extLst>
               <a:ext uri="{28A0092B-C50C-407E-A947-70E740481C1C}">
                 <a14:useLocalDpi xmlns:a14="http://schemas.microsoft.com/office/drawing/2010/main" val="0"/>
@@ -15288,10 +15288,10 @@
           <p:cNvPr id="7" name="Rectangle 6">
             <a:extLst>
               <a:ext uri="{FF2B5EF4-FFF2-40B4-BE49-F238E27FC236}">
-                <a16:creationId xmlns:a16="http://schemas.microsoft.com/office/drawing/2014/main" id="{03E8462A-FEBA-4848-81CC-3F8DA3E477BE}"/>
+                <a16:creationId xmlns:a16="http://schemas.microsoft.com/office/drawing/2014/main" xmlns="" id="{03E8462A-FEBA-4848-81CC-3F8DA3E477BE}"/>
               </a:ext>
               <a:ext uri="{C183D7F6-B498-43B3-948B-1728B52AA6E4}">
-                <adec:decorative xmlns:adec="http://schemas.microsoft.com/office/drawing/2017/decorative" val="1"/>
+                <adec:decorative xmlns:adec="http://schemas.microsoft.com/office/drawing/2017/decorative" xmlns="" val="1"/>
               </a:ext>
             </a:extLst>
           </p:cNvPr>
@@ -15301,7 +15301,7 @@
           <p:nvPr>
             <p:extLst>
               <p:ext uri="{386F3935-93C4-4BCD-93E2-E3B085C9AB24}">
-                <p16:designElem xmlns:p16="http://schemas.microsoft.com/office/powerpoint/2015/main" val="1"/>
+                <p16:designElem xmlns:p16="http://schemas.microsoft.com/office/powerpoint/2015/main" xmlns="" val="1"/>
               </p:ext>
             </p:extLst>
           </p:nvPr>
@@ -15351,10 +15351,10 @@
           <p:cNvPr id="9" name="Group 8">
             <a:extLst>
               <a:ext uri="{FF2B5EF4-FFF2-40B4-BE49-F238E27FC236}">
-                <a16:creationId xmlns:a16="http://schemas.microsoft.com/office/drawing/2014/main" id="{2109F83F-40FE-4DB3-84CC-09FB3340D06D}"/>
+                <a16:creationId xmlns:a16="http://schemas.microsoft.com/office/drawing/2014/main" xmlns="" id="{2109F83F-40FE-4DB3-84CC-09FB3340D06D}"/>
               </a:ext>
               <a:ext uri="{C183D7F6-B498-43B3-948B-1728B52AA6E4}">
-                <adec:decorative xmlns:adec="http://schemas.microsoft.com/office/drawing/2017/decorative" val="1"/>
+                <adec:decorative xmlns:adec="http://schemas.microsoft.com/office/drawing/2017/decorative" xmlns="" val="1"/>
               </a:ext>
             </a:extLst>
           </p:cNvPr>
@@ -15364,7 +15364,7 @@
           <p:nvPr>
             <p:extLst>
               <p:ext uri="{386F3935-93C4-4BCD-93E2-E3B085C9AB24}">
-                <p16:designElem xmlns:p16="http://schemas.microsoft.com/office/powerpoint/2015/main" val="1"/>
+                <p16:designElem xmlns:p16="http://schemas.microsoft.com/office/powerpoint/2015/main" xmlns="" val="1"/>
               </p:ext>
             </p:extLst>
           </p:nvPr>
@@ -15382,10 +15382,10 @@
             <p:cNvPr id="10" name="Straight Connector 9">
               <a:extLst>
                 <a:ext uri="{FF2B5EF4-FFF2-40B4-BE49-F238E27FC236}">
-                  <a16:creationId xmlns:a16="http://schemas.microsoft.com/office/drawing/2014/main" id="{1DE492D7-C3C3-48FF-80C8-37021EA0262F}"/>
+                  <a16:creationId xmlns:a16="http://schemas.microsoft.com/office/drawing/2014/main" xmlns="" id="{1DE492D7-C3C3-48FF-80C8-37021EA0262F}"/>
                 </a:ext>
                 <a:ext uri="{C183D7F6-B498-43B3-948B-1728B52AA6E4}">
-                  <adec:decorative xmlns:adec="http://schemas.microsoft.com/office/drawing/2017/decorative" val="1"/>
+                  <adec:decorative xmlns:adec="http://schemas.microsoft.com/office/drawing/2017/decorative" xmlns="" val="1"/>
                 </a:ext>
               </a:extLst>
             </p:cNvPr>
@@ -15393,7 +15393,7 @@
             <p:nvPr>
               <p:extLst>
                 <p:ext uri="{386F3935-93C4-4BCD-93E2-E3B085C9AB24}">
-                  <p16:designElem xmlns:p16="http://schemas.microsoft.com/office/powerpoint/2015/main" val="1"/>
+                  <p16:designElem xmlns:p16="http://schemas.microsoft.com/office/powerpoint/2015/main" xmlns="" val="1"/>
                 </p:ext>
               </p:extLst>
             </p:nvPr>
@@ -15434,10 +15434,10 @@
             <p:cNvPr id="11" name="Rectangle 23">
               <a:extLst>
                 <a:ext uri="{FF2B5EF4-FFF2-40B4-BE49-F238E27FC236}">
-                  <a16:creationId xmlns:a16="http://schemas.microsoft.com/office/drawing/2014/main" id="{0B30FF97-2E9A-490A-AED2-90BA2E0EC17F}"/>
+                  <a16:creationId xmlns:a16="http://schemas.microsoft.com/office/drawing/2014/main" xmlns="" id="{0B30FF97-2E9A-490A-AED2-90BA2E0EC17F}"/>
                 </a:ext>
                 <a:ext uri="{C183D7F6-B498-43B3-948B-1728B52AA6E4}">
-                  <adec:decorative xmlns:adec="http://schemas.microsoft.com/office/drawing/2017/decorative" val="1"/>
+                  <adec:decorative xmlns:adec="http://schemas.microsoft.com/office/drawing/2017/decorative" xmlns="" val="1"/>
                 </a:ext>
               </a:extLst>
             </p:cNvPr>
@@ -15445,7 +15445,7 @@
             <p:nvPr>
               <p:extLst>
                 <p:ext uri="{386F3935-93C4-4BCD-93E2-E3B085C9AB24}">
-                  <p16:designElem xmlns:p16="http://schemas.microsoft.com/office/powerpoint/2015/main" val="1"/>
+                  <p16:designElem xmlns:p16="http://schemas.microsoft.com/office/powerpoint/2015/main" xmlns="" val="1"/>
                 </p:ext>
               </p:extLst>
             </p:nvPr>
@@ -15512,10 +15512,10 @@
             <p:cNvPr id="12" name="Rectangle 25">
               <a:extLst>
                 <a:ext uri="{FF2B5EF4-FFF2-40B4-BE49-F238E27FC236}">
-                  <a16:creationId xmlns:a16="http://schemas.microsoft.com/office/drawing/2014/main" id="{B6D53C7D-A312-47B6-A66A-230A19CFACA6}"/>
+                  <a16:creationId xmlns:a16="http://schemas.microsoft.com/office/drawing/2014/main" xmlns="" id="{B6D53C7D-A312-47B6-A66A-230A19CFACA6}"/>
                 </a:ext>
                 <a:ext uri="{C183D7F6-B498-43B3-948B-1728B52AA6E4}">
-                  <adec:decorative xmlns:adec="http://schemas.microsoft.com/office/drawing/2017/decorative" val="1"/>
+                  <adec:decorative xmlns:adec="http://schemas.microsoft.com/office/drawing/2017/decorative" xmlns="" val="1"/>
                 </a:ext>
               </a:extLst>
             </p:cNvPr>
@@ -15523,7 +15523,7 @@
             <p:nvPr>
               <p:extLst>
                 <p:ext uri="{386F3935-93C4-4BCD-93E2-E3B085C9AB24}">
-                  <p16:designElem xmlns:p16="http://schemas.microsoft.com/office/powerpoint/2015/main" val="1"/>
+                  <p16:designElem xmlns:p16="http://schemas.microsoft.com/office/powerpoint/2015/main" xmlns="" val="1"/>
                 </p:ext>
               </p:extLst>
             </p:nvPr>
@@ -15590,10 +15590,10 @@
             <p:cNvPr id="13" name="Isosceles Triangle 12">
               <a:extLst>
                 <a:ext uri="{FF2B5EF4-FFF2-40B4-BE49-F238E27FC236}">
-                  <a16:creationId xmlns:a16="http://schemas.microsoft.com/office/drawing/2014/main" id="{9329D58C-0D2E-4A2B-AD6A-9CEE506784A8}"/>
+                  <a16:creationId xmlns:a16="http://schemas.microsoft.com/office/drawing/2014/main" xmlns="" id="{9329D58C-0D2E-4A2B-AD6A-9CEE506784A8}"/>
                 </a:ext>
                 <a:ext uri="{C183D7F6-B498-43B3-948B-1728B52AA6E4}">
-                  <adec:decorative xmlns:adec="http://schemas.microsoft.com/office/drawing/2017/decorative" val="1"/>
+                  <adec:decorative xmlns:adec="http://schemas.microsoft.com/office/drawing/2017/decorative" xmlns="" val="1"/>
                 </a:ext>
               </a:extLst>
             </p:cNvPr>
@@ -15601,7 +15601,7 @@
             <p:nvPr>
               <p:extLst>
                 <p:ext uri="{386F3935-93C4-4BCD-93E2-E3B085C9AB24}">
-                  <p16:designElem xmlns:p16="http://schemas.microsoft.com/office/powerpoint/2015/main" val="1"/>
+                  <p16:designElem xmlns:p16="http://schemas.microsoft.com/office/powerpoint/2015/main" xmlns="" val="1"/>
                 </p:ext>
               </p:extLst>
             </p:nvPr>
@@ -15646,10 +15646,10 @@
             <p:cNvPr id="14" name="Rectangle 27">
               <a:extLst>
                 <a:ext uri="{FF2B5EF4-FFF2-40B4-BE49-F238E27FC236}">
-                  <a16:creationId xmlns:a16="http://schemas.microsoft.com/office/drawing/2014/main" id="{9D446EDE-C690-4461-8BF2-7634808FC8B4}"/>
+                  <a16:creationId xmlns:a16="http://schemas.microsoft.com/office/drawing/2014/main" xmlns="" id="{9D446EDE-C690-4461-8BF2-7634808FC8B4}"/>
                 </a:ext>
                 <a:ext uri="{C183D7F6-B498-43B3-948B-1728B52AA6E4}">
-                  <adec:decorative xmlns:adec="http://schemas.microsoft.com/office/drawing/2017/decorative" val="1"/>
+                  <adec:decorative xmlns:adec="http://schemas.microsoft.com/office/drawing/2017/decorative" xmlns="" val="1"/>
                 </a:ext>
               </a:extLst>
             </p:cNvPr>
@@ -15657,7 +15657,7 @@
             <p:nvPr>
               <p:extLst>
                 <p:ext uri="{386F3935-93C4-4BCD-93E2-E3B085C9AB24}">
-                  <p16:designElem xmlns:p16="http://schemas.microsoft.com/office/powerpoint/2015/main" val="1"/>
+                  <p16:designElem xmlns:p16="http://schemas.microsoft.com/office/powerpoint/2015/main" xmlns="" val="1"/>
                 </p:ext>
               </p:extLst>
             </p:nvPr>
@@ -15725,10 +15725,10 @@
             <p:cNvPr id="15" name="Rectangle 28">
               <a:extLst>
                 <a:ext uri="{FF2B5EF4-FFF2-40B4-BE49-F238E27FC236}">
-                  <a16:creationId xmlns:a16="http://schemas.microsoft.com/office/drawing/2014/main" id="{323F3D34-6531-4AD7-A8C6-195A090281A1}"/>
+                  <a16:creationId xmlns:a16="http://schemas.microsoft.com/office/drawing/2014/main" xmlns="" id="{323F3D34-6531-4AD7-A8C6-195A090281A1}"/>
                 </a:ext>
                 <a:ext uri="{C183D7F6-B498-43B3-948B-1728B52AA6E4}">
-                  <adec:decorative xmlns:adec="http://schemas.microsoft.com/office/drawing/2017/decorative" val="1"/>
+                  <adec:decorative xmlns:adec="http://schemas.microsoft.com/office/drawing/2017/decorative" xmlns="" val="1"/>
                 </a:ext>
               </a:extLst>
             </p:cNvPr>
@@ -15736,7 +15736,7 @@
             <p:nvPr>
               <p:extLst>
                 <p:ext uri="{386F3935-93C4-4BCD-93E2-E3B085C9AB24}">
-                  <p16:designElem xmlns:p16="http://schemas.microsoft.com/office/powerpoint/2015/main" val="1"/>
+                  <p16:designElem xmlns:p16="http://schemas.microsoft.com/office/powerpoint/2015/main" xmlns="" val="1"/>
                 </p:ext>
               </p:extLst>
             </p:nvPr>
@@ -15805,10 +15805,10 @@
             <p:cNvPr id="16" name="Rectangle 29">
               <a:extLst>
                 <a:ext uri="{FF2B5EF4-FFF2-40B4-BE49-F238E27FC236}">
-                  <a16:creationId xmlns:a16="http://schemas.microsoft.com/office/drawing/2014/main" id="{B9B0AE3F-2350-435F-A9B0-C310BF876385}"/>
+                  <a16:creationId xmlns:a16="http://schemas.microsoft.com/office/drawing/2014/main" xmlns="" id="{B9B0AE3F-2350-435F-A9B0-C310BF876385}"/>
                 </a:ext>
                 <a:ext uri="{C183D7F6-B498-43B3-948B-1728B52AA6E4}">
-                  <adec:decorative xmlns:adec="http://schemas.microsoft.com/office/drawing/2017/decorative" val="1"/>
+                  <adec:decorative xmlns:adec="http://schemas.microsoft.com/office/drawing/2017/decorative" xmlns="" val="1"/>
                 </a:ext>
               </a:extLst>
             </p:cNvPr>
@@ -15816,7 +15816,7 @@
             <p:nvPr>
               <p:extLst>
                 <p:ext uri="{386F3935-93C4-4BCD-93E2-E3B085C9AB24}">
-                  <p16:designElem xmlns:p16="http://schemas.microsoft.com/office/powerpoint/2015/main" val="1"/>
+                  <p16:designElem xmlns:p16="http://schemas.microsoft.com/office/powerpoint/2015/main" xmlns="" val="1"/>
                 </p:ext>
               </p:extLst>
             </p:nvPr>
@@ -15883,10 +15883,10 @@
             <p:cNvPr id="17" name="Isosceles Triangle 16">
               <a:extLst>
                 <a:ext uri="{FF2B5EF4-FFF2-40B4-BE49-F238E27FC236}">
-                  <a16:creationId xmlns:a16="http://schemas.microsoft.com/office/drawing/2014/main" id="{4EFA655C-9E50-4C14-A89E-AD7B648E4E2B}"/>
+                  <a16:creationId xmlns:a16="http://schemas.microsoft.com/office/drawing/2014/main" xmlns="" id="{4EFA655C-9E50-4C14-A89E-AD7B648E4E2B}"/>
                 </a:ext>
                 <a:ext uri="{C183D7F6-B498-43B3-948B-1728B52AA6E4}">
-                  <adec:decorative xmlns:adec="http://schemas.microsoft.com/office/drawing/2017/decorative" val="1"/>
+                  <adec:decorative xmlns:adec="http://schemas.microsoft.com/office/drawing/2017/decorative" xmlns="" val="1"/>
                 </a:ext>
               </a:extLst>
             </p:cNvPr>
@@ -15894,7 +15894,7 @@
             <p:nvPr>
               <p:extLst>
                 <p:ext uri="{386F3935-93C4-4BCD-93E2-E3B085C9AB24}">
-                  <p16:designElem xmlns:p16="http://schemas.microsoft.com/office/powerpoint/2015/main" val="1"/>
+                  <p16:designElem xmlns:p16="http://schemas.microsoft.com/office/powerpoint/2015/main" xmlns="" val="1"/>
                 </p:ext>
               </p:extLst>
             </p:nvPr>
@@ -15939,10 +15939,10 @@
             <p:cNvPr id="18" name="Isosceles Triangle 17">
               <a:extLst>
                 <a:ext uri="{FF2B5EF4-FFF2-40B4-BE49-F238E27FC236}">
-                  <a16:creationId xmlns:a16="http://schemas.microsoft.com/office/drawing/2014/main" id="{3E843863-7D25-4C01-9A17-E817CB6D998A}"/>
+                  <a16:creationId xmlns:a16="http://schemas.microsoft.com/office/drawing/2014/main" xmlns="" id="{3E843863-7D25-4C01-9A17-E817CB6D998A}"/>
                 </a:ext>
                 <a:ext uri="{C183D7F6-B498-43B3-948B-1728B52AA6E4}">
-                  <adec:decorative xmlns:adec="http://schemas.microsoft.com/office/drawing/2017/decorative" val="1"/>
+                  <adec:decorative xmlns:adec="http://schemas.microsoft.com/office/drawing/2017/decorative" xmlns="" val="1"/>
                 </a:ext>
               </a:extLst>
             </p:cNvPr>
@@ -15950,7 +15950,7 @@
             <p:nvPr>
               <p:extLst>
                 <p:ext uri="{386F3935-93C4-4BCD-93E2-E3B085C9AB24}">
-                  <p16:designElem xmlns:p16="http://schemas.microsoft.com/office/powerpoint/2015/main" val="1"/>
+                  <p16:designElem xmlns:p16="http://schemas.microsoft.com/office/powerpoint/2015/main" xmlns="" val="1"/>
                 </p:ext>
               </p:extLst>
             </p:nvPr>
@@ -15996,10 +15996,10 @@
           <p:cNvPr id="20" name="Rectangle 19">
             <a:extLst>
               <a:ext uri="{FF2B5EF4-FFF2-40B4-BE49-F238E27FC236}">
-                <a16:creationId xmlns:a16="http://schemas.microsoft.com/office/drawing/2014/main" id="{7941F9B1-B01B-4A84-89D9-B169AEB4E456}"/>
+                <a16:creationId xmlns:a16="http://schemas.microsoft.com/office/drawing/2014/main" xmlns="" id="{7941F9B1-B01B-4A84-89D9-B169AEB4E456}"/>
               </a:ext>
               <a:ext uri="{C183D7F6-B498-43B3-948B-1728B52AA6E4}">
-                <adec:decorative xmlns:adec="http://schemas.microsoft.com/office/drawing/2017/decorative" val="1"/>
+                <adec:decorative xmlns:adec="http://schemas.microsoft.com/office/drawing/2017/decorative" xmlns="" val="1"/>
               </a:ext>
             </a:extLst>
           </p:cNvPr>
@@ -16009,7 +16009,7 @@
           <p:nvPr>
             <p:extLst>
               <p:ext uri="{386F3935-93C4-4BCD-93E2-E3B085C9AB24}">
-                <p16:designElem xmlns:p16="http://schemas.microsoft.com/office/powerpoint/2015/main" val="1"/>
+                <p16:designElem xmlns:p16="http://schemas.microsoft.com/office/powerpoint/2015/main" xmlns="" val="1"/>
               </p:ext>
             </p:extLst>
           </p:nvPr>
@@ -16066,7 +16066,7 @@
           <p:cNvPr id="2" name="slide11">
             <a:extLst>
               <a:ext uri="{FF2B5EF4-FFF2-40B4-BE49-F238E27FC236}">
-                <a16:creationId xmlns:a16="http://schemas.microsoft.com/office/drawing/2014/main" id="{86ADDBB0-D22B-4EEB-8C1C-06BD23ADD973}"/>
+                <a16:creationId xmlns:a16="http://schemas.microsoft.com/office/drawing/2014/main" xmlns="" id="{86ADDBB0-D22B-4EEB-8C1C-06BD23ADD973}"/>
               </a:ext>
             </a:extLst>
           </p:cNvPr>
@@ -16140,10 +16140,10 @@
           <p:cNvPr id="8" name="Rectangle 7">
             <a:extLst>
               <a:ext uri="{FF2B5EF4-FFF2-40B4-BE49-F238E27FC236}">
-                <a16:creationId xmlns:a16="http://schemas.microsoft.com/office/drawing/2014/main" id="{03E8462A-FEBA-4848-81CC-3F8DA3E477BE}"/>
+                <a16:creationId xmlns:a16="http://schemas.microsoft.com/office/drawing/2014/main" xmlns="" id="{03E8462A-FEBA-4848-81CC-3F8DA3E477BE}"/>
               </a:ext>
               <a:ext uri="{C183D7F6-B498-43B3-948B-1728B52AA6E4}">
-                <adec:decorative xmlns:adec="http://schemas.microsoft.com/office/drawing/2017/decorative" val="1"/>
+                <adec:decorative xmlns:adec="http://schemas.microsoft.com/office/drawing/2017/decorative" xmlns="" val="1"/>
               </a:ext>
             </a:extLst>
           </p:cNvPr>
@@ -16153,7 +16153,7 @@
           <p:nvPr>
             <p:extLst>
               <p:ext uri="{386F3935-93C4-4BCD-93E2-E3B085C9AB24}">
-                <p16:designElem xmlns:p16="http://schemas.microsoft.com/office/powerpoint/2015/main" val="1"/>
+                <p16:designElem xmlns:p16="http://schemas.microsoft.com/office/powerpoint/2015/main" xmlns="" val="1"/>
               </p:ext>
             </p:extLst>
           </p:nvPr>
@@ -16203,10 +16203,10 @@
           <p:cNvPr id="10" name="Group 9">
             <a:extLst>
               <a:ext uri="{FF2B5EF4-FFF2-40B4-BE49-F238E27FC236}">
-                <a16:creationId xmlns:a16="http://schemas.microsoft.com/office/drawing/2014/main" id="{2109F83F-40FE-4DB3-84CC-09FB3340D06D}"/>
+                <a16:creationId xmlns:a16="http://schemas.microsoft.com/office/drawing/2014/main" xmlns="" id="{2109F83F-40FE-4DB3-84CC-09FB3340D06D}"/>
               </a:ext>
               <a:ext uri="{C183D7F6-B498-43B3-948B-1728B52AA6E4}">
-                <adec:decorative xmlns:adec="http://schemas.microsoft.com/office/drawing/2017/decorative" val="1"/>
+                <adec:decorative xmlns:adec="http://schemas.microsoft.com/office/drawing/2017/decorative" xmlns="" val="1"/>
               </a:ext>
             </a:extLst>
           </p:cNvPr>
@@ -16216,7 +16216,7 @@
           <p:nvPr>
             <p:extLst>
               <p:ext uri="{386F3935-93C4-4BCD-93E2-E3B085C9AB24}">
-                <p16:designElem xmlns:p16="http://schemas.microsoft.com/office/powerpoint/2015/main" val="1"/>
+                <p16:designElem xmlns:p16="http://schemas.microsoft.com/office/powerpoint/2015/main" xmlns="" val="1"/>
               </p:ext>
             </p:extLst>
           </p:nvPr>
@@ -16234,10 +16234,10 @@
             <p:cNvPr id="11" name="Straight Connector 10">
               <a:extLst>
                 <a:ext uri="{FF2B5EF4-FFF2-40B4-BE49-F238E27FC236}">
-                  <a16:creationId xmlns:a16="http://schemas.microsoft.com/office/drawing/2014/main" id="{1DE492D7-C3C3-48FF-80C8-37021EA0262F}"/>
+                  <a16:creationId xmlns:a16="http://schemas.microsoft.com/office/drawing/2014/main" xmlns="" id="{1DE492D7-C3C3-48FF-80C8-37021EA0262F}"/>
                 </a:ext>
                 <a:ext uri="{C183D7F6-B498-43B3-948B-1728B52AA6E4}">
-                  <adec:decorative xmlns:adec="http://schemas.microsoft.com/office/drawing/2017/decorative" val="1"/>
+                  <adec:decorative xmlns:adec="http://schemas.microsoft.com/office/drawing/2017/decorative" xmlns="" val="1"/>
                 </a:ext>
               </a:extLst>
             </p:cNvPr>
@@ -16245,7 +16245,7 @@
             <p:nvPr>
               <p:extLst>
                 <p:ext uri="{386F3935-93C4-4BCD-93E2-E3B085C9AB24}">
-                  <p16:designElem xmlns:p16="http://schemas.microsoft.com/office/powerpoint/2015/main" val="1"/>
+                  <p16:designElem xmlns:p16="http://schemas.microsoft.com/office/powerpoint/2015/main" xmlns="" val="1"/>
                 </p:ext>
               </p:extLst>
             </p:nvPr>
@@ -16286,10 +16286,10 @@
             <p:cNvPr id="12" name="Rectangle 23">
               <a:extLst>
                 <a:ext uri="{FF2B5EF4-FFF2-40B4-BE49-F238E27FC236}">
-                  <a16:creationId xmlns:a16="http://schemas.microsoft.com/office/drawing/2014/main" id="{0B30FF97-2E9A-490A-AED2-90BA2E0EC17F}"/>
+                  <a16:creationId xmlns:a16="http://schemas.microsoft.com/office/drawing/2014/main" xmlns="" id="{0B30FF97-2E9A-490A-AED2-90BA2E0EC17F}"/>
                 </a:ext>
                 <a:ext uri="{C183D7F6-B498-43B3-948B-1728B52AA6E4}">
-                  <adec:decorative xmlns:adec="http://schemas.microsoft.com/office/drawing/2017/decorative" val="1"/>
+                  <adec:decorative xmlns:adec="http://schemas.microsoft.com/office/drawing/2017/decorative" xmlns="" val="1"/>
                 </a:ext>
               </a:extLst>
             </p:cNvPr>
@@ -16297,7 +16297,7 @@
             <p:nvPr>
               <p:extLst>
                 <p:ext uri="{386F3935-93C4-4BCD-93E2-E3B085C9AB24}">
-                  <p16:designElem xmlns:p16="http://schemas.microsoft.com/office/powerpoint/2015/main" val="1"/>
+                  <p16:designElem xmlns:p16="http://schemas.microsoft.com/office/powerpoint/2015/main" xmlns="" val="1"/>
                 </p:ext>
               </p:extLst>
             </p:nvPr>
@@ -16364,10 +16364,10 @@
             <p:cNvPr id="13" name="Rectangle 25">
               <a:extLst>
                 <a:ext uri="{FF2B5EF4-FFF2-40B4-BE49-F238E27FC236}">
-                  <a16:creationId xmlns:a16="http://schemas.microsoft.com/office/drawing/2014/main" id="{B6D53C7D-A312-47B6-A66A-230A19CFACA6}"/>
+                  <a16:creationId xmlns:a16="http://schemas.microsoft.com/office/drawing/2014/main" xmlns="" id="{B6D53C7D-A312-47B6-A66A-230A19CFACA6}"/>
                 </a:ext>
                 <a:ext uri="{C183D7F6-B498-43B3-948B-1728B52AA6E4}">
-                  <adec:decorative xmlns:adec="http://schemas.microsoft.com/office/drawing/2017/decorative" val="1"/>
+                  <adec:decorative xmlns:adec="http://schemas.microsoft.com/office/drawing/2017/decorative" xmlns="" val="1"/>
                 </a:ext>
               </a:extLst>
             </p:cNvPr>
@@ -16375,7 +16375,7 @@
             <p:nvPr>
               <p:extLst>
                 <p:ext uri="{386F3935-93C4-4BCD-93E2-E3B085C9AB24}">
-                  <p16:designElem xmlns:p16="http://schemas.microsoft.com/office/powerpoint/2015/main" val="1"/>
+                  <p16:designElem xmlns:p16="http://schemas.microsoft.com/office/powerpoint/2015/main" xmlns="" val="1"/>
                 </p:ext>
               </p:extLst>
             </p:nvPr>
@@ -16442,10 +16442,10 @@
             <p:cNvPr id="14" name="Isosceles Triangle 13">
               <a:extLst>
                 <a:ext uri="{FF2B5EF4-FFF2-40B4-BE49-F238E27FC236}">
-                  <a16:creationId xmlns:a16="http://schemas.microsoft.com/office/drawing/2014/main" id="{9329D58C-0D2E-4A2B-AD6A-9CEE506784A8}"/>
+                  <a16:creationId xmlns:a16="http://schemas.microsoft.com/office/drawing/2014/main" xmlns="" id="{9329D58C-0D2E-4A2B-AD6A-9CEE506784A8}"/>
                 </a:ext>
                 <a:ext uri="{C183D7F6-B498-43B3-948B-1728B52AA6E4}">
-                  <adec:decorative xmlns:adec="http://schemas.microsoft.com/office/drawing/2017/decorative" val="1"/>
+                  <adec:decorative xmlns:adec="http://schemas.microsoft.com/office/drawing/2017/decorative" xmlns="" val="1"/>
                 </a:ext>
               </a:extLst>
             </p:cNvPr>
@@ -16453,7 +16453,7 @@
             <p:nvPr>
               <p:extLst>
                 <p:ext uri="{386F3935-93C4-4BCD-93E2-E3B085C9AB24}">
-                  <p16:designElem xmlns:p16="http://schemas.microsoft.com/office/powerpoint/2015/main" val="1"/>
+                  <p16:designElem xmlns:p16="http://schemas.microsoft.com/office/powerpoint/2015/main" xmlns="" val="1"/>
                 </p:ext>
               </p:extLst>
             </p:nvPr>
@@ -16498,10 +16498,10 @@
             <p:cNvPr id="15" name="Rectangle 27">
               <a:extLst>
                 <a:ext uri="{FF2B5EF4-FFF2-40B4-BE49-F238E27FC236}">
-                  <a16:creationId xmlns:a16="http://schemas.microsoft.com/office/drawing/2014/main" id="{9D446EDE-C690-4461-8BF2-7634808FC8B4}"/>
+                  <a16:creationId xmlns:a16="http://schemas.microsoft.com/office/drawing/2014/main" xmlns="" id="{9D446EDE-C690-4461-8BF2-7634808FC8B4}"/>
                 </a:ext>
                 <a:ext uri="{C183D7F6-B498-43B3-948B-1728B52AA6E4}">
-                  <adec:decorative xmlns:adec="http://schemas.microsoft.com/office/drawing/2017/decorative" val="1"/>
+                  <adec:decorative xmlns:adec="http://schemas.microsoft.com/office/drawing/2017/decorative" xmlns="" val="1"/>
                 </a:ext>
               </a:extLst>
             </p:cNvPr>
@@ -16509,7 +16509,7 @@
             <p:nvPr>
               <p:extLst>
                 <p:ext uri="{386F3935-93C4-4BCD-93E2-E3B085C9AB24}">
-                  <p16:designElem xmlns:p16="http://schemas.microsoft.com/office/powerpoint/2015/main" val="1"/>
+                  <p16:designElem xmlns:p16="http://schemas.microsoft.com/office/powerpoint/2015/main" xmlns="" val="1"/>
                 </p:ext>
               </p:extLst>
             </p:nvPr>
@@ -16577,10 +16577,10 @@
             <p:cNvPr id="16" name="Rectangle 28">
               <a:extLst>
                 <a:ext uri="{FF2B5EF4-FFF2-40B4-BE49-F238E27FC236}">
-                  <a16:creationId xmlns:a16="http://schemas.microsoft.com/office/drawing/2014/main" id="{323F3D34-6531-4AD7-A8C6-195A090281A1}"/>
+                  <a16:creationId xmlns:a16="http://schemas.microsoft.com/office/drawing/2014/main" xmlns="" id="{323F3D34-6531-4AD7-A8C6-195A090281A1}"/>
                 </a:ext>
                 <a:ext uri="{C183D7F6-B498-43B3-948B-1728B52AA6E4}">
-                  <adec:decorative xmlns:adec="http://schemas.microsoft.com/office/drawing/2017/decorative" val="1"/>
+                  <adec:decorative xmlns:adec="http://schemas.microsoft.com/office/drawing/2017/decorative" xmlns="" val="1"/>
                 </a:ext>
               </a:extLst>
             </p:cNvPr>
@@ -16588,7 +16588,7 @@
             <p:nvPr>
               <p:extLst>
                 <p:ext uri="{386F3935-93C4-4BCD-93E2-E3B085C9AB24}">
-                  <p16:designElem xmlns:p16="http://schemas.microsoft.com/office/powerpoint/2015/main" val="1"/>
+                  <p16:designElem xmlns:p16="http://schemas.microsoft.com/office/powerpoint/2015/main" xmlns="" val="1"/>
                 </p:ext>
               </p:extLst>
             </p:nvPr>
@@ -16657,10 +16657,10 @@
             <p:cNvPr id="17" name="Rectangle 29">
               <a:extLst>
                 <a:ext uri="{FF2B5EF4-FFF2-40B4-BE49-F238E27FC236}">
-                  <a16:creationId xmlns:a16="http://schemas.microsoft.com/office/drawing/2014/main" id="{B9B0AE3F-2350-435F-A9B0-C310BF876385}"/>
+                  <a16:creationId xmlns:a16="http://schemas.microsoft.com/office/drawing/2014/main" xmlns="" id="{B9B0AE3F-2350-435F-A9B0-C310BF876385}"/>
                 </a:ext>
                 <a:ext uri="{C183D7F6-B498-43B3-948B-1728B52AA6E4}">
-                  <adec:decorative xmlns:adec="http://schemas.microsoft.com/office/drawing/2017/decorative" val="1"/>
+                  <adec:decorative xmlns:adec="http://schemas.microsoft.com/office/drawing/2017/decorative" xmlns="" val="1"/>
                 </a:ext>
               </a:extLst>
             </p:cNvPr>
@@ -16668,7 +16668,7 @@
             <p:nvPr>
               <p:extLst>
                 <p:ext uri="{386F3935-93C4-4BCD-93E2-E3B085C9AB24}">
-                  <p16:designElem xmlns:p16="http://schemas.microsoft.com/office/powerpoint/2015/main" val="1"/>
+                  <p16:designElem xmlns:p16="http://schemas.microsoft.com/office/powerpoint/2015/main" xmlns="" val="1"/>
                 </p:ext>
               </p:extLst>
             </p:nvPr>
@@ -16735,10 +16735,10 @@
             <p:cNvPr id="18" name="Isosceles Triangle 17">
               <a:extLst>
                 <a:ext uri="{FF2B5EF4-FFF2-40B4-BE49-F238E27FC236}">
-                  <a16:creationId xmlns:a16="http://schemas.microsoft.com/office/drawing/2014/main" id="{4EFA655C-9E50-4C14-A89E-AD7B648E4E2B}"/>
+                  <a16:creationId xmlns:a16="http://schemas.microsoft.com/office/drawing/2014/main" xmlns="" id="{4EFA655C-9E50-4C14-A89E-AD7B648E4E2B}"/>
                 </a:ext>
                 <a:ext uri="{C183D7F6-B498-43B3-948B-1728B52AA6E4}">
-                  <adec:decorative xmlns:adec="http://schemas.microsoft.com/office/drawing/2017/decorative" val="1"/>
+                  <adec:decorative xmlns:adec="http://schemas.microsoft.com/office/drawing/2017/decorative" xmlns="" val="1"/>
                 </a:ext>
               </a:extLst>
             </p:cNvPr>
@@ -16746,7 +16746,7 @@
             <p:nvPr>
               <p:extLst>
                 <p:ext uri="{386F3935-93C4-4BCD-93E2-E3B085C9AB24}">
-                  <p16:designElem xmlns:p16="http://schemas.microsoft.com/office/powerpoint/2015/main" val="1"/>
+                  <p16:designElem xmlns:p16="http://schemas.microsoft.com/office/powerpoint/2015/main" xmlns="" val="1"/>
                 </p:ext>
               </p:extLst>
             </p:nvPr>
@@ -16791,10 +16791,10 @@
             <p:cNvPr id="19" name="Isosceles Triangle 18">
               <a:extLst>
                 <a:ext uri="{FF2B5EF4-FFF2-40B4-BE49-F238E27FC236}">
-                  <a16:creationId xmlns:a16="http://schemas.microsoft.com/office/drawing/2014/main" id="{3E843863-7D25-4C01-9A17-E817CB6D998A}"/>
+                  <a16:creationId xmlns:a16="http://schemas.microsoft.com/office/drawing/2014/main" xmlns="" id="{3E843863-7D25-4C01-9A17-E817CB6D998A}"/>
                 </a:ext>
                 <a:ext uri="{C183D7F6-B498-43B3-948B-1728B52AA6E4}">
-                  <adec:decorative xmlns:adec="http://schemas.microsoft.com/office/drawing/2017/decorative" val="1"/>
+                  <adec:decorative xmlns:adec="http://schemas.microsoft.com/office/drawing/2017/decorative" xmlns="" val="1"/>
                 </a:ext>
               </a:extLst>
             </p:cNvPr>
@@ -16802,7 +16802,7 @@
             <p:nvPr>
               <p:extLst>
                 <p:ext uri="{386F3935-93C4-4BCD-93E2-E3B085C9AB24}">
-                  <p16:designElem xmlns:p16="http://schemas.microsoft.com/office/powerpoint/2015/main" val="1"/>
+                  <p16:designElem xmlns:p16="http://schemas.microsoft.com/office/powerpoint/2015/main" xmlns="" val="1"/>
                 </p:ext>
               </p:extLst>
             </p:nvPr>
@@ -16848,10 +16848,10 @@
           <p:cNvPr id="21" name="Rectangle 20">
             <a:extLst>
               <a:ext uri="{FF2B5EF4-FFF2-40B4-BE49-F238E27FC236}">
-                <a16:creationId xmlns:a16="http://schemas.microsoft.com/office/drawing/2014/main" id="{7941F9B1-B01B-4A84-89D9-B169AEB4E456}"/>
+                <a16:creationId xmlns:a16="http://schemas.microsoft.com/office/drawing/2014/main" xmlns="" id="{7941F9B1-B01B-4A84-89D9-B169AEB4E456}"/>
               </a:ext>
               <a:ext uri="{C183D7F6-B498-43B3-948B-1728B52AA6E4}">
-                <adec:decorative xmlns:adec="http://schemas.microsoft.com/office/drawing/2017/decorative" val="1"/>
+                <adec:decorative xmlns:adec="http://schemas.microsoft.com/office/drawing/2017/decorative" xmlns="" val="1"/>
               </a:ext>
             </a:extLst>
           </p:cNvPr>
@@ -16861,7 +16861,7 @@
           <p:nvPr>
             <p:extLst>
               <p:ext uri="{386F3935-93C4-4BCD-93E2-E3B085C9AB24}">
-                <p16:designElem xmlns:p16="http://schemas.microsoft.com/office/powerpoint/2015/main" val="1"/>
+                <p16:designElem xmlns:p16="http://schemas.microsoft.com/office/powerpoint/2015/main" xmlns="" val="1"/>
               </p:ext>
             </p:extLst>
           </p:nvPr>
@@ -16918,7 +16918,7 @@
           <p:cNvPr id="3" name="slide4">
             <a:extLst>
               <a:ext uri="{FF2B5EF4-FFF2-40B4-BE49-F238E27FC236}">
-                <a16:creationId xmlns:a16="http://schemas.microsoft.com/office/drawing/2014/main" id="{7EE1087F-C25B-46CA-8FE5-E41841395C77}"/>
+                <a16:creationId xmlns:a16="http://schemas.microsoft.com/office/drawing/2014/main" xmlns="" id="{7EE1087F-C25B-46CA-8FE5-E41841395C77}"/>
               </a:ext>
             </a:extLst>
           </p:cNvPr>
@@ -16941,8 +16941,8 @@
         </p:blipFill>
         <p:spPr>
           <a:xfrm>
-            <a:off x="2206781" y="1131994"/>
-            <a:ext cx="7780314" cy="4590386"/>
+            <a:off x="1491329" y="633229"/>
+            <a:ext cx="9563114" cy="5642238"/>
           </a:xfrm>
           <a:prstGeom prst="rect">
             <a:avLst/>
@@ -16992,10 +16992,10 @@
           <p:cNvPr id="7" name="Rectangle 6">
             <a:extLst>
               <a:ext uri="{FF2B5EF4-FFF2-40B4-BE49-F238E27FC236}">
-                <a16:creationId xmlns:a16="http://schemas.microsoft.com/office/drawing/2014/main" id="{03E8462A-FEBA-4848-81CC-3F8DA3E477BE}"/>
+                <a16:creationId xmlns:a16="http://schemas.microsoft.com/office/drawing/2014/main" xmlns="" id="{03E8462A-FEBA-4848-81CC-3F8DA3E477BE}"/>
               </a:ext>
               <a:ext uri="{C183D7F6-B498-43B3-948B-1728B52AA6E4}">
-                <adec:decorative xmlns:adec="http://schemas.microsoft.com/office/drawing/2017/decorative" val="1"/>
+                <adec:decorative xmlns:adec="http://schemas.microsoft.com/office/drawing/2017/decorative" xmlns="" val="1"/>
               </a:ext>
             </a:extLst>
           </p:cNvPr>
@@ -17005,7 +17005,7 @@
           <p:nvPr>
             <p:extLst>
               <p:ext uri="{386F3935-93C4-4BCD-93E2-E3B085C9AB24}">
-                <p16:designElem xmlns:p16="http://schemas.microsoft.com/office/powerpoint/2015/main" val="1"/>
+                <p16:designElem xmlns:p16="http://schemas.microsoft.com/office/powerpoint/2015/main" xmlns="" val="1"/>
               </p:ext>
             </p:extLst>
           </p:nvPr>
@@ -17055,10 +17055,10 @@
           <p:cNvPr id="9" name="Group 8">
             <a:extLst>
               <a:ext uri="{FF2B5EF4-FFF2-40B4-BE49-F238E27FC236}">
-                <a16:creationId xmlns:a16="http://schemas.microsoft.com/office/drawing/2014/main" id="{2109F83F-40FE-4DB3-84CC-09FB3340D06D}"/>
+                <a16:creationId xmlns:a16="http://schemas.microsoft.com/office/drawing/2014/main" xmlns="" id="{2109F83F-40FE-4DB3-84CC-09FB3340D06D}"/>
               </a:ext>
               <a:ext uri="{C183D7F6-B498-43B3-948B-1728B52AA6E4}">
-                <adec:decorative xmlns:adec="http://schemas.microsoft.com/office/drawing/2017/decorative" val="1"/>
+                <adec:decorative xmlns:adec="http://schemas.microsoft.com/office/drawing/2017/decorative" xmlns="" val="1"/>
               </a:ext>
             </a:extLst>
           </p:cNvPr>
@@ -17068,7 +17068,7 @@
           <p:nvPr>
             <p:extLst>
               <p:ext uri="{386F3935-93C4-4BCD-93E2-E3B085C9AB24}">
-                <p16:designElem xmlns:p16="http://schemas.microsoft.com/office/powerpoint/2015/main" val="1"/>
+                <p16:designElem xmlns:p16="http://schemas.microsoft.com/office/powerpoint/2015/main" xmlns="" val="1"/>
               </p:ext>
             </p:extLst>
           </p:nvPr>
@@ -17086,10 +17086,10 @@
             <p:cNvPr id="10" name="Straight Connector 9">
               <a:extLst>
                 <a:ext uri="{FF2B5EF4-FFF2-40B4-BE49-F238E27FC236}">
-                  <a16:creationId xmlns:a16="http://schemas.microsoft.com/office/drawing/2014/main" id="{1DE492D7-C3C3-48FF-80C8-37021EA0262F}"/>
+                  <a16:creationId xmlns:a16="http://schemas.microsoft.com/office/drawing/2014/main" xmlns="" id="{1DE492D7-C3C3-48FF-80C8-37021EA0262F}"/>
                 </a:ext>
                 <a:ext uri="{C183D7F6-B498-43B3-948B-1728B52AA6E4}">
-                  <adec:decorative xmlns:adec="http://schemas.microsoft.com/office/drawing/2017/decorative" val="1"/>
+                  <adec:decorative xmlns:adec="http://schemas.microsoft.com/office/drawing/2017/decorative" xmlns="" val="1"/>
                 </a:ext>
               </a:extLst>
             </p:cNvPr>
@@ -17097,7 +17097,7 @@
             <p:nvPr>
               <p:extLst>
                 <p:ext uri="{386F3935-93C4-4BCD-93E2-E3B085C9AB24}">
-                  <p16:designElem xmlns:p16="http://schemas.microsoft.com/office/powerpoint/2015/main" val="1"/>
+                  <p16:designElem xmlns:p16="http://schemas.microsoft.com/office/powerpoint/2015/main" xmlns="" val="1"/>
                 </p:ext>
               </p:extLst>
             </p:nvPr>
@@ -17138,10 +17138,10 @@
             <p:cNvPr id="11" name="Rectangle 23">
               <a:extLst>
                 <a:ext uri="{FF2B5EF4-FFF2-40B4-BE49-F238E27FC236}">
-                  <a16:creationId xmlns:a16="http://schemas.microsoft.com/office/drawing/2014/main" id="{0B30FF97-2E9A-490A-AED2-90BA2E0EC17F}"/>
+                  <a16:creationId xmlns:a16="http://schemas.microsoft.com/office/drawing/2014/main" xmlns="" id="{0B30FF97-2E9A-490A-AED2-90BA2E0EC17F}"/>
                 </a:ext>
                 <a:ext uri="{C183D7F6-B498-43B3-948B-1728B52AA6E4}">
-                  <adec:decorative xmlns:adec="http://schemas.microsoft.com/office/drawing/2017/decorative" val="1"/>
+                  <adec:decorative xmlns:adec="http://schemas.microsoft.com/office/drawing/2017/decorative" xmlns="" val="1"/>
                 </a:ext>
               </a:extLst>
             </p:cNvPr>
@@ -17149,7 +17149,7 @@
             <p:nvPr>
               <p:extLst>
                 <p:ext uri="{386F3935-93C4-4BCD-93E2-E3B085C9AB24}">
-                  <p16:designElem xmlns:p16="http://schemas.microsoft.com/office/powerpoint/2015/main" val="1"/>
+                  <p16:designElem xmlns:p16="http://schemas.microsoft.com/office/powerpoint/2015/main" xmlns="" val="1"/>
                 </p:ext>
               </p:extLst>
             </p:nvPr>
@@ -17216,10 +17216,10 @@
             <p:cNvPr id="12" name="Rectangle 25">
               <a:extLst>
                 <a:ext uri="{FF2B5EF4-FFF2-40B4-BE49-F238E27FC236}">
-                  <a16:creationId xmlns:a16="http://schemas.microsoft.com/office/drawing/2014/main" id="{B6D53C7D-A312-47B6-A66A-230A19CFACA6}"/>
+                  <a16:creationId xmlns:a16="http://schemas.microsoft.com/office/drawing/2014/main" xmlns="" id="{B6D53C7D-A312-47B6-A66A-230A19CFACA6}"/>
                 </a:ext>
                 <a:ext uri="{C183D7F6-B498-43B3-948B-1728B52AA6E4}">
-                  <adec:decorative xmlns:adec="http://schemas.microsoft.com/office/drawing/2017/decorative" val="1"/>
+                  <adec:decorative xmlns:adec="http://schemas.microsoft.com/office/drawing/2017/decorative" xmlns="" val="1"/>
                 </a:ext>
               </a:extLst>
             </p:cNvPr>
@@ -17227,7 +17227,7 @@
             <p:nvPr>
               <p:extLst>
                 <p:ext uri="{386F3935-93C4-4BCD-93E2-E3B085C9AB24}">
-                  <p16:designElem xmlns:p16="http://schemas.microsoft.com/office/powerpoint/2015/main" val="1"/>
+                  <p16:designElem xmlns:p16="http://schemas.microsoft.com/office/powerpoint/2015/main" xmlns="" val="1"/>
                 </p:ext>
               </p:extLst>
             </p:nvPr>
@@ -17294,10 +17294,10 @@
             <p:cNvPr id="13" name="Isosceles Triangle 12">
               <a:extLst>
                 <a:ext uri="{FF2B5EF4-FFF2-40B4-BE49-F238E27FC236}">
-                  <a16:creationId xmlns:a16="http://schemas.microsoft.com/office/drawing/2014/main" id="{9329D58C-0D2E-4A2B-AD6A-9CEE506784A8}"/>
+                  <a16:creationId xmlns:a16="http://schemas.microsoft.com/office/drawing/2014/main" xmlns="" id="{9329D58C-0D2E-4A2B-AD6A-9CEE506784A8}"/>
                 </a:ext>
                 <a:ext uri="{C183D7F6-B498-43B3-948B-1728B52AA6E4}">
-                  <adec:decorative xmlns:adec="http://schemas.microsoft.com/office/drawing/2017/decorative" val="1"/>
+                  <adec:decorative xmlns:adec="http://schemas.microsoft.com/office/drawing/2017/decorative" xmlns="" val="1"/>
                 </a:ext>
               </a:extLst>
             </p:cNvPr>
@@ -17305,7 +17305,7 @@
             <p:nvPr>
               <p:extLst>
                 <p:ext uri="{386F3935-93C4-4BCD-93E2-E3B085C9AB24}">
-                  <p16:designElem xmlns:p16="http://schemas.microsoft.com/office/powerpoint/2015/main" val="1"/>
+                  <p16:designElem xmlns:p16="http://schemas.microsoft.com/office/powerpoint/2015/main" xmlns="" val="1"/>
                 </p:ext>
               </p:extLst>
             </p:nvPr>
@@ -17350,10 +17350,10 @@
             <p:cNvPr id="14" name="Rectangle 27">
               <a:extLst>
                 <a:ext uri="{FF2B5EF4-FFF2-40B4-BE49-F238E27FC236}">
-                  <a16:creationId xmlns:a16="http://schemas.microsoft.com/office/drawing/2014/main" id="{9D446EDE-C690-4461-8BF2-7634808FC8B4}"/>
+                  <a16:creationId xmlns:a16="http://schemas.microsoft.com/office/drawing/2014/main" xmlns="" id="{9D446EDE-C690-4461-8BF2-7634808FC8B4}"/>
                 </a:ext>
                 <a:ext uri="{C183D7F6-B498-43B3-948B-1728B52AA6E4}">
-                  <adec:decorative xmlns:adec="http://schemas.microsoft.com/office/drawing/2017/decorative" val="1"/>
+                  <adec:decorative xmlns:adec="http://schemas.microsoft.com/office/drawing/2017/decorative" xmlns="" val="1"/>
                 </a:ext>
               </a:extLst>
             </p:cNvPr>
@@ -17361,7 +17361,7 @@
             <p:nvPr>
               <p:extLst>
                 <p:ext uri="{386F3935-93C4-4BCD-93E2-E3B085C9AB24}">
-                  <p16:designElem xmlns:p16="http://schemas.microsoft.com/office/powerpoint/2015/main" val="1"/>
+                  <p16:designElem xmlns:p16="http://schemas.microsoft.com/office/powerpoint/2015/main" xmlns="" val="1"/>
                 </p:ext>
               </p:extLst>
             </p:nvPr>
@@ -17429,10 +17429,10 @@
             <p:cNvPr id="15" name="Rectangle 28">
               <a:extLst>
                 <a:ext uri="{FF2B5EF4-FFF2-40B4-BE49-F238E27FC236}">
-                  <a16:creationId xmlns:a16="http://schemas.microsoft.com/office/drawing/2014/main" id="{323F3D34-6531-4AD7-A8C6-195A090281A1}"/>
+                  <a16:creationId xmlns:a16="http://schemas.microsoft.com/office/drawing/2014/main" xmlns="" id="{323F3D34-6531-4AD7-A8C6-195A090281A1}"/>
                 </a:ext>
                 <a:ext uri="{C183D7F6-B498-43B3-948B-1728B52AA6E4}">
-                  <adec:decorative xmlns:adec="http://schemas.microsoft.com/office/drawing/2017/decorative" val="1"/>
+                  <adec:decorative xmlns:adec="http://schemas.microsoft.com/office/drawing/2017/decorative" xmlns="" val="1"/>
                 </a:ext>
               </a:extLst>
             </p:cNvPr>
@@ -17440,7 +17440,7 @@
             <p:nvPr>
               <p:extLst>
                 <p:ext uri="{386F3935-93C4-4BCD-93E2-E3B085C9AB24}">
-                  <p16:designElem xmlns:p16="http://schemas.microsoft.com/office/powerpoint/2015/main" val="1"/>
+                  <p16:designElem xmlns:p16="http://schemas.microsoft.com/office/powerpoint/2015/main" xmlns="" val="1"/>
                 </p:ext>
               </p:extLst>
             </p:nvPr>
@@ -17509,10 +17509,10 @@
             <p:cNvPr id="16" name="Rectangle 29">
               <a:extLst>
                 <a:ext uri="{FF2B5EF4-FFF2-40B4-BE49-F238E27FC236}">
-                  <a16:creationId xmlns:a16="http://schemas.microsoft.com/office/drawing/2014/main" id="{B9B0AE3F-2350-435F-A9B0-C310BF876385}"/>
+                  <a16:creationId xmlns:a16="http://schemas.microsoft.com/office/drawing/2014/main" xmlns="" id="{B9B0AE3F-2350-435F-A9B0-C310BF876385}"/>
                 </a:ext>
                 <a:ext uri="{C183D7F6-B498-43B3-948B-1728B52AA6E4}">
-                  <adec:decorative xmlns:adec="http://schemas.microsoft.com/office/drawing/2017/decorative" val="1"/>
+                  <adec:decorative xmlns:adec="http://schemas.microsoft.com/office/drawing/2017/decorative" xmlns="" val="1"/>
                 </a:ext>
               </a:extLst>
             </p:cNvPr>
@@ -17520,7 +17520,7 @@
             <p:nvPr>
               <p:extLst>
                 <p:ext uri="{386F3935-93C4-4BCD-93E2-E3B085C9AB24}">
-                  <p16:designElem xmlns:p16="http://schemas.microsoft.com/office/powerpoint/2015/main" val="1"/>
+                  <p16:designElem xmlns:p16="http://schemas.microsoft.com/office/powerpoint/2015/main" xmlns="" val="1"/>
                 </p:ext>
               </p:extLst>
             </p:nvPr>
@@ -17587,10 +17587,10 @@
             <p:cNvPr id="17" name="Isosceles Triangle 16">
               <a:extLst>
                 <a:ext uri="{FF2B5EF4-FFF2-40B4-BE49-F238E27FC236}">
-                  <a16:creationId xmlns:a16="http://schemas.microsoft.com/office/drawing/2014/main" id="{4EFA655C-9E50-4C14-A89E-AD7B648E4E2B}"/>
+                  <a16:creationId xmlns:a16="http://schemas.microsoft.com/office/drawing/2014/main" xmlns="" id="{4EFA655C-9E50-4C14-A89E-AD7B648E4E2B}"/>
                 </a:ext>
                 <a:ext uri="{C183D7F6-B498-43B3-948B-1728B52AA6E4}">
-                  <adec:decorative xmlns:adec="http://schemas.microsoft.com/office/drawing/2017/decorative" val="1"/>
+                  <adec:decorative xmlns:adec="http://schemas.microsoft.com/office/drawing/2017/decorative" xmlns="" val="1"/>
                 </a:ext>
               </a:extLst>
             </p:cNvPr>
@@ -17598,7 +17598,7 @@
             <p:nvPr>
               <p:extLst>
                 <p:ext uri="{386F3935-93C4-4BCD-93E2-E3B085C9AB24}">
-                  <p16:designElem xmlns:p16="http://schemas.microsoft.com/office/powerpoint/2015/main" val="1"/>
+                  <p16:designElem xmlns:p16="http://schemas.microsoft.com/office/powerpoint/2015/main" xmlns="" val="1"/>
                 </p:ext>
               </p:extLst>
             </p:nvPr>
@@ -17643,10 +17643,10 @@
             <p:cNvPr id="18" name="Isosceles Triangle 17">
               <a:extLst>
                 <a:ext uri="{FF2B5EF4-FFF2-40B4-BE49-F238E27FC236}">
-                  <a16:creationId xmlns:a16="http://schemas.microsoft.com/office/drawing/2014/main" id="{3E843863-7D25-4C01-9A17-E817CB6D998A}"/>
+                  <a16:creationId xmlns:a16="http://schemas.microsoft.com/office/drawing/2014/main" xmlns="" id="{3E843863-7D25-4C01-9A17-E817CB6D998A}"/>
                 </a:ext>
                 <a:ext uri="{C183D7F6-B498-43B3-948B-1728B52AA6E4}">
-                  <adec:decorative xmlns:adec="http://schemas.microsoft.com/office/drawing/2017/decorative" val="1"/>
+                  <adec:decorative xmlns:adec="http://schemas.microsoft.com/office/drawing/2017/decorative" xmlns="" val="1"/>
                 </a:ext>
               </a:extLst>
             </p:cNvPr>
@@ -17654,7 +17654,7 @@
             <p:nvPr>
               <p:extLst>
                 <p:ext uri="{386F3935-93C4-4BCD-93E2-E3B085C9AB24}">
-                  <p16:designElem xmlns:p16="http://schemas.microsoft.com/office/powerpoint/2015/main" val="1"/>
+                  <p16:designElem xmlns:p16="http://schemas.microsoft.com/office/powerpoint/2015/main" xmlns="" val="1"/>
                 </p:ext>
               </p:extLst>
             </p:nvPr>
@@ -17700,10 +17700,10 @@
           <p:cNvPr id="20" name="Rectangle 19">
             <a:extLst>
               <a:ext uri="{FF2B5EF4-FFF2-40B4-BE49-F238E27FC236}">
-                <a16:creationId xmlns:a16="http://schemas.microsoft.com/office/drawing/2014/main" id="{7941F9B1-B01B-4A84-89D9-B169AEB4E456}"/>
+                <a16:creationId xmlns:a16="http://schemas.microsoft.com/office/drawing/2014/main" xmlns="" id="{7941F9B1-B01B-4A84-89D9-B169AEB4E456}"/>
               </a:ext>
               <a:ext uri="{C183D7F6-B498-43B3-948B-1728B52AA6E4}">
-                <adec:decorative xmlns:adec="http://schemas.microsoft.com/office/drawing/2017/decorative" val="1"/>
+                <adec:decorative xmlns:adec="http://schemas.microsoft.com/office/drawing/2017/decorative" xmlns="" val="1"/>
               </a:ext>
             </a:extLst>
           </p:cNvPr>
@@ -17713,7 +17713,7 @@
           <p:nvPr>
             <p:extLst>
               <p:ext uri="{386F3935-93C4-4BCD-93E2-E3B085C9AB24}">
-                <p16:designElem xmlns:p16="http://schemas.microsoft.com/office/powerpoint/2015/main" val="1"/>
+                <p16:designElem xmlns:p16="http://schemas.microsoft.com/office/powerpoint/2015/main" xmlns="" val="1"/>
               </p:ext>
             </p:extLst>
           </p:nvPr>
@@ -17770,7 +17770,7 @@
           <p:cNvPr id="2" name="slide4">
             <a:extLst>
               <a:ext uri="{FF2B5EF4-FFF2-40B4-BE49-F238E27FC236}">
-                <a16:creationId xmlns:a16="http://schemas.microsoft.com/office/drawing/2014/main" id="{D2136DE0-82F0-4928-B55D-05366FF88F5A}"/>
+                <a16:creationId xmlns:a16="http://schemas.microsoft.com/office/drawing/2014/main" xmlns="" id="{D2136DE0-82F0-4928-B55D-05366FF88F5A}"/>
               </a:ext>
             </a:extLst>
           </p:cNvPr>
@@ -17793,8 +17793,8 @@
         </p:blipFill>
         <p:spPr>
           <a:xfrm>
-            <a:off x="2206781" y="1131994"/>
-            <a:ext cx="7780314" cy="4590386"/>
+            <a:off x="1586340" y="694730"/>
+            <a:ext cx="9466503" cy="5585238"/>
           </a:xfrm>
           <a:prstGeom prst="rect">
             <a:avLst/>
@@ -18065,7 +18065,7 @@
   <a:extraClrSchemeLst/>
   <a:extLst>
     <a:ext uri="{05A4C25C-085E-4340-85A3-A5531E510DB2}">
-      <thm15:themeFamily xmlns:thm15="http://schemas.microsoft.com/office/thememl/2012/main" name="Facet" id="{C0C680CD-088A-49FC-A102-D699147F32B2}" vid="{CFBC31BA-B70F-4F30-BCAA-4F3011E16C4D}"/>
+      <thm15:themeFamily xmlns:thm15="http://schemas.microsoft.com/office/thememl/2012/main" xmlns="" name="Facet" id="{C0C680CD-088A-49FC-A102-D699147F32B2}" vid="{CFBC31BA-B70F-4F30-BCAA-4F3011E16C4D}"/>
     </a:ext>
   </a:extLst>
 </a:theme>

</xml_diff>